<commit_message>
added UML as well as completed Powerpoint
</commit_message>
<xml_diff>
--- a/CSC_520_Devils_Grip.pptx
+++ b/CSC_520_Devils_Grip.pptx
@@ -5,7 +5,7 @@
     <p:sldMasterId id="2147483660" r:id="rId1"/>
   </p:sldMasterIdLst>
   <p:notesMasterIdLst>
-    <p:notesMasterId r:id="rId13"/>
+    <p:notesMasterId r:id="rId14"/>
   </p:notesMasterIdLst>
   <p:sldIdLst>
     <p:sldId id="256" r:id="rId2"/>
@@ -14,35 +14,36 @@
     <p:sldId id="259" r:id="rId5"/>
     <p:sldId id="260" r:id="rId6"/>
     <p:sldId id="262" r:id="rId7"/>
-    <p:sldId id="264" r:id="rId8"/>
+    <p:sldId id="274" r:id="rId8"/>
     <p:sldId id="265" r:id="rId9"/>
     <p:sldId id="266" r:id="rId10"/>
-    <p:sldId id="271" r:id="rId11"/>
-    <p:sldId id="273" r:id="rId12"/>
+    <p:sldId id="275" r:id="rId11"/>
+    <p:sldId id="271" r:id="rId12"/>
+    <p:sldId id="273" r:id="rId13"/>
   </p:sldIdLst>
   <p:sldSz cx="9144000" cy="5143500" type="screen16x9"/>
   <p:notesSz cx="6858000" cy="9144000"/>
   <p:embeddedFontLst>
     <p:embeddedFont>
       <p:font typeface="Bookman Old Style" panose="02050604050505020204" pitchFamily="18" charset="0"/>
-      <p:regular r:id="rId14"/>
-      <p:bold r:id="rId15"/>
-      <p:italic r:id="rId16"/>
-      <p:boldItalic r:id="rId17"/>
+      <p:regular r:id="rId15"/>
+      <p:bold r:id="rId16"/>
+      <p:italic r:id="rId17"/>
+      <p:boldItalic r:id="rId18"/>
     </p:embeddedFont>
     <p:embeddedFont>
       <p:font typeface="Roboto" panose="020B0604020202020204" charset="0"/>
-      <p:regular r:id="rId18"/>
-      <p:bold r:id="rId19"/>
-      <p:italic r:id="rId20"/>
-      <p:boldItalic r:id="rId21"/>
+      <p:regular r:id="rId19"/>
+      <p:bold r:id="rId20"/>
+      <p:italic r:id="rId21"/>
+      <p:boldItalic r:id="rId22"/>
     </p:embeddedFont>
     <p:embeddedFont>
       <p:font typeface="Rockwell" panose="02060603020205020403" pitchFamily="18" charset="0"/>
-      <p:regular r:id="rId22"/>
-      <p:bold r:id="rId23"/>
-      <p:italic r:id="rId24"/>
-      <p:boldItalic r:id="rId25"/>
+      <p:regular r:id="rId23"/>
+      <p:bold r:id="rId24"/>
+      <p:italic r:id="rId25"/>
+      <p:boldItalic r:id="rId26"/>
     </p:embeddedFont>
   </p:embeddedFontLst>
   <p:defaultTextStyle>
@@ -1527,7 +1528,7 @@
   <p:cSld>
     <p:spTree>
       <p:nvGrpSpPr>
-        <p:cNvPr id="1" name="Shape 105"/>
+        <p:cNvPr id="1" name="Shape 93"/>
         <p:cNvGrpSpPr/>
         <p:nvPr/>
       </p:nvGrpSpPr>
@@ -1541,7 +1542,7 @@
       </p:grpSpPr>
       <p:sp>
         <p:nvSpPr>
-          <p:cNvPr id="106" name="Google Shape;106;g84146f00ea_1_0:notes"/>
+          <p:cNvPr id="94" name="Google Shape;94;g73afbdf538_0_77:notes"/>
           <p:cNvSpPr>
             <a:spLocks noGrp="1" noRot="1" noChangeAspect="1"/>
           </p:cNvSpPr>
@@ -1582,7 +1583,7 @@
       </p:sp>
       <p:sp>
         <p:nvSpPr>
-          <p:cNvPr id="107" name="Google Shape;107;g84146f00ea_1_0:notes"/>
+          <p:cNvPr id="95" name="Google Shape;95;g73afbdf538_0_77:notes"/>
           <p:cNvSpPr txBox="1">
             <a:spLocks noGrp="1"/>
           </p:cNvSpPr>
@@ -1616,13 +1617,18 @@
             </a:pPr>
             <a:r>
               <a:rPr lang="en"/>
-              <a:t>Zach: We then switched to a noSQL database. Our reasoning for doing so is that our data model was changing throughout development and changing a data model in SQL. noSQL also made the login system easier to implement. Using noSQL also gives us the ability to add new features without having to change pre existing data. Another reason is that noSQL databases are very flexible, the data doesn't have to be structured and this was important as some of the recipes can have different formats.</a:t>
+              <a:t>Zach: We switched to a declarativeUI architecture by using swiftUI.  At first, we were using a MVC architecture, but it began to fight us more than we were able to make progress, so we decided to switch to a different architecture and we were able to make more progress with that in less time than with the MVC. We used Firebase authentication for the login system</a:t>
             </a:r>
             <a:endParaRPr/>
           </a:p>
         </p:txBody>
       </p:sp>
     </p:spTree>
+    <p:extLst>
+      <p:ext uri="{BB962C8B-B14F-4D97-AF65-F5344CB8AC3E}">
+        <p14:creationId xmlns:p14="http://schemas.microsoft.com/office/powerpoint/2010/main" val="882189283"/>
+      </p:ext>
+    </p:extLst>
   </p:cSld>
   <p:clrMapOvr>
     <a:masterClrMapping/>
@@ -1979,7 +1985,7 @@
           <a:p>
             <a:fld id="{48A87A34-81AB-432B-8DAE-1953F412C126}" type="datetimeFigureOut">
               <a:rPr lang="en-US" dirty="0"/>
-              <a:t>10/28/2020</a:t>
+              <a:t>11/2/2020</a:t>
             </a:fld>
             <a:endParaRPr lang="en-US" dirty="0"/>
           </a:p>
@@ -2276,7 +2282,7 @@
           <a:p>
             <a:fld id="{48A87A34-81AB-432B-8DAE-1953F412C126}" type="datetimeFigureOut">
               <a:rPr lang="en-US" dirty="0"/>
-              <a:t>10/28/2020</a:t>
+              <a:t>11/2/2020</a:t>
             </a:fld>
             <a:endParaRPr lang="en-US" dirty="0"/>
           </a:p>
@@ -2478,7 +2484,7 @@
           <a:p>
             <a:fld id="{48A87A34-81AB-432B-8DAE-1953F412C126}" type="datetimeFigureOut">
               <a:rPr lang="en-US" dirty="0"/>
-              <a:t>10/28/2020</a:t>
+              <a:t>11/2/2020</a:t>
             </a:fld>
             <a:endParaRPr lang="en-US" dirty="0"/>
           </a:p>
@@ -2749,7 +2755,7 @@
           <a:p>
             <a:fld id="{48A87A34-81AB-432B-8DAE-1953F412C126}" type="datetimeFigureOut">
               <a:rPr lang="en-US" dirty="0"/>
-              <a:t>10/28/2020</a:t>
+              <a:t>11/2/2020</a:t>
             </a:fld>
             <a:endParaRPr lang="en-US" dirty="0"/>
           </a:p>
@@ -3183,7 +3189,7 @@
           <a:p>
             <a:fld id="{48A87A34-81AB-432B-8DAE-1953F412C126}" type="datetimeFigureOut">
               <a:rPr lang="en-US" dirty="0"/>
-              <a:t>10/28/2020</a:t>
+              <a:t>11/2/2020</a:t>
             </a:fld>
             <a:endParaRPr lang="en-US" dirty="0"/>
           </a:p>
@@ -3739,7 +3745,7 @@
           <a:p>
             <a:fld id="{48A87A34-81AB-432B-8DAE-1953F412C126}" type="datetimeFigureOut">
               <a:rPr lang="en-US" dirty="0"/>
-              <a:t>10/28/2020</a:t>
+              <a:t>11/2/2020</a:t>
             </a:fld>
             <a:endParaRPr lang="en-US" dirty="0"/>
           </a:p>
@@ -4589,7 +4595,7 @@
           <a:p>
             <a:fld id="{48A87A34-81AB-432B-8DAE-1953F412C126}" type="datetimeFigureOut">
               <a:rPr lang="en-US" dirty="0"/>
-              <a:t>10/28/2020</a:t>
+              <a:t>11/2/2020</a:t>
             </a:fld>
             <a:endParaRPr lang="en-US" dirty="0"/>
           </a:p>
@@ -4769,7 +4775,7 @@
           <a:p>
             <a:fld id="{48A87A34-81AB-432B-8DAE-1953F412C126}" type="datetimeFigureOut">
               <a:rPr lang="en-US" dirty="0"/>
-              <a:t>10/28/2020</a:t>
+              <a:t>11/2/2020</a:t>
             </a:fld>
             <a:endParaRPr lang="en-US" dirty="0"/>
           </a:p>
@@ -4963,7 +4969,7 @@
           <a:p>
             <a:fld id="{48A87A34-81AB-432B-8DAE-1953F412C126}" type="datetimeFigureOut">
               <a:rPr lang="en-US" dirty="0"/>
-              <a:t>10/28/2020</a:t>
+              <a:t>11/2/2020</a:t>
             </a:fld>
             <a:endParaRPr lang="en-US" dirty="0"/>
           </a:p>
@@ -5510,7 +5516,7 @@
           <a:p>
             <a:fld id="{48A87A34-81AB-432B-8DAE-1953F412C126}" type="datetimeFigureOut">
               <a:rPr lang="en-US" dirty="0"/>
-              <a:t>10/28/2020</a:t>
+              <a:t>11/2/2020</a:t>
             </a:fld>
             <a:endParaRPr lang="en-US" dirty="0"/>
           </a:p>
@@ -5768,7 +5774,7 @@
           <a:p>
             <a:fld id="{48A87A34-81AB-432B-8DAE-1953F412C126}" type="datetimeFigureOut">
               <a:rPr lang="en-US" dirty="0"/>
-              <a:t>10/28/2020</a:t>
+              <a:t>11/2/2020</a:t>
             </a:fld>
             <a:endParaRPr lang="en-US" dirty="0"/>
           </a:p>
@@ -6015,7 +6021,7 @@
           <a:p>
             <a:fld id="{48A87A34-81AB-432B-8DAE-1953F412C126}" type="datetimeFigureOut">
               <a:rPr lang="en-US" dirty="0"/>
-              <a:t>10/28/2020</a:t>
+              <a:t>11/2/2020</a:t>
             </a:fld>
             <a:endParaRPr lang="en-US" dirty="0"/>
           </a:p>
@@ -6398,7 +6404,7 @@
           <a:p>
             <a:fld id="{48A87A34-81AB-432B-8DAE-1953F412C126}" type="datetimeFigureOut">
               <a:rPr lang="en-US" dirty="0"/>
-              <a:t>10/28/2020</a:t>
+              <a:t>11/2/2020</a:t>
             </a:fld>
             <a:endParaRPr lang="en-US" dirty="0"/>
           </a:p>
@@ -6526,7 +6532,7 @@
           <a:p>
             <a:fld id="{48A87A34-81AB-432B-8DAE-1953F412C126}" type="datetimeFigureOut">
               <a:rPr lang="en-US" dirty="0"/>
-              <a:t>10/28/2020</a:t>
+              <a:t>11/2/2020</a:t>
             </a:fld>
             <a:endParaRPr lang="en-US" dirty="0"/>
           </a:p>
@@ -6631,7 +6637,7 @@
           <a:p>
             <a:fld id="{48A87A34-81AB-432B-8DAE-1953F412C126}" type="datetimeFigureOut">
               <a:rPr lang="en-US" dirty="0"/>
-              <a:t>10/28/2020</a:t>
+              <a:t>11/2/2020</a:t>
             </a:fld>
             <a:endParaRPr lang="en-US" dirty="0"/>
           </a:p>
@@ -6891,7 +6897,7 @@
           <a:p>
             <a:fld id="{48A87A34-81AB-432B-8DAE-1953F412C126}" type="datetimeFigureOut">
               <a:rPr lang="en-US" dirty="0"/>
-              <a:t>10/28/2020</a:t>
+              <a:t>11/2/2020</a:t>
             </a:fld>
             <a:endParaRPr lang="en-US" dirty="0"/>
           </a:p>
@@ -7188,7 +7194,7 @@
           <a:p>
             <a:fld id="{48A87A34-81AB-432B-8DAE-1953F412C126}" type="datetimeFigureOut">
               <a:rPr lang="en-US" dirty="0"/>
-              <a:t>10/28/2020</a:t>
+              <a:t>11/2/2020</a:t>
             </a:fld>
             <a:endParaRPr lang="en-US" dirty="0"/>
           </a:p>
@@ -7412,7 +7418,7 @@
             <a:fld id="{48A87A34-81AB-432B-8DAE-1953F412C126}" type="datetimeFigureOut">
               <a:rPr lang="en-US" dirty="0"/>
               <a:pPr/>
-              <a:t>10/28/2020</a:t>
+              <a:t>11/2/2020</a:t>
             </a:fld>
             <a:endParaRPr lang="en-US" dirty="0"/>
           </a:p>
@@ -8013,6 +8019,142 @@
   <p:cSld>
     <p:spTree>
       <p:nvGrpSpPr>
+        <p:cNvPr id="1" name=""/>
+        <p:cNvGrpSpPr/>
+        <p:nvPr/>
+      </p:nvGrpSpPr>
+      <p:grpSpPr>
+        <a:xfrm>
+          <a:off x="0" y="0"/>
+          <a:ext cx="0" cy="0"/>
+          <a:chOff x="0" y="0"/>
+          <a:chExt cx="0" cy="0"/>
+        </a:xfrm>
+      </p:grpSpPr>
+      <p:sp>
+        <p:nvSpPr>
+          <p:cNvPr id="2" name="Title 1">
+            <a:extLst>
+              <a:ext uri="{FF2B5EF4-FFF2-40B4-BE49-F238E27FC236}">
+                <a16:creationId xmlns:a16="http://schemas.microsoft.com/office/drawing/2014/main" id="{0DBAE1D3-2670-465F-A867-905D15C6CF52}"/>
+              </a:ext>
+            </a:extLst>
+          </p:cNvPr>
+          <p:cNvSpPr>
+            <a:spLocks noGrp="1"/>
+          </p:cNvSpPr>
+          <p:nvPr>
+            <p:ph type="title"/>
+          </p:nvPr>
+        </p:nvSpPr>
+        <p:spPr/>
+        <p:txBody>
+          <a:bodyPr/>
+          <a:lstStyle/>
+          <a:p>
+            <a:r>
+              <a:rPr lang="en-US" dirty="0"/>
+              <a:t>Grading Scheme</a:t>
+            </a:r>
+          </a:p>
+        </p:txBody>
+      </p:sp>
+      <p:sp>
+        <p:nvSpPr>
+          <p:cNvPr id="3" name="Text Placeholder 2">
+            <a:extLst>
+              <a:ext uri="{FF2B5EF4-FFF2-40B4-BE49-F238E27FC236}">
+                <a16:creationId xmlns:a16="http://schemas.microsoft.com/office/drawing/2014/main" id="{4281DA53-9098-4B05-B372-7F418EBBA41F}"/>
+              </a:ext>
+            </a:extLst>
+          </p:cNvPr>
+          <p:cNvSpPr>
+            <a:spLocks noGrp="1"/>
+          </p:cNvSpPr>
+          <p:nvPr>
+            <p:ph type="body" idx="1"/>
+          </p:nvPr>
+        </p:nvSpPr>
+        <p:spPr>
+          <a:xfrm>
+            <a:off x="2429435" y="1161440"/>
+            <a:ext cx="5360893" cy="3416400"/>
+          </a:xfrm>
+        </p:spPr>
+        <p:txBody>
+          <a:bodyPr/>
+          <a:lstStyle/>
+          <a:p>
+            <a:r>
+              <a:rPr lang="en-US" sz="1800" dirty="0"/>
+              <a:t>Final Presentation: 10%</a:t>
+            </a:r>
+          </a:p>
+          <a:p>
+            <a:r>
+              <a:rPr lang="en-US" sz="1800" dirty="0"/>
+              <a:t>Report: 10%</a:t>
+            </a:r>
+          </a:p>
+          <a:p>
+            <a:r>
+              <a:rPr lang="en-US" sz="1800" dirty="0"/>
+              <a:t>Test cases: 10%</a:t>
+            </a:r>
+          </a:p>
+          <a:p>
+            <a:r>
+              <a:rPr lang="en-US" sz="1800" dirty="0"/>
+              <a:t>PC Executable: 20%</a:t>
+            </a:r>
+          </a:p>
+          <a:p>
+            <a:r>
+              <a:rPr lang="en-US" sz="1800" dirty="0"/>
+              <a:t>Mobile integration: 20%</a:t>
+            </a:r>
+          </a:p>
+          <a:p>
+            <a:r>
+              <a:rPr lang="en-US" sz="1800" dirty="0"/>
+              <a:t>Database Implementation: 10%</a:t>
+            </a:r>
+          </a:p>
+          <a:p>
+            <a:r>
+              <a:rPr lang="en-US" sz="1800" dirty="0"/>
+              <a:t>UI for IOS: 20%</a:t>
+            </a:r>
+          </a:p>
+          <a:p>
+            <a:endParaRPr lang="en-US" dirty="0"/>
+          </a:p>
+          <a:p>
+            <a:endParaRPr lang="en-US" dirty="0"/>
+          </a:p>
+          <a:p>
+            <a:endParaRPr lang="en-US" dirty="0"/>
+          </a:p>
+        </p:txBody>
+      </p:sp>
+    </p:spTree>
+    <p:extLst>
+      <p:ext uri="{BB962C8B-B14F-4D97-AF65-F5344CB8AC3E}">
+        <p14:creationId xmlns:p14="http://schemas.microsoft.com/office/powerpoint/2010/main" val="740749005"/>
+      </p:ext>
+    </p:extLst>
+  </p:cSld>
+  <p:clrMapOvr>
+    <a:masterClrMapping/>
+  </p:clrMapOvr>
+</p:sld>
+</file>
+
+<file path=ppt/slides/slide11.xml><?xml version="1.0" encoding="utf-8"?>
+<p:sld xmlns:a="http://schemas.openxmlformats.org/drawingml/2006/main" xmlns:r="http://schemas.openxmlformats.org/officeDocument/2006/relationships" xmlns:p="http://schemas.openxmlformats.org/presentationml/2006/main">
+  <p:cSld>
+    <p:spTree>
+      <p:nvGrpSpPr>
         <p:cNvPr id="1" name="Shape 237"/>
         <p:cNvGrpSpPr/>
         <p:nvPr/>
@@ -8046,7 +8188,7 @@
           </a:bodyPr>
           <a:lstStyle/>
           <a:p>
-            <a:pPr marL="0" lvl="0" indent="0" algn="l" rtl="0">
+            <a:pPr marL="0" lvl="0" indent="0" rtl="0">
               <a:spcBef>
                 <a:spcPts val="0"/>
               </a:spcBef>
@@ -8056,10 +8198,10 @@
               <a:buNone/>
             </a:pPr>
             <a:r>
-              <a:rPr lang="en"/>
+              <a:rPr lang="en" dirty="0"/>
               <a:t>Deliverables</a:t>
             </a:r>
-            <a:endParaRPr/>
+            <a:endParaRPr dirty="0"/>
           </a:p>
         </p:txBody>
       </p:sp>
@@ -8084,7 +8226,118 @@
           <a:bodyPr/>
           <a:lstStyle/>
           <a:p>
-            <a:endParaRPr lang="en-US"/>
+            <a:pPr algn="l"/>
+            <a:r>
+              <a:rPr lang="en-US" sz="1200" b="0" i="0" dirty="0">
+                <a:effectLst/>
+              </a:rPr>
+              <a:t>original proposal and presentation file(s) (from CSC 520)</a:t>
+            </a:r>
+          </a:p>
+          <a:p>
+            <a:pPr algn="l"/>
+            <a:r>
+              <a:rPr lang="en-US" sz="1200" b="0" i="0" dirty="0">
+                <a:effectLst/>
+              </a:rPr>
+              <a:t>amendments to the proposal (approved by the project supervisor)</a:t>
+            </a:r>
+          </a:p>
+          <a:p>
+            <a:pPr algn="l"/>
+            <a:r>
+              <a:rPr lang="en-US" sz="1200" b="0" i="0" dirty="0">
+                <a:effectLst/>
+              </a:rPr>
+              <a:t>system architecture diagram(s) (UML, DFD context, etc.), enhanced with details determined during implementation appropriately commented source code</a:t>
+            </a:r>
+          </a:p>
+          <a:p>
+            <a:pPr algn="l"/>
+            <a:r>
+              <a:rPr lang="en-US" sz="1200" b="0" i="0" dirty="0">
+                <a:effectLst/>
+              </a:rPr>
+              <a:t>documentation of project functionality (test results, screenshots, video capture of project execution, etc.) </a:t>
+            </a:r>
+          </a:p>
+          <a:p>
+            <a:pPr algn="l"/>
+            <a:r>
+              <a:rPr lang="en-US" sz="1200" b="0" i="0" dirty="0">
+                <a:effectLst/>
+              </a:rPr>
+              <a:t>sample output (screen shots and/or reports)</a:t>
+            </a:r>
+          </a:p>
+          <a:p>
+            <a:pPr algn="l"/>
+            <a:r>
+              <a:rPr lang="en-US" sz="1200" b="0" i="0" dirty="0">
+                <a:effectLst/>
+              </a:rPr>
+              <a:t>executables and/or projects</a:t>
+            </a:r>
+          </a:p>
+          <a:p>
+            <a:pPr algn="l"/>
+            <a:r>
+              <a:rPr lang="en-US" sz="1200" b="0" i="0" dirty="0">
+                <a:effectLst/>
+              </a:rPr>
+              <a:t>presentation documents (used to support the presentation of the completed CSC 521 project), including any presentation file(s)</a:t>
+            </a:r>
+          </a:p>
+          <a:p>
+            <a:pPr algn="l"/>
+            <a:r>
+              <a:rPr lang="en-US" sz="1200" b="0" i="0" dirty="0">
+                <a:effectLst/>
+              </a:rPr>
+              <a:t>project journal: a narrative of the progress of the project, in clear, concise English, including any problems encountered and how said problems were addressed</a:t>
+            </a:r>
+          </a:p>
+          <a:p>
+            <a:pPr algn="l"/>
+            <a:r>
+              <a:rPr lang="en-US" sz="1200" b="0" i="0" dirty="0">
+                <a:effectLst/>
+              </a:rPr>
+              <a:t>project post mortem: a summary of what was learned from the project and (based on that experience) discussion of how various aspects of the project might have been approached differently</a:t>
+            </a:r>
+          </a:p>
+          <a:p>
+            <a:pPr algn="l"/>
+            <a:r>
+              <a:rPr lang="en-US" sz="1200" b="0" i="0" dirty="0">
+                <a:effectLst/>
+              </a:rPr>
+              <a:t>a list of what areas of the proposal (if any) were not completed, including reasons why </a:t>
+            </a:r>
+          </a:p>
+          <a:p>
+            <a:pPr algn="l"/>
+            <a:r>
+              <a:rPr lang="en-US" sz="1200" b="0" i="0" dirty="0">
+                <a:effectLst/>
+              </a:rPr>
+              <a:t>presentation of the completed project (PowerPoint format), including screenshots of the functioning project</a:t>
+            </a:r>
+          </a:p>
+          <a:p>
+            <a:pPr algn="l"/>
+            <a:r>
+              <a:rPr lang="en-US" sz="1200" b="0" i="0" dirty="0">
+                <a:effectLst/>
+              </a:rPr>
+              <a:t>user's manual</a:t>
+            </a:r>
+          </a:p>
+          <a:p>
+            <a:pPr marL="114300" indent="0">
+              <a:buNone/>
+            </a:pPr>
+            <a:endParaRPr lang="en-US" dirty="0"/>
           </a:p>
         </p:txBody>
       </p:sp>
@@ -8096,7 +8349,7 @@
 </p:sld>
 </file>
 
-<file path=ppt/slides/slide11.xml><?xml version="1.0" encoding="utf-8"?>
+<file path=ppt/slides/slide12.xml><?xml version="1.0" encoding="utf-8"?>
 <p:sld xmlns:a="http://schemas.openxmlformats.org/drawingml/2006/main" xmlns:r="http://schemas.openxmlformats.org/officeDocument/2006/relationships" xmlns:p="http://schemas.openxmlformats.org/presentationml/2006/main">
   <p:cSld>
     <p:spTree>
@@ -8201,7 +8454,7 @@
           </a:bodyPr>
           <a:lstStyle/>
           <a:p>
-            <a:pPr marL="0" lvl="0" indent="0" algn="l" rtl="0">
+            <a:pPr marL="0" lvl="0" indent="0" rtl="0">
               <a:spcBef>
                 <a:spcPts val="0"/>
               </a:spcBef>
@@ -8211,10 +8464,10 @@
               <a:buNone/>
             </a:pPr>
             <a:r>
-              <a:rPr lang="en"/>
+              <a:rPr lang="en" dirty="0"/>
               <a:t>Overview</a:t>
             </a:r>
-            <a:endParaRPr/>
+            <a:endParaRPr dirty="0"/>
           </a:p>
         </p:txBody>
       </p:sp>
@@ -8409,7 +8662,7 @@
           </a:bodyPr>
           <a:lstStyle/>
           <a:p>
-            <a:pPr marL="0" lvl="0" indent="0" algn="l" rtl="0">
+            <a:pPr marL="0" lvl="0" indent="0" rtl="0">
               <a:spcBef>
                 <a:spcPts val="0"/>
               </a:spcBef>
@@ -8419,10 +8672,10 @@
               <a:buNone/>
             </a:pPr>
             <a:r>
-              <a:rPr lang="en"/>
+              <a:rPr lang="en" dirty="0"/>
               <a:t>Objectives</a:t>
             </a:r>
-            <a:endParaRPr/>
+            <a:endParaRPr dirty="0"/>
           </a:p>
         </p:txBody>
       </p:sp>
@@ -8595,7 +8848,7 @@
           </a:bodyPr>
           <a:lstStyle/>
           <a:p>
-            <a:pPr marL="0" lvl="0" indent="0" algn="l" rtl="0">
+            <a:pPr marL="0" lvl="0" indent="0" rtl="0">
               <a:spcBef>
                 <a:spcPts val="0"/>
               </a:spcBef>
@@ -8605,10 +8858,10 @@
               <a:buNone/>
             </a:pPr>
             <a:r>
-              <a:rPr lang="en"/>
+              <a:rPr lang="en" dirty="0"/>
               <a:t>Problem Specifications</a:t>
             </a:r>
-            <a:endParaRPr/>
+            <a:endParaRPr dirty="0"/>
           </a:p>
         </p:txBody>
       </p:sp>
@@ -8658,7 +8911,7 @@
             </a:pPr>
             <a:r>
               <a:rPr lang="en-US" dirty="0"/>
-              <a:t>Lost track of cards quickly</a:t>
+              <a:t>Board Games created clutter (small living space)</a:t>
             </a:r>
           </a:p>
           <a:p>
@@ -8671,7 +8924,7 @@
             </a:pPr>
             <a:r>
               <a:rPr lang="en-US" dirty="0"/>
-              <a:t>Pet kept making a mess of the piles</a:t>
+              <a:t>Lost track of cards quickly</a:t>
             </a:r>
           </a:p>
           <a:p>
@@ -8684,7 +8937,33 @@
             </a:pPr>
             <a:r>
               <a:rPr lang="en-US" dirty="0"/>
+              <a:t>Pet kept making a mess of the piles</a:t>
+            </a:r>
+          </a:p>
+          <a:p>
+            <a:pPr lvl="1" indent="-342900">
+              <a:spcBef>
+                <a:spcPts val="0"/>
+              </a:spcBef>
+              <a:buSzPts val="1800"/>
+              <a:buChar char="-"/>
+            </a:pPr>
+            <a:r>
+              <a:rPr lang="en-US" dirty="0"/>
               <a:t>Reshuffling and replaying games became annoying</a:t>
+            </a:r>
+          </a:p>
+          <a:p>
+            <a:pPr lvl="1" indent="-342900">
+              <a:spcBef>
+                <a:spcPts val="0"/>
+              </a:spcBef>
+              <a:buSzPts val="1800"/>
+              <a:buChar char="-"/>
+            </a:pPr>
+            <a:r>
+              <a:rPr lang="en-US" dirty="0"/>
+              <a:t>Downloading various games became a potential solution</a:t>
             </a:r>
           </a:p>
           <a:p>
@@ -8761,7 +9040,7 @@
           </a:bodyPr>
           <a:lstStyle/>
           <a:p>
-            <a:pPr marL="0" lvl="0" indent="0" algn="l" rtl="0">
+            <a:pPr marL="0" lvl="0" indent="0" rtl="0">
               <a:spcBef>
                 <a:spcPts val="0"/>
               </a:spcBef>
@@ -8771,10 +9050,10 @@
               <a:buNone/>
             </a:pPr>
             <a:r>
-              <a:rPr lang="en"/>
+              <a:rPr lang="en" dirty="0"/>
               <a:t>Problem Specifications cont...</a:t>
             </a:r>
-            <a:endParaRPr/>
+            <a:endParaRPr dirty="0"/>
           </a:p>
         </p:txBody>
       </p:sp>
@@ -8868,6 +9147,19 @@
             <a:r>
               <a:rPr lang="en" dirty="0"/>
               <a:t>rack their performance via a Highscore</a:t>
+            </a:r>
+          </a:p>
+          <a:p>
+            <a:pPr lvl="1" indent="-342900">
+              <a:spcBef>
+                <a:spcPts val="0"/>
+              </a:spcBef>
+              <a:buSzPts val="1800"/>
+              <a:buChar char="-"/>
+            </a:pPr>
+            <a:r>
+              <a:rPr lang="en" dirty="0"/>
+              <a:t>Use Anywhere at anytime through IOS device</a:t>
             </a:r>
           </a:p>
           <a:p>
@@ -8951,10 +9243,10 @@
       </p:sp>
       <p:pic>
         <p:nvPicPr>
-          <p:cNvPr id="2" name="Picture 1">
+          <p:cNvPr id="3" name="Picture 2">
             <a:extLst>
               <a:ext uri="{FF2B5EF4-FFF2-40B4-BE49-F238E27FC236}">
-                <a16:creationId xmlns:a16="http://schemas.microsoft.com/office/drawing/2014/main" id="{A869421E-6651-49C4-B4FB-0BDF8A3CDDCF}"/>
+                <a16:creationId xmlns:a16="http://schemas.microsoft.com/office/drawing/2014/main" id="{8F4E9681-FCBD-4114-804A-6877E868E2AB}"/>
               </a:ext>
             </a:extLst>
           </p:cNvPr>
@@ -8971,8 +9263,8 @@
         </p:blipFill>
         <p:spPr>
           <a:xfrm>
-            <a:off x="4302717" y="0"/>
-            <a:ext cx="4841283" cy="5143500"/>
+            <a:off x="4149328" y="0"/>
+            <a:ext cx="4994672" cy="5143500"/>
           </a:xfrm>
           <a:prstGeom prst="rect">
             <a:avLst/>
@@ -8992,7 +9284,7 @@
   <p:cSld>
     <p:spTree>
       <p:nvGrpSpPr>
-        <p:cNvPr id="1" name="Shape 108"/>
+        <p:cNvPr id="1" name="Shape 96"/>
         <p:cNvGrpSpPr/>
         <p:nvPr/>
       </p:nvGrpSpPr>
@@ -9006,7 +9298,7 @@
       </p:grpSpPr>
       <p:sp>
         <p:nvSpPr>
-          <p:cNvPr id="109" name="Google Shape;109;p21"/>
+          <p:cNvPr id="97" name="Google Shape;97;p19"/>
           <p:cNvSpPr txBox="1">
             <a:spLocks noGrp="1"/>
           </p:cNvSpPr>
@@ -9015,6 +9307,10 @@
           </p:nvPr>
         </p:nvSpPr>
         <p:spPr>
+          <a:xfrm>
+            <a:off x="321474" y="445025"/>
+            <a:ext cx="3647021" cy="572700"/>
+          </a:xfrm>
           <a:prstGeom prst="rect">
             <a:avLst/>
           </a:prstGeom>
@@ -9036,13 +9332,55 @@
             </a:pPr>
             <a:r>
               <a:rPr lang="en" dirty="0"/>
-              <a:t>Database Design </a:t>
+              <a:t>Solution Design:UML/UI/</a:t>
+            </a:r>
+            <a:br>
+              <a:rPr lang="en" dirty="0"/>
+            </a:br>
+            <a:r>
+              <a:rPr lang="en" dirty="0"/>
+              <a:t>SQL Database Design (Preliminary and subject to change upon implementation)</a:t>
             </a:r>
             <a:endParaRPr dirty="0"/>
           </a:p>
         </p:txBody>
       </p:sp>
+      <p:pic>
+        <p:nvPicPr>
+          <p:cNvPr id="5" name="Picture 4">
+            <a:extLst>
+              <a:ext uri="{FF2B5EF4-FFF2-40B4-BE49-F238E27FC236}">
+                <a16:creationId xmlns:a16="http://schemas.microsoft.com/office/drawing/2014/main" id="{1D1E90BC-BE63-48F5-A097-96198FCD8D6C}"/>
+              </a:ext>
+            </a:extLst>
+          </p:cNvPr>
+          <p:cNvPicPr>
+            <a:picLocks noChangeAspect="1"/>
+          </p:cNvPicPr>
+          <p:nvPr/>
+        </p:nvPicPr>
+        <p:blipFill>
+          <a:blip r:embed="rId3"/>
+          <a:stretch>
+            <a:fillRect/>
+          </a:stretch>
+        </p:blipFill>
+        <p:spPr>
+          <a:xfrm>
+            <a:off x="4191303" y="0"/>
+            <a:ext cx="4958247" cy="5143500"/>
+          </a:xfrm>
+          <a:prstGeom prst="rect">
+            <a:avLst/>
+          </a:prstGeom>
+        </p:spPr>
+      </p:pic>
     </p:spTree>
+    <p:extLst>
+      <p:ext uri="{BB962C8B-B14F-4D97-AF65-F5344CB8AC3E}">
+        <p14:creationId xmlns:p14="http://schemas.microsoft.com/office/powerpoint/2010/main" val="1159490155"/>
+      </p:ext>
+    </p:extLst>
   </p:cSld>
   <p:clrMapOvr>
     <a:masterClrMapping/>
@@ -9088,7 +9426,7 @@
           </a:bodyPr>
           <a:lstStyle/>
           <a:p>
-            <a:pPr marL="0" lvl="0" indent="0" algn="l" rtl="0">
+            <a:pPr marL="0" lvl="0" indent="0" rtl="0">
               <a:spcBef>
                 <a:spcPts val="0"/>
               </a:spcBef>
@@ -9098,10 +9436,10 @@
               <a:buNone/>
             </a:pPr>
             <a:r>
-              <a:rPr lang="en"/>
+              <a:rPr lang="en" dirty="0"/>
               <a:t>Tools List</a:t>
             </a:r>
-            <a:endParaRPr/>
+            <a:endParaRPr dirty="0"/>
           </a:p>
         </p:txBody>
       </p:sp>
@@ -9295,34 +9633,7 @@
                 <a:cs typeface="Times New Roman"/>
                 <a:sym typeface="Times New Roman"/>
               </a:rPr>
-              <a:t>Firebase </a:t>
-            </a:r>
-            <a:r>
-              <a:rPr lang="en-US" sz="1100" dirty="0" err="1">
-                <a:latin typeface="Times New Roman"/>
-                <a:ea typeface="Times New Roman"/>
-                <a:cs typeface="Times New Roman"/>
-                <a:sym typeface="Times New Roman"/>
-              </a:rPr>
-              <a:t>Firestore</a:t>
-            </a:r>
-            <a:r>
-              <a:rPr lang="en-US" sz="1100" dirty="0">
-                <a:latin typeface="Times New Roman"/>
-                <a:ea typeface="Times New Roman"/>
-                <a:cs typeface="Times New Roman"/>
-                <a:sym typeface="Times New Roman"/>
-              </a:rPr>
-              <a:t> - </a:t>
-            </a:r>
-            <a:r>
-              <a:rPr lang="en-US" sz="1100" dirty="0" err="1">
-                <a:latin typeface="Times New Roman"/>
-                <a:ea typeface="Times New Roman"/>
-                <a:cs typeface="Times New Roman"/>
-                <a:sym typeface="Times New Roman"/>
-              </a:rPr>
-              <a:t>noSQL</a:t>
+              <a:t>Core Data (Apple local iOS storage framework)</a:t>
             </a:r>
             <a:endParaRPr sz="1100" dirty="0">
               <a:latin typeface="Times New Roman"/>
@@ -9386,37 +9697,6 @@
               </a:rPr>
               <a:t>iOS device </a:t>
             </a:r>
-          </a:p>
-          <a:p>
-            <a:pPr marL="457200" lvl="0" indent="-298450" algn="l" rtl="0">
-              <a:spcBef>
-                <a:spcPts val="0"/>
-              </a:spcBef>
-              <a:spcAft>
-                <a:spcPts val="0"/>
-              </a:spcAft>
-              <a:buClr>
-                <a:srgbClr val="FFFFFF"/>
-              </a:buClr>
-              <a:buSzPts val="1100"/>
-              <a:buFont typeface="Times New Roman"/>
-              <a:buChar char="●"/>
-            </a:pPr>
-            <a:r>
-              <a:rPr lang="en" sz="1100" dirty="0">
-                <a:latin typeface="Times New Roman"/>
-                <a:ea typeface="Times New Roman"/>
-                <a:cs typeface="Times New Roman"/>
-                <a:sym typeface="Times New Roman"/>
-              </a:rPr>
-              <a:t>Photoshop/Illustrator</a:t>
-            </a:r>
-            <a:endParaRPr sz="1100" dirty="0">
-              <a:latin typeface="Times New Roman"/>
-              <a:ea typeface="Times New Roman"/>
-              <a:cs typeface="Times New Roman"/>
-              <a:sym typeface="Times New Roman"/>
-            </a:endParaRPr>
           </a:p>
           <a:p>
             <a:pPr marL="0" lvl="0" indent="0" algn="l" rtl="0">
@@ -9478,7 +9758,7 @@
           </a:bodyPr>
           <a:lstStyle/>
           <a:p>
-            <a:pPr marL="0" lvl="0" indent="0" algn="l" rtl="0">
+            <a:pPr marL="0" lvl="0" indent="0" rtl="0">
               <a:spcBef>
                 <a:spcPts val="0"/>
               </a:spcBef>
@@ -9488,10 +9768,10 @@
               <a:buNone/>
             </a:pPr>
             <a:r>
-              <a:rPr lang="en"/>
+              <a:rPr lang="en" dirty="0"/>
               <a:t>Time Schedule: Proposed</a:t>
             </a:r>
-            <a:endParaRPr/>
+            <a:endParaRPr dirty="0"/>
           </a:p>
         </p:txBody>
       </p:sp>
@@ -9590,7 +9870,7 @@
                   <a:cs typeface="Roboto"/>
                   <a:sym typeface="Roboto"/>
                 </a:rPr>
-                <a:t>Weeks 1-2</a:t>
+                <a:t>Weeks 1-4</a:t>
               </a:r>
               <a:endParaRPr sz="800" dirty="0">
                 <a:solidFill>
@@ -9832,7 +10112,7 @@
                 <a:buNone/>
               </a:pPr>
               <a:r>
-                <a:rPr lang="en" sz="800">
+                <a:rPr lang="en" sz="800" dirty="0">
                   <a:solidFill>
                     <a:srgbClr val="858585"/>
                   </a:solidFill>
@@ -9841,9 +10121,9 @@
                   <a:cs typeface="Roboto"/>
                   <a:sym typeface="Roboto"/>
                 </a:rPr>
-                <a:t>Weeks 3-7</a:t>
+                <a:t>Weeks 4-8</a:t>
               </a:r>
-              <a:endParaRPr sz="800">
+              <a:endParaRPr sz="800" dirty="0">
                 <a:solidFill>
                   <a:srgbClr val="858585"/>
                 </a:solidFill>
@@ -10083,7 +10363,7 @@
                 <a:buNone/>
               </a:pPr>
               <a:r>
-                <a:rPr lang="en" sz="800">
+                <a:rPr lang="en" sz="800" dirty="0">
                   <a:solidFill>
                     <a:srgbClr val="858585"/>
                   </a:solidFill>
@@ -10092,9 +10372,9 @@
                   <a:cs typeface="Roboto"/>
                   <a:sym typeface="Roboto"/>
                 </a:rPr>
-                <a:t>Weeks 8-10</a:t>
+                <a:t>Weeks 8-11</a:t>
               </a:r>
-              <a:endParaRPr sz="800">
+              <a:endParaRPr sz="800" dirty="0">
                 <a:solidFill>
                   <a:srgbClr val="858585"/>
                 </a:solidFill>
@@ -10334,7 +10614,7 @@
                 <a:buNone/>
               </a:pPr>
               <a:r>
-                <a:rPr lang="en" sz="800">
+                <a:rPr lang="en" sz="800" dirty="0">
                   <a:solidFill>
                     <a:srgbClr val="858585"/>
                   </a:solidFill>
@@ -10343,9 +10623,9 @@
                   <a:cs typeface="Roboto"/>
                   <a:sym typeface="Roboto"/>
                 </a:rPr>
-                <a:t>Weeks 10-12</a:t>
+                <a:t>Weeks 11-12</a:t>
               </a:r>
-              <a:endParaRPr sz="800">
+              <a:endParaRPr sz="800" dirty="0">
                 <a:solidFill>
                   <a:srgbClr val="858585"/>
                 </a:solidFill>

</xml_diff>

<commit_message>
completed word document Proposal
</commit_message>
<xml_diff>
--- a/CSC_520_Devils_Grip.pptx
+++ b/CSC_520_Devils_Grip.pptx
@@ -8111,7 +8111,7 @@
           <a:p>
             <a:r>
               <a:rPr lang="en-US" sz="1800" dirty="0"/>
-              <a:t>Mobile integration: 20%</a:t>
+              <a:t>Mac integration/IOS App: 20%</a:t>
             </a:r>
           </a:p>
           <a:p>
@@ -8249,7 +8249,16 @@
               <a:rPr lang="en-US" sz="1200" b="0" i="0" dirty="0">
                 <a:effectLst/>
               </a:rPr>
-              <a:t>system architecture diagram(s) (UML, DFD context, etc.), enhanced with details determined during implementation appropriately commented source code</a:t>
+              <a:t>system architecture diagram(s) (UML, DFD context, etc.), enhanced with details determined during implementation </a:t>
+            </a:r>
+          </a:p>
+          <a:p>
+            <a:pPr algn="l"/>
+            <a:r>
+              <a:rPr lang="en-US" sz="1200" b="0" i="0" dirty="0">
+                <a:effectLst/>
+              </a:rPr>
+              <a:t>appropriately commented source code</a:t>
             </a:r>
           </a:p>
           <a:p>
@@ -9618,6 +9627,31 @@
             </a:r>
           </a:p>
           <a:p>
+            <a:pPr marL="457200" lvl="0" indent="-298450" algn="l" rtl="0">
+              <a:spcBef>
+                <a:spcPts val="0"/>
+              </a:spcBef>
+              <a:spcAft>
+                <a:spcPts val="0"/>
+              </a:spcAft>
+              <a:buClr>
+                <a:srgbClr val="FFFFFF"/>
+              </a:buClr>
+              <a:buSzPts val="1100"/>
+              <a:buFont typeface="Times New Roman"/>
+              <a:buChar char="●"/>
+            </a:pPr>
+            <a:r>
+              <a:rPr lang="en-US" sz="1100" dirty="0">
+                <a:latin typeface="Times New Roman"/>
+                <a:ea typeface="Times New Roman"/>
+                <a:cs typeface="Times New Roman"/>
+                <a:sym typeface="Times New Roman"/>
+              </a:rPr>
+              <a:t>Rocket Data</a:t>
+            </a:r>
+          </a:p>
+          <a:p>
             <a:pPr indent="-298450">
               <a:buClr>
                 <a:srgbClr val="FFFFFF"/>
@@ -9696,6 +9730,56 @@
                 <a:sym typeface="Times New Roman"/>
               </a:rPr>
               <a:t>iOS device </a:t>
+            </a:r>
+          </a:p>
+          <a:p>
+            <a:pPr marL="457200" lvl="0" indent="-298450" algn="l" rtl="0">
+              <a:spcBef>
+                <a:spcPts val="0"/>
+              </a:spcBef>
+              <a:spcAft>
+                <a:spcPts val="0"/>
+              </a:spcAft>
+              <a:buClr>
+                <a:srgbClr val="FFFFFF"/>
+              </a:buClr>
+              <a:buSzPts val="1100"/>
+              <a:buFont typeface="Times New Roman"/>
+              <a:buChar char="●"/>
+            </a:pPr>
+            <a:r>
+              <a:rPr lang="en" sz="1100" dirty="0">
+                <a:latin typeface="Times New Roman"/>
+                <a:ea typeface="Times New Roman"/>
+                <a:cs typeface="Times New Roman"/>
+                <a:sym typeface="Times New Roman"/>
+              </a:rPr>
+              <a:t>Windows PC</a:t>
+            </a:r>
+          </a:p>
+          <a:p>
+            <a:pPr marL="457200" lvl="0" indent="-298450" algn="l" rtl="0">
+              <a:spcBef>
+                <a:spcPts val="0"/>
+              </a:spcBef>
+              <a:spcAft>
+                <a:spcPts val="0"/>
+              </a:spcAft>
+              <a:buClr>
+                <a:srgbClr val="FFFFFF"/>
+              </a:buClr>
+              <a:buSzPts val="1100"/>
+              <a:buFont typeface="Times New Roman"/>
+              <a:buChar char="●"/>
+            </a:pPr>
+            <a:r>
+              <a:rPr lang="en" sz="1100" dirty="0">
+                <a:latin typeface="Times New Roman"/>
+                <a:ea typeface="Times New Roman"/>
+                <a:cs typeface="Times New Roman"/>
+                <a:sym typeface="Times New Roman"/>
+              </a:rPr>
+              <a:t>Mac</a:t>
             </a:r>
           </a:p>
           <a:p>
@@ -10069,9 +10153,9 @@
         <p:grpSpPr>
           <a:xfrm>
             <a:off x="1995076" y="1751263"/>
-            <a:ext cx="1356358" cy="1675683"/>
+            <a:ext cx="1356358" cy="1513366"/>
             <a:chOff x="1083025" y="1574026"/>
-            <a:chExt cx="1834900" cy="2267193"/>
+            <a:chExt cx="1834900" cy="2047579"/>
           </a:xfrm>
         </p:grpSpPr>
         <p:sp>
@@ -10143,8 +10227,8 @@
           </p:nvSpPr>
           <p:spPr>
             <a:xfrm>
-              <a:off x="1296525" y="3394820"/>
-              <a:ext cx="1505100" cy="446399"/>
+              <a:off x="1290038" y="3175205"/>
+              <a:ext cx="1505100" cy="446400"/>
             </a:xfrm>
             <a:prstGeom prst="rect">
               <a:avLst/>
@@ -10173,7 +10257,7 @@
                 <a:buNone/>
               </a:pPr>
               <a:r>
-                <a:rPr lang="en" sz="1000" b="1" dirty="0">
+                <a:rPr lang="en-US" sz="1000" b="1" dirty="0">
                   <a:solidFill>
                     <a:srgbClr val="858585"/>
                   </a:solidFill>
@@ -10182,7 +10266,7 @@
                   <a:cs typeface="Roboto"/>
                   <a:sym typeface="Roboto"/>
                 </a:rPr>
-                <a:t>Backend Implementation/ integration with Unity</a:t>
+                <a:t>Integration with XCode/UI Development</a:t>
               </a:r>
               <a:endParaRPr sz="1000" b="1" dirty="0">
                 <a:solidFill>
@@ -10564,28 +10648,28 @@
       </p:grpSp>
       <p:grpSp>
         <p:nvGrpSpPr>
-          <p:cNvPr id="144" name="Google Shape;144;p23"/>
+          <p:cNvPr id="151" name="Google Shape;151;p23"/>
           <p:cNvGrpSpPr/>
           <p:nvPr/>
         </p:nvGrpSpPr>
         <p:grpSpPr>
           <a:xfrm>
-            <a:off x="4526987" y="1751262"/>
-            <a:ext cx="1356358" cy="1331170"/>
-            <a:chOff x="1083025" y="1574038"/>
-            <a:chExt cx="1834900" cy="1801070"/>
+            <a:off x="4526265" y="1778551"/>
+            <a:ext cx="1553829" cy="1464268"/>
+            <a:chOff x="1083025" y="1610936"/>
+            <a:chExt cx="1834900" cy="1981149"/>
           </a:xfrm>
         </p:grpSpPr>
         <p:sp>
           <p:nvSpPr>
-            <p:cNvPr id="145" name="Google Shape;145;p23"/>
+            <p:cNvPr id="152" name="Google Shape;152;p23"/>
             <p:cNvSpPr txBox="1"/>
             <p:nvPr/>
           </p:nvSpPr>
           <p:spPr>
             <a:xfrm>
-              <a:off x="1510092" y="1574038"/>
-              <a:ext cx="718500" cy="241200"/>
+              <a:off x="1176727" y="1610936"/>
+              <a:ext cx="889082" cy="241200"/>
             </a:xfrm>
             <a:prstGeom prst="rect">
               <a:avLst/>
@@ -10623,7 +10707,7 @@
                   <a:cs typeface="Roboto"/>
                   <a:sym typeface="Roboto"/>
                 </a:rPr>
-                <a:t>Weeks 11-12</a:t>
+                <a:t>Weeks 11-13</a:t>
               </a:r>
               <a:endParaRPr sz="800" dirty="0">
                 <a:solidFill>
@@ -10639,13 +10723,13 @@
         </p:sp>
         <p:sp>
           <p:nvSpPr>
-            <p:cNvPr id="146" name="Google Shape;146;p23"/>
+            <p:cNvPr id="153" name="Google Shape;153;p23"/>
             <p:cNvSpPr txBox="1"/>
             <p:nvPr/>
           </p:nvSpPr>
           <p:spPr>
             <a:xfrm>
-              <a:off x="1302998" y="2928708"/>
+              <a:off x="1209335" y="3145685"/>
               <a:ext cx="1505100" cy="446400"/>
             </a:xfrm>
             <a:prstGeom prst="rect">
@@ -10675,7 +10759,7 @@
                 <a:buNone/>
               </a:pPr>
               <a:r>
-                <a:rPr lang="en" sz="1000" b="1" dirty="0">
+                <a:rPr lang="en-US" sz="1000" b="1" dirty="0">
                   <a:solidFill>
                     <a:srgbClr val="858585"/>
                   </a:solidFill>
@@ -10684,247 +10768,8 @@
                   <a:cs typeface="Roboto"/>
                   <a:sym typeface="Roboto"/>
                 </a:rPr>
-                <a:t>Bug fixes &amp; Export to IOS</a:t>
+                <a:t>B</a:t>
               </a:r>
-              <a:endParaRPr sz="1000" b="1" dirty="0">
-                <a:solidFill>
-                  <a:srgbClr val="858585"/>
-                </a:solidFill>
-                <a:latin typeface="Roboto"/>
-                <a:ea typeface="Roboto"/>
-                <a:cs typeface="Roboto"/>
-                <a:sym typeface="Roboto"/>
-              </a:endParaRPr>
-            </a:p>
-          </p:txBody>
-        </p:sp>
-        <p:cxnSp>
-          <p:nvCxnSpPr>
-            <p:cNvPr id="148" name="Google Shape;148;p23"/>
-            <p:cNvCxnSpPr/>
-            <p:nvPr/>
-          </p:nvCxnSpPr>
-          <p:spPr>
-            <a:xfrm>
-              <a:off x="2180202" y="1695421"/>
-              <a:ext cx="718500" cy="741900"/>
-            </a:xfrm>
-            <a:prstGeom prst="straightConnector1">
-              <a:avLst/>
-            </a:prstGeom>
-            <a:noFill/>
-            <a:ln w="9525" cap="flat" cmpd="sng">
-              <a:solidFill>
-                <a:srgbClr val="C2C2C2"/>
-              </a:solidFill>
-              <a:prstDash val="solid"/>
-              <a:round/>
-              <a:headEnd type="none" w="sm" len="sm"/>
-              <a:tailEnd type="none" w="sm" len="sm"/>
-            </a:ln>
-          </p:spPr>
-        </p:cxnSp>
-        <p:sp>
-          <p:nvSpPr>
-            <p:cNvPr id="149" name="Google Shape;149;p23"/>
-            <p:cNvSpPr/>
-            <p:nvPr/>
-          </p:nvSpPr>
-          <p:spPr>
-            <a:xfrm flipH="1">
-              <a:off x="1083025" y="2306625"/>
-              <a:ext cx="1834800" cy="143400"/>
-            </a:xfrm>
-            <a:prstGeom prst="parallelogram">
-              <a:avLst>
-                <a:gd name="adj" fmla="val 96952"/>
-              </a:avLst>
-            </a:prstGeom>
-            <a:solidFill>
-              <a:srgbClr val="C2C2C2"/>
-            </a:solidFill>
-            <a:ln>
-              <a:noFill/>
-            </a:ln>
-          </p:spPr>
-          <p:txBody>
-            <a:bodyPr spcFirstLastPara="1" wrap="square" lIns="91425" tIns="91425" rIns="91425" bIns="91425" anchor="ctr" anchorCtr="0">
-              <a:noAutofit/>
-            </a:bodyPr>
-            <a:lstStyle/>
-            <a:p>
-              <a:pPr marL="0" lvl="0" indent="0" algn="l" rtl="0">
-                <a:spcBef>
-                  <a:spcPts val="0"/>
-                </a:spcBef>
-                <a:spcAft>
-                  <a:spcPts val="0"/>
-                </a:spcAft>
-                <a:buNone/>
-              </a:pPr>
-              <a:r>
-                <a:rPr lang="en"/>
-                <a:t>  </a:t>
-              </a:r>
-              <a:endParaRPr/>
-            </a:p>
-          </p:txBody>
-        </p:sp>
-        <p:sp>
-          <p:nvSpPr>
-            <p:cNvPr id="150" name="Google Shape;150;p23"/>
-            <p:cNvSpPr/>
-            <p:nvPr/>
-          </p:nvSpPr>
-          <p:spPr>
-            <a:xfrm>
-              <a:off x="1083125" y="2460449"/>
-              <a:ext cx="1834800" cy="143400"/>
-            </a:xfrm>
-            <a:prstGeom prst="parallelogram">
-              <a:avLst>
-                <a:gd name="adj" fmla="val 96952"/>
-              </a:avLst>
-            </a:prstGeom>
-            <a:solidFill>
-              <a:srgbClr val="858585"/>
-            </a:solidFill>
-            <a:ln>
-              <a:noFill/>
-            </a:ln>
-          </p:spPr>
-          <p:txBody>
-            <a:bodyPr spcFirstLastPara="1" wrap="square" lIns="91425" tIns="91425" rIns="91425" bIns="91425" anchor="ctr" anchorCtr="0">
-              <a:noAutofit/>
-            </a:bodyPr>
-            <a:lstStyle/>
-            <a:p>
-              <a:pPr marL="0" lvl="0" indent="0" algn="l" rtl="0">
-                <a:spcBef>
-                  <a:spcPts val="0"/>
-                </a:spcBef>
-                <a:spcAft>
-                  <a:spcPts val="0"/>
-                </a:spcAft>
-                <a:buNone/>
-              </a:pPr>
-              <a:endParaRPr/>
-            </a:p>
-          </p:txBody>
-        </p:sp>
-      </p:grpSp>
-      <p:grpSp>
-        <p:nvGrpSpPr>
-          <p:cNvPr id="151" name="Google Shape;151;p23"/>
-          <p:cNvGrpSpPr/>
-          <p:nvPr/>
-        </p:nvGrpSpPr>
-        <p:grpSpPr>
-          <a:xfrm>
-            <a:off x="5792585" y="1751262"/>
-            <a:ext cx="1356358" cy="1340573"/>
-            <a:chOff x="1083025" y="1574015"/>
-            <a:chExt cx="1834900" cy="1813791"/>
-          </a:xfrm>
-        </p:grpSpPr>
-        <p:sp>
-          <p:nvSpPr>
-            <p:cNvPr id="152" name="Google Shape;152;p23"/>
-            <p:cNvSpPr txBox="1"/>
-            <p:nvPr/>
-          </p:nvSpPr>
-          <p:spPr>
-            <a:xfrm>
-              <a:off x="1510095" y="1574015"/>
-              <a:ext cx="718500" cy="241200"/>
-            </a:xfrm>
-            <a:prstGeom prst="rect">
-              <a:avLst/>
-            </a:prstGeom>
-            <a:noFill/>
-            <a:ln>
-              <a:noFill/>
-            </a:ln>
-          </p:spPr>
-          <p:txBody>
-            <a:bodyPr spcFirstLastPara="1" wrap="square" lIns="91425" tIns="91425" rIns="91425" bIns="91425" anchor="t" anchorCtr="0">
-              <a:noAutofit/>
-            </a:bodyPr>
-            <a:lstStyle/>
-            <a:p>
-              <a:pPr marL="0" lvl="0" indent="0" algn="r" rtl="0">
-                <a:lnSpc>
-                  <a:spcPct val="115000"/>
-                </a:lnSpc>
-                <a:spcBef>
-                  <a:spcPts val="0"/>
-                </a:spcBef>
-                <a:spcAft>
-                  <a:spcPts val="1600"/>
-                </a:spcAft>
-                <a:buNone/>
-              </a:pPr>
-              <a:r>
-                <a:rPr lang="en" sz="800">
-                  <a:solidFill>
-                    <a:srgbClr val="858585"/>
-                  </a:solidFill>
-                  <a:latin typeface="Roboto"/>
-                  <a:ea typeface="Roboto"/>
-                  <a:cs typeface="Roboto"/>
-                  <a:sym typeface="Roboto"/>
-                </a:rPr>
-                <a:t>Weeks 12-13</a:t>
-              </a:r>
-              <a:endParaRPr sz="800">
-                <a:solidFill>
-                  <a:srgbClr val="858585"/>
-                </a:solidFill>
-                <a:latin typeface="Roboto"/>
-                <a:ea typeface="Roboto"/>
-                <a:cs typeface="Roboto"/>
-                <a:sym typeface="Roboto"/>
-              </a:endParaRPr>
-            </a:p>
-          </p:txBody>
-        </p:sp>
-        <p:sp>
-          <p:nvSpPr>
-            <p:cNvPr id="153" name="Google Shape;153;p23"/>
-            <p:cNvSpPr txBox="1"/>
-            <p:nvPr/>
-          </p:nvSpPr>
-          <p:spPr>
-            <a:xfrm>
-              <a:off x="1260396" y="2941406"/>
-              <a:ext cx="1505100" cy="446400"/>
-            </a:xfrm>
-            <a:prstGeom prst="rect">
-              <a:avLst/>
-            </a:prstGeom>
-            <a:noFill/>
-            <a:ln>
-              <a:noFill/>
-            </a:ln>
-          </p:spPr>
-          <p:txBody>
-            <a:bodyPr spcFirstLastPara="1" wrap="square" lIns="91425" tIns="91425" rIns="91425" bIns="91425" anchor="b" anchorCtr="0">
-              <a:noAutofit/>
-            </a:bodyPr>
-            <a:lstStyle/>
-            <a:p>
-              <a:pPr marL="0" lvl="0" indent="0" algn="l" rtl="0">
-                <a:lnSpc>
-                  <a:spcPct val="115000"/>
-                </a:lnSpc>
-                <a:spcBef>
-                  <a:spcPts val="0"/>
-                </a:spcBef>
-                <a:spcAft>
-                  <a:spcPts val="0"/>
-                </a:spcAft>
-                <a:buNone/>
-              </a:pPr>
               <a:r>
                 <a:rPr lang="en" sz="1000" b="1" dirty="0">
                   <a:solidFill>
@@ -10935,7 +10780,7 @@
                   <a:cs typeface="Roboto"/>
                   <a:sym typeface="Roboto"/>
                 </a:rPr>
-                <a:t>Beta Testing and final fixes</a:t>
+                <a:t>ug fixes/Beta Testing and export to IOS</a:t>
               </a:r>
               <a:endParaRPr sz="1000" b="1" dirty="0">
                 <a:solidFill>
@@ -11072,7 +10917,7 @@
         </p:nvGrpSpPr>
         <p:grpSpPr>
           <a:xfrm>
-            <a:off x="7058901" y="1751263"/>
+            <a:off x="5975375" y="1751262"/>
             <a:ext cx="1356358" cy="1340590"/>
             <a:chOff x="1083025" y="1574026"/>
             <a:chExt cx="1834900" cy="1813814"/>

</xml_diff>

<commit_message>
Final touches for Powerpoint
</commit_message>
<xml_diff>
--- a/CSC_520_Devils_Grip.pptx
+++ b/CSC_520_Devils_Grip.pptx
@@ -5,45 +5,46 @@
     <p:sldMasterId id="2147483660" r:id="rId1"/>
   </p:sldMasterIdLst>
   <p:notesMasterIdLst>
-    <p:notesMasterId r:id="rId14"/>
+    <p:notesMasterId r:id="rId15"/>
   </p:notesMasterIdLst>
   <p:sldIdLst>
     <p:sldId id="256" r:id="rId2"/>
     <p:sldId id="257" r:id="rId3"/>
     <p:sldId id="258" r:id="rId4"/>
     <p:sldId id="259" r:id="rId5"/>
-    <p:sldId id="260" r:id="rId6"/>
-    <p:sldId id="262" r:id="rId7"/>
-    <p:sldId id="274" r:id="rId8"/>
+    <p:sldId id="262" r:id="rId6"/>
+    <p:sldId id="274" r:id="rId7"/>
+    <p:sldId id="276" r:id="rId8"/>
     <p:sldId id="265" r:id="rId9"/>
-    <p:sldId id="266" r:id="rId10"/>
-    <p:sldId id="275" r:id="rId11"/>
-    <p:sldId id="271" r:id="rId12"/>
-    <p:sldId id="273" r:id="rId13"/>
+    <p:sldId id="277" r:id="rId10"/>
+    <p:sldId id="266" r:id="rId11"/>
+    <p:sldId id="275" r:id="rId12"/>
+    <p:sldId id="271" r:id="rId13"/>
+    <p:sldId id="273" r:id="rId14"/>
   </p:sldIdLst>
   <p:sldSz cx="9144000" cy="5143500" type="screen16x9"/>
   <p:notesSz cx="6858000" cy="9144000"/>
   <p:embeddedFontLst>
     <p:embeddedFont>
       <p:font typeface="Bookman Old Style" panose="02050604050505020204" pitchFamily="18" charset="0"/>
-      <p:regular r:id="rId15"/>
-      <p:bold r:id="rId16"/>
-      <p:italic r:id="rId17"/>
-      <p:boldItalic r:id="rId18"/>
+      <p:regular r:id="rId16"/>
+      <p:bold r:id="rId17"/>
+      <p:italic r:id="rId18"/>
+      <p:boldItalic r:id="rId19"/>
     </p:embeddedFont>
     <p:embeddedFont>
       <p:font typeface="Roboto" panose="020B0604020202020204" charset="0"/>
-      <p:regular r:id="rId19"/>
-      <p:bold r:id="rId20"/>
-      <p:italic r:id="rId21"/>
-      <p:boldItalic r:id="rId22"/>
+      <p:regular r:id="rId20"/>
+      <p:bold r:id="rId21"/>
+      <p:italic r:id="rId22"/>
+      <p:boldItalic r:id="rId23"/>
     </p:embeddedFont>
     <p:embeddedFont>
       <p:font typeface="Rockwell" panose="02060603020205020403" pitchFamily="18" charset="0"/>
-      <p:regular r:id="rId23"/>
-      <p:bold r:id="rId24"/>
-      <p:italic r:id="rId25"/>
-      <p:boldItalic r:id="rId26"/>
+      <p:regular r:id="rId24"/>
+      <p:bold r:id="rId25"/>
+      <p:italic r:id="rId26"/>
+      <p:boldItalic r:id="rId27"/>
     </p:embeddedFont>
   </p:embeddedFontLst>
   <p:defaultTextStyle>
@@ -710,7 +711,7 @@
   <p:cSld>
     <p:spTree>
       <p:nvGrpSpPr>
-        <p:cNvPr id="1" name="Shape 234"/>
+        <p:cNvPr id="1" name="Shape 117"/>
         <p:cNvGrpSpPr/>
         <p:nvPr/>
       </p:nvGrpSpPr>
@@ -724,7 +725,7 @@
       </p:grpSpPr>
       <p:sp>
         <p:nvSpPr>
-          <p:cNvPr id="235" name="Google Shape;235;g84146f00ea_0_5:notes"/>
+          <p:cNvPr id="118" name="Google Shape;118;g84146f00ea_0_184:notes"/>
           <p:cNvSpPr>
             <a:spLocks noGrp="1" noRot="1" noChangeAspect="1"/>
           </p:cNvSpPr>
@@ -765,7 +766,7 @@
       </p:sp>
       <p:sp>
         <p:nvSpPr>
-          <p:cNvPr id="236" name="Google Shape;236;g84146f00ea_0_5:notes"/>
+          <p:cNvPr id="119" name="Google Shape;119;g84146f00ea_0_184:notes"/>
           <p:cNvSpPr txBox="1">
             <a:spLocks noGrp="1"/>
           </p:cNvSpPr>
@@ -797,7 +798,7 @@
               </a:spcAft>
               <a:buNone/>
             </a:pPr>
-            <a:endParaRPr/>
+            <a:endParaRPr dirty="0"/>
           </a:p>
         </p:txBody>
       </p:sp>
@@ -810,11 +811,11 @@
 </file>
 
 <file path=ppt/notesSlides/notesSlide11.xml><?xml version="1.0" encoding="utf-8"?>
-<p:notes xmlns:a="http://schemas.openxmlformats.org/drawingml/2006/main" xmlns:r="http://schemas.openxmlformats.org/officeDocument/2006/relationships" xmlns:p="http://schemas.openxmlformats.org/presentationml/2006/main" showMasterSp="0" showMasterPhAnim="0">
+<p:notes xmlns:a="http://schemas.openxmlformats.org/drawingml/2006/main" xmlns:r="http://schemas.openxmlformats.org/officeDocument/2006/relationships" xmlns:p="http://schemas.openxmlformats.org/presentationml/2006/main">
   <p:cSld>
     <p:spTree>
       <p:nvGrpSpPr>
-        <p:cNvPr id="1" name="Shape 246"/>
+        <p:cNvPr id="1" name=""/>
         <p:cNvGrpSpPr/>
         <p:nvPr/>
       </p:nvGrpSpPr>
@@ -828,7 +829,73 @@
       </p:grpSpPr>
       <p:sp>
         <p:nvSpPr>
-          <p:cNvPr id="247" name="Google Shape;247;g84146f00ea_0_173:notes"/>
+          <p:cNvPr id="2" name="Slide Image Placeholder 1"/>
+          <p:cNvSpPr>
+            <a:spLocks noGrp="1" noRot="1" noChangeAspect="1"/>
+          </p:cNvSpPr>
+          <p:nvPr>
+            <p:ph type="sldImg"/>
+          </p:nvPr>
+        </p:nvSpPr>
+        <p:spPr>
+          <a:xfrm>
+            <a:off x="381000" y="685800"/>
+            <a:ext cx="6096000" cy="3429000"/>
+          </a:xfrm>
+        </p:spPr>
+      </p:sp>
+      <p:sp>
+        <p:nvSpPr>
+          <p:cNvPr id="3" name="Notes Placeholder 2"/>
+          <p:cNvSpPr>
+            <a:spLocks noGrp="1"/>
+          </p:cNvSpPr>
+          <p:nvPr>
+            <p:ph type="body" idx="1"/>
+          </p:nvPr>
+        </p:nvSpPr>
+        <p:spPr/>
+        <p:txBody>
+          <a:bodyPr/>
+          <a:lstStyle/>
+          <a:p>
+            <a:endParaRPr lang="en-US" dirty="0"/>
+          </a:p>
+        </p:txBody>
+      </p:sp>
+    </p:spTree>
+    <p:extLst>
+      <p:ext uri="{BB962C8B-B14F-4D97-AF65-F5344CB8AC3E}">
+        <p14:creationId xmlns:p14="http://schemas.microsoft.com/office/powerpoint/2010/main" val="879236205"/>
+      </p:ext>
+    </p:extLst>
+  </p:cSld>
+  <p:clrMapOvr>
+    <a:masterClrMapping/>
+  </p:clrMapOvr>
+</p:notes>
+</file>
+
+<file path=ppt/notesSlides/notesSlide12.xml><?xml version="1.0" encoding="utf-8"?>
+<p:notes xmlns:a="http://schemas.openxmlformats.org/drawingml/2006/main" xmlns:r="http://schemas.openxmlformats.org/officeDocument/2006/relationships" xmlns:p="http://schemas.openxmlformats.org/presentationml/2006/main" showMasterSp="0" showMasterPhAnim="0">
+  <p:cSld>
+    <p:spTree>
+      <p:nvGrpSpPr>
+        <p:cNvPr id="1" name="Shape 234"/>
+        <p:cNvGrpSpPr/>
+        <p:nvPr/>
+      </p:nvGrpSpPr>
+      <p:grpSpPr>
+        <a:xfrm>
+          <a:off x="0" y="0"/>
+          <a:ext cx="0" cy="0"/>
+          <a:chOff x="0" y="0"/>
+          <a:chExt cx="0" cy="0"/>
+        </a:xfrm>
+      </p:grpSpPr>
+      <p:sp>
+        <p:nvSpPr>
+          <p:cNvPr id="235" name="Google Shape;235;g84146f00ea_0_5:notes"/>
           <p:cNvSpPr>
             <a:spLocks noGrp="1" noRot="1" noChangeAspect="1"/>
           </p:cNvSpPr>
@@ -869,7 +936,7 @@
       </p:sp>
       <p:sp>
         <p:nvSpPr>
-          <p:cNvPr id="248" name="Google Shape;248;g84146f00ea_0_173:notes"/>
+          <p:cNvPr id="236" name="Google Shape;236;g84146f00ea_0_5:notes"/>
           <p:cNvSpPr txBox="1">
             <a:spLocks noGrp="1"/>
           </p:cNvSpPr>
@@ -913,12 +980,12 @@
 </p:notes>
 </file>
 
-<file path=ppt/notesSlides/notesSlide2.xml><?xml version="1.0" encoding="utf-8"?>
+<file path=ppt/notesSlides/notesSlide13.xml><?xml version="1.0" encoding="utf-8"?>
 <p:notes xmlns:a="http://schemas.openxmlformats.org/drawingml/2006/main" xmlns:r="http://schemas.openxmlformats.org/officeDocument/2006/relationships" xmlns:p="http://schemas.openxmlformats.org/presentationml/2006/main" showMasterSp="0" showMasterPhAnim="0">
   <p:cSld>
     <p:spTree>
       <p:nvGrpSpPr>
-        <p:cNvPr id="1" name="Shape 61"/>
+        <p:cNvPr id="1" name="Shape 246"/>
         <p:cNvGrpSpPr/>
         <p:nvPr/>
       </p:nvGrpSpPr>
@@ -932,7 +999,7 @@
       </p:grpSpPr>
       <p:sp>
         <p:nvSpPr>
-          <p:cNvPr id="62" name="Google Shape;62;g73afbdf538_0_50:notes"/>
+          <p:cNvPr id="247" name="Google Shape;247;g84146f00ea_0_173:notes"/>
           <p:cNvSpPr>
             <a:spLocks noGrp="1" noRot="1" noChangeAspect="1"/>
           </p:cNvSpPr>
@@ -973,7 +1040,7 @@
       </p:sp>
       <p:sp>
         <p:nvSpPr>
-          <p:cNvPr id="63" name="Google Shape;63;g73afbdf538_0_50:notes"/>
+          <p:cNvPr id="248" name="Google Shape;248;g84146f00ea_0_173:notes"/>
           <p:cNvSpPr txBox="1">
             <a:spLocks noGrp="1"/>
           </p:cNvSpPr>
@@ -1005,10 +1072,6 @@
               </a:spcAft>
               <a:buNone/>
             </a:pPr>
-            <a:r>
-              <a:rPr lang="en"/>
-              <a:t>Aria: During this presentation we’ll be going over ^</a:t>
-            </a:r>
             <a:endParaRPr/>
           </a:p>
         </p:txBody>
@@ -1021,12 +1084,12 @@
 </p:notes>
 </file>
 
-<file path=ppt/notesSlides/notesSlide3.xml><?xml version="1.0" encoding="utf-8"?>
+<file path=ppt/notesSlides/notesSlide2.xml><?xml version="1.0" encoding="utf-8"?>
 <p:notes xmlns:a="http://schemas.openxmlformats.org/drawingml/2006/main" xmlns:r="http://schemas.openxmlformats.org/officeDocument/2006/relationships" xmlns:p="http://schemas.openxmlformats.org/presentationml/2006/main" showMasterSp="0" showMasterPhAnim="0">
   <p:cSld>
     <p:spTree>
       <p:nvGrpSpPr>
-        <p:cNvPr id="1" name="Shape 67"/>
+        <p:cNvPr id="1" name="Shape 61"/>
         <p:cNvGrpSpPr/>
         <p:nvPr/>
       </p:nvGrpSpPr>
@@ -1040,7 +1103,7 @@
       </p:grpSpPr>
       <p:sp>
         <p:nvSpPr>
-          <p:cNvPr id="68" name="Google Shape;68;g73afbdf538_0_55:notes"/>
+          <p:cNvPr id="62" name="Google Shape;62;g73afbdf538_0_50:notes"/>
           <p:cNvSpPr>
             <a:spLocks noGrp="1" noRot="1" noChangeAspect="1"/>
           </p:cNvSpPr>
@@ -1081,7 +1144,7 @@
       </p:sp>
       <p:sp>
         <p:nvSpPr>
-          <p:cNvPr id="69" name="Google Shape;69;g73afbdf538_0_55:notes"/>
+          <p:cNvPr id="63" name="Google Shape;63;g73afbdf538_0_50:notes"/>
           <p:cNvSpPr txBox="1">
             <a:spLocks noGrp="1"/>
           </p:cNvSpPr>
@@ -1113,11 +1176,7 @@
               </a:spcAft>
               <a:buNone/>
             </a:pPr>
-            <a:r>
-              <a:rPr lang="en"/>
-              <a:t>Aria</a:t>
-            </a:r>
-            <a:endParaRPr/>
+            <a:endParaRPr dirty="0"/>
           </a:p>
         </p:txBody>
       </p:sp>
@@ -1129,12 +1188,12 @@
 </p:notes>
 </file>
 
-<file path=ppt/notesSlides/notesSlide4.xml><?xml version="1.0" encoding="utf-8"?>
+<file path=ppt/notesSlides/notesSlide3.xml><?xml version="1.0" encoding="utf-8"?>
 <p:notes xmlns:a="http://schemas.openxmlformats.org/drawingml/2006/main" xmlns:r="http://schemas.openxmlformats.org/officeDocument/2006/relationships" xmlns:p="http://schemas.openxmlformats.org/presentationml/2006/main" showMasterSp="0" showMasterPhAnim="0">
   <p:cSld>
     <p:spTree>
       <p:nvGrpSpPr>
-        <p:cNvPr id="1" name="Shape 73"/>
+        <p:cNvPr id="1" name="Shape 67"/>
         <p:cNvGrpSpPr/>
         <p:nvPr/>
       </p:nvGrpSpPr>
@@ -1148,7 +1207,7 @@
       </p:grpSpPr>
       <p:sp>
         <p:nvSpPr>
-          <p:cNvPr id="74" name="Google Shape;74;g73afbdf538_0_60:notes"/>
+          <p:cNvPr id="68" name="Google Shape;68;g73afbdf538_0_55:notes"/>
           <p:cNvSpPr>
             <a:spLocks noGrp="1" noRot="1" noChangeAspect="1"/>
           </p:cNvSpPr>
@@ -1189,7 +1248,7 @@
       </p:sp>
       <p:sp>
         <p:nvSpPr>
-          <p:cNvPr id="75" name="Google Shape;75;g73afbdf538_0_60:notes"/>
+          <p:cNvPr id="69" name="Google Shape;69;g73afbdf538_0_55:notes"/>
           <p:cNvSpPr txBox="1">
             <a:spLocks noGrp="1"/>
           </p:cNvSpPr>
@@ -1212,38 +1271,16 @@
           </a:bodyPr>
           <a:lstStyle/>
           <a:p>
-            <a:pPr marL="457200" lvl="0" indent="-298450" algn="l" rtl="0">
+            <a:pPr marL="0" lvl="0" indent="0" algn="l" rtl="0">
               <a:spcBef>
                 <a:spcPts val="0"/>
               </a:spcBef>
               <a:spcAft>
                 <a:spcPts val="0"/>
               </a:spcAft>
-              <a:buSzPts val="1100"/>
-              <a:buChar char="-"/>
+              <a:buNone/>
             </a:pPr>
-            <a:r>
-              <a:rPr lang="en"/>
-              <a:t>deciding what to cook every night is a challenge</a:t>
-            </a:r>
-            <a:endParaRPr/>
-          </a:p>
-          <a:p>
-            <a:pPr marL="457200" lvl="0" indent="-298450" algn="l" rtl="0">
-              <a:spcBef>
-                <a:spcPts val="0"/>
-              </a:spcBef>
-              <a:spcAft>
-                <a:spcPts val="0"/>
-              </a:spcAft>
-              <a:buSzPts val="1100"/>
-              <a:buChar char="-"/>
-            </a:pPr>
-            <a:r>
-              <a:rPr lang="en"/>
-              <a:t>Food waste in the residence home</a:t>
-            </a:r>
-            <a:endParaRPr/>
+            <a:endParaRPr dirty="0"/>
           </a:p>
         </p:txBody>
       </p:sp>
@@ -1255,12 +1292,12 @@
 </p:notes>
 </file>
 
-<file path=ppt/notesSlides/notesSlide5.xml><?xml version="1.0" encoding="utf-8"?>
+<file path=ppt/notesSlides/notesSlide4.xml><?xml version="1.0" encoding="utf-8"?>
 <p:notes xmlns:a="http://schemas.openxmlformats.org/drawingml/2006/main" xmlns:r="http://schemas.openxmlformats.org/officeDocument/2006/relationships" xmlns:p="http://schemas.openxmlformats.org/presentationml/2006/main" showMasterSp="0" showMasterPhAnim="0">
   <p:cSld>
     <p:spTree>
       <p:nvGrpSpPr>
-        <p:cNvPr id="1" name="Shape 81"/>
+        <p:cNvPr id="1" name="Shape 73"/>
         <p:cNvGrpSpPr/>
         <p:nvPr/>
       </p:nvGrpSpPr>
@@ -1274,7 +1311,7 @@
       </p:grpSpPr>
       <p:sp>
         <p:nvSpPr>
-          <p:cNvPr id="82" name="Google Shape;82;g73afbdf538_0_67:notes"/>
+          <p:cNvPr id="74" name="Google Shape;74;g73afbdf538_0_60:notes"/>
           <p:cNvSpPr>
             <a:spLocks noGrp="1" noRot="1" noChangeAspect="1"/>
           </p:cNvSpPr>
@@ -1315,7 +1352,7 @@
       </p:sp>
       <p:sp>
         <p:nvSpPr>
-          <p:cNvPr id="83" name="Google Shape;83;g73afbdf538_0_67:notes"/>
+          <p:cNvPr id="75" name="Google Shape;75;g73afbdf538_0_60:notes"/>
           <p:cNvSpPr txBox="1">
             <a:spLocks noGrp="1"/>
           </p:cNvSpPr>
@@ -1348,62 +1385,7 @@
               <a:buSzPts val="1100"/>
               <a:buChar char="-"/>
             </a:pPr>
-            <a:r>
-              <a:rPr lang="en"/>
-              <a:t>We wanted the user to be able to look through the ingredients they have available to them, and these are to be sorted based off of when they expire.</a:t>
-            </a:r>
-            <a:endParaRPr/>
-          </a:p>
-          <a:p>
-            <a:pPr marL="457200" lvl="0" indent="-298450" algn="l" rtl="0">
-              <a:spcBef>
-                <a:spcPts val="0"/>
-              </a:spcBef>
-              <a:spcAft>
-                <a:spcPts val="0"/>
-              </a:spcAft>
-              <a:buSzPts val="1100"/>
-              <a:buChar char="-"/>
-            </a:pPr>
-            <a:r>
-              <a:rPr lang="en"/>
-              <a:t>Originally we wanted the user to be able to find recipes based on what ingredients they have available, however we ran into issue with that that we will talk about later. </a:t>
-            </a:r>
-            <a:endParaRPr/>
-          </a:p>
-          <a:p>
-            <a:pPr marL="457200" lvl="0" indent="-298450" algn="l" rtl="0">
-              <a:spcBef>
-                <a:spcPts val="0"/>
-              </a:spcBef>
-              <a:spcAft>
-                <a:spcPts val="0"/>
-              </a:spcAft>
-              <a:buSzPts val="1100"/>
-              <a:buChar char="-"/>
-            </a:pPr>
-            <a:r>
-              <a:rPr lang="en"/>
-              <a:t>Keeping track of when things expire, these items will be at the top of your list so you will see them first. Cutting down on the time needed to plan a meal, as I know from my own experience I never know what I want to make for dinner, and i can take an hour to decide, where as I could have already had something made by then.</a:t>
-            </a:r>
-            <a:endParaRPr/>
-          </a:p>
-          <a:p>
-            <a:pPr marL="457200" lvl="0" indent="-298450" algn="l" rtl="0">
-              <a:spcBef>
-                <a:spcPts val="0"/>
-              </a:spcBef>
-              <a:spcAft>
-                <a:spcPts val="0"/>
-              </a:spcAft>
-              <a:buSzPts val="1100"/>
-              <a:buChar char="-"/>
-            </a:pPr>
-            <a:r>
-              <a:rPr lang="en"/>
-              <a:t> And we have added finding new recipes to try, as the app will show you new recipes you might want to give a try, and if you like them you can favorite them to always have to go back to.</a:t>
-            </a:r>
-            <a:endParaRPr/>
+            <a:endParaRPr dirty="0"/>
           </a:p>
         </p:txBody>
       </p:sp>
@@ -1415,7 +1397,7 @@
 </p:notes>
 </file>
 
-<file path=ppt/notesSlides/notesSlide6.xml><?xml version="1.0" encoding="utf-8"?>
+<file path=ppt/notesSlides/notesSlide5.xml><?xml version="1.0" encoding="utf-8"?>
 <p:notes xmlns:a="http://schemas.openxmlformats.org/drawingml/2006/main" xmlns:r="http://schemas.openxmlformats.org/officeDocument/2006/relationships" xmlns:p="http://schemas.openxmlformats.org/presentationml/2006/main" showMasterSp="0" showMasterPhAnim="0">
   <p:cSld>
     <p:spTree>
@@ -1507,11 +1489,7 @@
               </a:spcAft>
               <a:buNone/>
             </a:pPr>
-            <a:r>
-              <a:rPr lang="en"/>
-              <a:t>Zach: We switched to a declarativeUI architecture by using swiftUI.  At first, we were using a MVC architecture, but it began to fight us more than we were able to make progress, so we decided to switch to a different architecture and we were able to make more progress with that in less time than with the MVC. We used Firebase authentication for the login system</a:t>
-            </a:r>
-            <a:endParaRPr/>
+            <a:endParaRPr dirty="0"/>
           </a:p>
         </p:txBody>
       </p:sp>
@@ -1523,7 +1501,7 @@
 </p:notes>
 </file>
 
-<file path=ppt/notesSlides/notesSlide7.xml><?xml version="1.0" encoding="utf-8"?>
+<file path=ppt/notesSlides/notesSlide6.xml><?xml version="1.0" encoding="utf-8"?>
 <p:notes xmlns:a="http://schemas.openxmlformats.org/drawingml/2006/main" xmlns:r="http://schemas.openxmlformats.org/officeDocument/2006/relationships" xmlns:p="http://schemas.openxmlformats.org/presentationml/2006/main" showMasterSp="0" showMasterPhAnim="0">
   <p:cSld>
     <p:spTree>
@@ -1615,11 +1593,7 @@
               </a:spcAft>
               <a:buNone/>
             </a:pPr>
-            <a:r>
-              <a:rPr lang="en"/>
-              <a:t>Zach: We switched to a declarativeUI architecture by using swiftUI.  At first, we were using a MVC architecture, but it began to fight us more than we were able to make progress, so we decided to switch to a different architecture and we were able to make more progress with that in less time than with the MVC. We used Firebase authentication for the login system</a:t>
-            </a:r>
-            <a:endParaRPr/>
+            <a:endParaRPr dirty="0"/>
           </a:p>
         </p:txBody>
       </p:sp>
@@ -1636,12 +1610,12 @@
 </p:notes>
 </file>
 
-<file path=ppt/notesSlides/notesSlide8.xml><?xml version="1.0" encoding="utf-8"?>
+<file path=ppt/notesSlides/notesSlide7.xml><?xml version="1.0" encoding="utf-8"?>
 <p:notes xmlns:a="http://schemas.openxmlformats.org/drawingml/2006/main" xmlns:r="http://schemas.openxmlformats.org/officeDocument/2006/relationships" xmlns:p="http://schemas.openxmlformats.org/presentationml/2006/main" showMasterSp="0" showMasterPhAnim="0">
   <p:cSld>
     <p:spTree>
       <p:nvGrpSpPr>
-        <p:cNvPr id="1" name="Shape 111"/>
+        <p:cNvPr id="1" name="Shape 93"/>
         <p:cNvGrpSpPr/>
         <p:nvPr/>
       </p:nvGrpSpPr>
@@ -1655,7 +1629,7 @@
       </p:grpSpPr>
       <p:sp>
         <p:nvSpPr>
-          <p:cNvPr id="112" name="Google Shape;112;g84146f00ea_0_0:notes"/>
+          <p:cNvPr id="94" name="Google Shape;94;g73afbdf538_0_77:notes"/>
           <p:cNvSpPr>
             <a:spLocks noGrp="1" noRot="1" noChangeAspect="1"/>
           </p:cNvSpPr>
@@ -1696,7 +1670,7 @@
       </p:sp>
       <p:sp>
         <p:nvSpPr>
-          <p:cNvPr id="113" name="Google Shape;113;g84146f00ea_0_0:notes"/>
+          <p:cNvPr id="95" name="Google Shape;95;g73afbdf538_0_77:notes"/>
           <p:cNvSpPr txBox="1">
             <a:spLocks noGrp="1"/>
           </p:cNvSpPr>
@@ -1728,15 +1702,16 @@
               </a:spcAft>
               <a:buNone/>
             </a:pPr>
-            <a:r>
-              <a:rPr lang="en"/>
-              <a:t>Zach: We have basically the same tools list as proposed, with the addition of firebase firestore  as our database to use, as well as the use of an API</a:t>
-            </a:r>
-            <a:endParaRPr/>
+            <a:endParaRPr dirty="0"/>
           </a:p>
         </p:txBody>
       </p:sp>
     </p:spTree>
+    <p:extLst>
+      <p:ext uri="{BB962C8B-B14F-4D97-AF65-F5344CB8AC3E}">
+        <p14:creationId xmlns:p14="http://schemas.microsoft.com/office/powerpoint/2010/main" val="3669031621"/>
+      </p:ext>
+    </p:extLst>
   </p:cSld>
   <p:clrMapOvr>
     <a:masterClrMapping/>
@@ -1744,12 +1719,12 @@
 </p:notes>
 </file>
 
-<file path=ppt/notesSlides/notesSlide9.xml><?xml version="1.0" encoding="utf-8"?>
+<file path=ppt/notesSlides/notesSlide8.xml><?xml version="1.0" encoding="utf-8"?>
 <p:notes xmlns:a="http://schemas.openxmlformats.org/drawingml/2006/main" xmlns:r="http://schemas.openxmlformats.org/officeDocument/2006/relationships" xmlns:p="http://schemas.openxmlformats.org/presentationml/2006/main" showMasterSp="0" showMasterPhAnim="0">
   <p:cSld>
     <p:spTree>
       <p:nvGrpSpPr>
-        <p:cNvPr id="1" name="Shape 117"/>
+        <p:cNvPr id="1" name="Shape 111"/>
         <p:cNvGrpSpPr/>
         <p:nvPr/>
       </p:nvGrpSpPr>
@@ -1763,7 +1738,7 @@
       </p:grpSpPr>
       <p:sp>
         <p:nvSpPr>
-          <p:cNvPr id="118" name="Google Shape;118;g84146f00ea_0_184:notes"/>
+          <p:cNvPr id="112" name="Google Shape;112;g84146f00ea_0_0:notes"/>
           <p:cNvSpPr>
             <a:spLocks noGrp="1" noRot="1" noChangeAspect="1"/>
           </p:cNvSpPr>
@@ -1804,7 +1779,7 @@
       </p:sp>
       <p:sp>
         <p:nvSpPr>
-          <p:cNvPr id="119" name="Google Shape;119;g84146f00ea_0_184:notes"/>
+          <p:cNvPr id="113" name="Google Shape;113;g84146f00ea_0_0:notes"/>
           <p:cNvSpPr txBox="1">
             <a:spLocks noGrp="1"/>
           </p:cNvSpPr>
@@ -1836,15 +1811,120 @@
               </a:spcAft>
               <a:buNone/>
             </a:pPr>
-            <a:r>
-              <a:rPr lang="en"/>
-              <a:t>Aria: This is our proposed time schedule </a:t>
-            </a:r>
-            <a:endParaRPr/>
+            <a:endParaRPr dirty="0"/>
           </a:p>
         </p:txBody>
       </p:sp>
     </p:spTree>
+  </p:cSld>
+  <p:clrMapOvr>
+    <a:masterClrMapping/>
+  </p:clrMapOvr>
+</p:notes>
+</file>
+
+<file path=ppt/notesSlides/notesSlide9.xml><?xml version="1.0" encoding="utf-8"?>
+<p:notes xmlns:a="http://schemas.openxmlformats.org/drawingml/2006/main" xmlns:r="http://schemas.openxmlformats.org/officeDocument/2006/relationships" xmlns:p="http://schemas.openxmlformats.org/presentationml/2006/main" showMasterSp="0" showMasterPhAnim="0">
+  <p:cSld>
+    <p:spTree>
+      <p:nvGrpSpPr>
+        <p:cNvPr id="1" name="Shape 111"/>
+        <p:cNvGrpSpPr/>
+        <p:nvPr/>
+      </p:nvGrpSpPr>
+      <p:grpSpPr>
+        <a:xfrm>
+          <a:off x="0" y="0"/>
+          <a:ext cx="0" cy="0"/>
+          <a:chOff x="0" y="0"/>
+          <a:chExt cx="0" cy="0"/>
+        </a:xfrm>
+      </p:grpSpPr>
+      <p:sp>
+        <p:nvSpPr>
+          <p:cNvPr id="112" name="Google Shape;112;g84146f00ea_0_0:notes"/>
+          <p:cNvSpPr>
+            <a:spLocks noGrp="1" noRot="1" noChangeAspect="1"/>
+          </p:cNvSpPr>
+          <p:nvPr>
+            <p:ph type="sldImg" idx="2"/>
+          </p:nvPr>
+        </p:nvSpPr>
+        <p:spPr>
+          <a:xfrm>
+            <a:off x="381000" y="685800"/>
+            <a:ext cx="6096000" cy="3429000"/>
+          </a:xfrm>
+          <a:custGeom>
+            <a:avLst/>
+            <a:gdLst/>
+            <a:ahLst/>
+            <a:cxnLst/>
+            <a:rect l="l" t="t" r="r" b="b"/>
+            <a:pathLst>
+              <a:path w="120000" h="120000" extrusionOk="0">
+                <a:moveTo>
+                  <a:pt x="0" y="0"/>
+                </a:moveTo>
+                <a:lnTo>
+                  <a:pt x="120000" y="0"/>
+                </a:lnTo>
+                <a:lnTo>
+                  <a:pt x="120000" y="120000"/>
+                </a:lnTo>
+                <a:lnTo>
+                  <a:pt x="0" y="120000"/>
+                </a:lnTo>
+                <a:close/>
+              </a:path>
+            </a:pathLst>
+          </a:custGeom>
+        </p:spPr>
+      </p:sp>
+      <p:sp>
+        <p:nvSpPr>
+          <p:cNvPr id="113" name="Google Shape;113;g84146f00ea_0_0:notes"/>
+          <p:cNvSpPr txBox="1">
+            <a:spLocks noGrp="1"/>
+          </p:cNvSpPr>
+          <p:nvPr>
+            <p:ph type="body" idx="1"/>
+          </p:nvPr>
+        </p:nvSpPr>
+        <p:spPr>
+          <a:xfrm>
+            <a:off x="685800" y="4343400"/>
+            <a:ext cx="5486400" cy="4114800"/>
+          </a:xfrm>
+          <a:prstGeom prst="rect">
+            <a:avLst/>
+          </a:prstGeom>
+        </p:spPr>
+        <p:txBody>
+          <a:bodyPr spcFirstLastPara="1" wrap="square" lIns="91425" tIns="91425" rIns="91425" bIns="91425" anchor="t" anchorCtr="0">
+            <a:noAutofit/>
+          </a:bodyPr>
+          <a:lstStyle/>
+          <a:p>
+            <a:pPr marL="0" lvl="0" indent="0" algn="l" rtl="0">
+              <a:spcBef>
+                <a:spcPts val="0"/>
+              </a:spcBef>
+              <a:spcAft>
+                <a:spcPts val="0"/>
+              </a:spcAft>
+              <a:buNone/>
+            </a:pPr>
+            <a:endParaRPr dirty="0"/>
+          </a:p>
+        </p:txBody>
+      </p:sp>
+    </p:spTree>
+    <p:extLst>
+      <p:ext uri="{BB962C8B-B14F-4D97-AF65-F5344CB8AC3E}">
+        <p14:creationId xmlns:p14="http://schemas.microsoft.com/office/powerpoint/2010/main" val="4217761908"/>
+      </p:ext>
+    </p:extLst>
   </p:cSld>
   <p:clrMapOvr>
     <a:masterClrMapping/>
@@ -1985,7 +2065,7 @@
           <a:p>
             <a:fld id="{48A87A34-81AB-432B-8DAE-1953F412C126}" type="datetimeFigureOut">
               <a:rPr lang="en-US" dirty="0"/>
-              <a:t>11/2/2020</a:t>
+              <a:t>12/6/2020</a:t>
             </a:fld>
             <a:endParaRPr lang="en-US" dirty="0"/>
           </a:p>
@@ -2282,7 +2362,7 @@
           <a:p>
             <a:fld id="{48A87A34-81AB-432B-8DAE-1953F412C126}" type="datetimeFigureOut">
               <a:rPr lang="en-US" dirty="0"/>
-              <a:t>11/2/2020</a:t>
+              <a:t>12/6/2020</a:t>
             </a:fld>
             <a:endParaRPr lang="en-US" dirty="0"/>
           </a:p>
@@ -2484,7 +2564,7 @@
           <a:p>
             <a:fld id="{48A87A34-81AB-432B-8DAE-1953F412C126}" type="datetimeFigureOut">
               <a:rPr lang="en-US" dirty="0"/>
-              <a:t>11/2/2020</a:t>
+              <a:t>12/6/2020</a:t>
             </a:fld>
             <a:endParaRPr lang="en-US" dirty="0"/>
           </a:p>
@@ -2755,7 +2835,7 @@
           <a:p>
             <a:fld id="{48A87A34-81AB-432B-8DAE-1953F412C126}" type="datetimeFigureOut">
               <a:rPr lang="en-US" dirty="0"/>
-              <a:t>11/2/2020</a:t>
+              <a:t>12/6/2020</a:t>
             </a:fld>
             <a:endParaRPr lang="en-US" dirty="0"/>
           </a:p>
@@ -3189,7 +3269,7 @@
           <a:p>
             <a:fld id="{48A87A34-81AB-432B-8DAE-1953F412C126}" type="datetimeFigureOut">
               <a:rPr lang="en-US" dirty="0"/>
-              <a:t>11/2/2020</a:t>
+              <a:t>12/6/2020</a:t>
             </a:fld>
             <a:endParaRPr lang="en-US" dirty="0"/>
           </a:p>
@@ -3745,7 +3825,7 @@
           <a:p>
             <a:fld id="{48A87A34-81AB-432B-8DAE-1953F412C126}" type="datetimeFigureOut">
               <a:rPr lang="en-US" dirty="0"/>
-              <a:t>11/2/2020</a:t>
+              <a:t>12/6/2020</a:t>
             </a:fld>
             <a:endParaRPr lang="en-US" dirty="0"/>
           </a:p>
@@ -4595,7 +4675,7 @@
           <a:p>
             <a:fld id="{48A87A34-81AB-432B-8DAE-1953F412C126}" type="datetimeFigureOut">
               <a:rPr lang="en-US" dirty="0"/>
-              <a:t>11/2/2020</a:t>
+              <a:t>12/6/2020</a:t>
             </a:fld>
             <a:endParaRPr lang="en-US" dirty="0"/>
           </a:p>
@@ -4775,7 +4855,7 @@
           <a:p>
             <a:fld id="{48A87A34-81AB-432B-8DAE-1953F412C126}" type="datetimeFigureOut">
               <a:rPr lang="en-US" dirty="0"/>
-              <a:t>11/2/2020</a:t>
+              <a:t>12/6/2020</a:t>
             </a:fld>
             <a:endParaRPr lang="en-US" dirty="0"/>
           </a:p>
@@ -4969,7 +5049,7 @@
           <a:p>
             <a:fld id="{48A87A34-81AB-432B-8DAE-1953F412C126}" type="datetimeFigureOut">
               <a:rPr lang="en-US" dirty="0"/>
-              <a:t>11/2/2020</a:t>
+              <a:t>12/6/2020</a:t>
             </a:fld>
             <a:endParaRPr lang="en-US" dirty="0"/>
           </a:p>
@@ -5516,7 +5596,7 @@
           <a:p>
             <a:fld id="{48A87A34-81AB-432B-8DAE-1953F412C126}" type="datetimeFigureOut">
               <a:rPr lang="en-US" dirty="0"/>
-              <a:t>11/2/2020</a:t>
+              <a:t>12/6/2020</a:t>
             </a:fld>
             <a:endParaRPr lang="en-US" dirty="0"/>
           </a:p>
@@ -5774,7 +5854,7 @@
           <a:p>
             <a:fld id="{48A87A34-81AB-432B-8DAE-1953F412C126}" type="datetimeFigureOut">
               <a:rPr lang="en-US" dirty="0"/>
-              <a:t>11/2/2020</a:t>
+              <a:t>12/6/2020</a:t>
             </a:fld>
             <a:endParaRPr lang="en-US" dirty="0"/>
           </a:p>
@@ -6021,7 +6101,7 @@
           <a:p>
             <a:fld id="{48A87A34-81AB-432B-8DAE-1953F412C126}" type="datetimeFigureOut">
               <a:rPr lang="en-US" dirty="0"/>
-              <a:t>11/2/2020</a:t>
+              <a:t>12/6/2020</a:t>
             </a:fld>
             <a:endParaRPr lang="en-US" dirty="0"/>
           </a:p>
@@ -6404,7 +6484,7 @@
           <a:p>
             <a:fld id="{48A87A34-81AB-432B-8DAE-1953F412C126}" type="datetimeFigureOut">
               <a:rPr lang="en-US" dirty="0"/>
-              <a:t>11/2/2020</a:t>
+              <a:t>12/6/2020</a:t>
             </a:fld>
             <a:endParaRPr lang="en-US" dirty="0"/>
           </a:p>
@@ -6532,7 +6612,7 @@
           <a:p>
             <a:fld id="{48A87A34-81AB-432B-8DAE-1953F412C126}" type="datetimeFigureOut">
               <a:rPr lang="en-US" dirty="0"/>
-              <a:t>11/2/2020</a:t>
+              <a:t>12/6/2020</a:t>
             </a:fld>
             <a:endParaRPr lang="en-US" dirty="0"/>
           </a:p>
@@ -6637,7 +6717,7 @@
           <a:p>
             <a:fld id="{48A87A34-81AB-432B-8DAE-1953F412C126}" type="datetimeFigureOut">
               <a:rPr lang="en-US" dirty="0"/>
-              <a:t>11/2/2020</a:t>
+              <a:t>12/6/2020</a:t>
             </a:fld>
             <a:endParaRPr lang="en-US" dirty="0"/>
           </a:p>
@@ -6897,7 +6977,7 @@
           <a:p>
             <a:fld id="{48A87A34-81AB-432B-8DAE-1953F412C126}" type="datetimeFigureOut">
               <a:rPr lang="en-US" dirty="0"/>
-              <a:t>11/2/2020</a:t>
+              <a:t>12/6/2020</a:t>
             </a:fld>
             <a:endParaRPr lang="en-US" dirty="0"/>
           </a:p>
@@ -7194,7 +7274,7 @@
           <a:p>
             <a:fld id="{48A87A34-81AB-432B-8DAE-1953F412C126}" type="datetimeFigureOut">
               <a:rPr lang="en-US" dirty="0"/>
-              <a:t>11/2/2020</a:t>
+              <a:t>12/6/2020</a:t>
             </a:fld>
             <a:endParaRPr lang="en-US" dirty="0"/>
           </a:p>
@@ -7418,7 +7498,7 @@
             <a:fld id="{48A87A34-81AB-432B-8DAE-1953F412C126}" type="datetimeFigureOut">
               <a:rPr lang="en-US" dirty="0"/>
               <a:pPr/>
-              <a:t>11/2/2020</a:t>
+              <a:t>12/6/2020</a:t>
             </a:fld>
             <a:endParaRPr lang="en-US" dirty="0"/>
           </a:p>
@@ -8015,1796 +8095,6 @@
 </file>
 
 <file path=ppt/slides/slide10.xml><?xml version="1.0" encoding="utf-8"?>
-<p:sld xmlns:a="http://schemas.openxmlformats.org/drawingml/2006/main" xmlns:r="http://schemas.openxmlformats.org/officeDocument/2006/relationships" xmlns:p="http://schemas.openxmlformats.org/presentationml/2006/main">
-  <p:cSld>
-    <p:spTree>
-      <p:nvGrpSpPr>
-        <p:cNvPr id="1" name=""/>
-        <p:cNvGrpSpPr/>
-        <p:nvPr/>
-      </p:nvGrpSpPr>
-      <p:grpSpPr>
-        <a:xfrm>
-          <a:off x="0" y="0"/>
-          <a:ext cx="0" cy="0"/>
-          <a:chOff x="0" y="0"/>
-          <a:chExt cx="0" cy="0"/>
-        </a:xfrm>
-      </p:grpSpPr>
-      <p:sp>
-        <p:nvSpPr>
-          <p:cNvPr id="2" name="Title 1">
-            <a:extLst>
-              <a:ext uri="{FF2B5EF4-FFF2-40B4-BE49-F238E27FC236}">
-                <a16:creationId xmlns:a16="http://schemas.microsoft.com/office/drawing/2014/main" id="{0DBAE1D3-2670-465F-A867-905D15C6CF52}"/>
-              </a:ext>
-            </a:extLst>
-          </p:cNvPr>
-          <p:cNvSpPr>
-            <a:spLocks noGrp="1"/>
-          </p:cNvSpPr>
-          <p:nvPr>
-            <p:ph type="title"/>
-          </p:nvPr>
-        </p:nvSpPr>
-        <p:spPr/>
-        <p:txBody>
-          <a:bodyPr/>
-          <a:lstStyle/>
-          <a:p>
-            <a:r>
-              <a:rPr lang="en-US" dirty="0"/>
-              <a:t>Grading Scheme</a:t>
-            </a:r>
-          </a:p>
-        </p:txBody>
-      </p:sp>
-      <p:sp>
-        <p:nvSpPr>
-          <p:cNvPr id="3" name="Text Placeholder 2">
-            <a:extLst>
-              <a:ext uri="{FF2B5EF4-FFF2-40B4-BE49-F238E27FC236}">
-                <a16:creationId xmlns:a16="http://schemas.microsoft.com/office/drawing/2014/main" id="{4281DA53-9098-4B05-B372-7F418EBBA41F}"/>
-              </a:ext>
-            </a:extLst>
-          </p:cNvPr>
-          <p:cNvSpPr>
-            <a:spLocks noGrp="1"/>
-          </p:cNvSpPr>
-          <p:nvPr>
-            <p:ph type="body" idx="1"/>
-          </p:nvPr>
-        </p:nvSpPr>
-        <p:spPr>
-          <a:xfrm>
-            <a:off x="2429435" y="1161440"/>
-            <a:ext cx="5360893" cy="3416400"/>
-          </a:xfrm>
-        </p:spPr>
-        <p:txBody>
-          <a:bodyPr/>
-          <a:lstStyle/>
-          <a:p>
-            <a:r>
-              <a:rPr lang="en-US" sz="1800" dirty="0"/>
-              <a:t>Final Presentation: 10%</a:t>
-            </a:r>
-          </a:p>
-          <a:p>
-            <a:r>
-              <a:rPr lang="en-US" sz="1800" dirty="0"/>
-              <a:t>Report: 10%</a:t>
-            </a:r>
-          </a:p>
-          <a:p>
-            <a:r>
-              <a:rPr lang="en-US" sz="1800" dirty="0"/>
-              <a:t>Test cases: 10%</a:t>
-            </a:r>
-          </a:p>
-          <a:p>
-            <a:r>
-              <a:rPr lang="en-US" sz="1800" dirty="0"/>
-              <a:t>PC Executable: 20%</a:t>
-            </a:r>
-          </a:p>
-          <a:p>
-            <a:r>
-              <a:rPr lang="en-US" sz="1800" dirty="0"/>
-              <a:t>Mac integration/IOS App: 20%</a:t>
-            </a:r>
-          </a:p>
-          <a:p>
-            <a:r>
-              <a:rPr lang="en-US" sz="1800" dirty="0"/>
-              <a:t>Database Implementation: 10%</a:t>
-            </a:r>
-          </a:p>
-          <a:p>
-            <a:r>
-              <a:rPr lang="en-US" sz="1800" dirty="0"/>
-              <a:t>UI for IOS: 20%</a:t>
-            </a:r>
-          </a:p>
-          <a:p>
-            <a:endParaRPr lang="en-US" dirty="0"/>
-          </a:p>
-          <a:p>
-            <a:endParaRPr lang="en-US" dirty="0"/>
-          </a:p>
-          <a:p>
-            <a:endParaRPr lang="en-US" dirty="0"/>
-          </a:p>
-        </p:txBody>
-      </p:sp>
-    </p:spTree>
-    <p:extLst>
-      <p:ext uri="{BB962C8B-B14F-4D97-AF65-F5344CB8AC3E}">
-        <p14:creationId xmlns:p14="http://schemas.microsoft.com/office/powerpoint/2010/main" val="740749005"/>
-      </p:ext>
-    </p:extLst>
-  </p:cSld>
-  <p:clrMapOvr>
-    <a:masterClrMapping/>
-  </p:clrMapOvr>
-</p:sld>
-</file>
-
-<file path=ppt/slides/slide11.xml><?xml version="1.0" encoding="utf-8"?>
-<p:sld xmlns:a="http://schemas.openxmlformats.org/drawingml/2006/main" xmlns:r="http://schemas.openxmlformats.org/officeDocument/2006/relationships" xmlns:p="http://schemas.openxmlformats.org/presentationml/2006/main">
-  <p:cSld>
-    <p:spTree>
-      <p:nvGrpSpPr>
-        <p:cNvPr id="1" name="Shape 237"/>
-        <p:cNvGrpSpPr/>
-        <p:nvPr/>
-      </p:nvGrpSpPr>
-      <p:grpSpPr>
-        <a:xfrm>
-          <a:off x="0" y="0"/>
-          <a:ext cx="0" cy="0"/>
-          <a:chOff x="0" y="0"/>
-          <a:chExt cx="0" cy="0"/>
-        </a:xfrm>
-      </p:grpSpPr>
-      <p:sp>
-        <p:nvSpPr>
-          <p:cNvPr id="238" name="Google Shape;238;p28"/>
-          <p:cNvSpPr txBox="1">
-            <a:spLocks noGrp="1"/>
-          </p:cNvSpPr>
-          <p:nvPr>
-            <p:ph type="title"/>
-          </p:nvPr>
-        </p:nvSpPr>
-        <p:spPr>
-          <a:prstGeom prst="rect">
-            <a:avLst/>
-          </a:prstGeom>
-        </p:spPr>
-        <p:txBody>
-          <a:bodyPr spcFirstLastPara="1" wrap="square" lIns="91425" tIns="91425" rIns="91425" bIns="91425" anchor="t" anchorCtr="0">
-            <a:noAutofit/>
-          </a:bodyPr>
-          <a:lstStyle/>
-          <a:p>
-            <a:pPr marL="0" lvl="0" indent="0" rtl="0">
-              <a:spcBef>
-                <a:spcPts val="0"/>
-              </a:spcBef>
-              <a:spcAft>
-                <a:spcPts val="0"/>
-              </a:spcAft>
-              <a:buNone/>
-            </a:pPr>
-            <a:r>
-              <a:rPr lang="en" dirty="0"/>
-              <a:t>Deliverables</a:t>
-            </a:r>
-            <a:endParaRPr dirty="0"/>
-          </a:p>
-        </p:txBody>
-      </p:sp>
-      <p:sp>
-        <p:nvSpPr>
-          <p:cNvPr id="3" name="Text Placeholder 2">
-            <a:extLst>
-              <a:ext uri="{FF2B5EF4-FFF2-40B4-BE49-F238E27FC236}">
-                <a16:creationId xmlns:a16="http://schemas.microsoft.com/office/drawing/2014/main" id="{5966776C-FC6C-4C7C-B87F-26CAB876CCE8}"/>
-              </a:ext>
-            </a:extLst>
-          </p:cNvPr>
-          <p:cNvSpPr>
-            <a:spLocks noGrp="1"/>
-          </p:cNvSpPr>
-          <p:nvPr>
-            <p:ph type="body" idx="1"/>
-          </p:nvPr>
-        </p:nvSpPr>
-        <p:spPr/>
-        <p:txBody>
-          <a:bodyPr/>
-          <a:lstStyle/>
-          <a:p>
-            <a:pPr algn="l"/>
-            <a:r>
-              <a:rPr lang="en-US" sz="1200" b="0" i="0" dirty="0">
-                <a:effectLst/>
-              </a:rPr>
-              <a:t>original proposal and presentation file(s) (from CSC 520)</a:t>
-            </a:r>
-          </a:p>
-          <a:p>
-            <a:pPr algn="l"/>
-            <a:r>
-              <a:rPr lang="en-US" sz="1200" b="0" i="0" dirty="0">
-                <a:effectLst/>
-              </a:rPr>
-              <a:t>amendments to the proposal (approved by the project supervisor)</a:t>
-            </a:r>
-          </a:p>
-          <a:p>
-            <a:pPr algn="l"/>
-            <a:r>
-              <a:rPr lang="en-US" sz="1200" b="0" i="0" dirty="0">
-                <a:effectLst/>
-              </a:rPr>
-              <a:t>system architecture diagram(s) (UML, DFD context, etc.), enhanced with details determined during implementation </a:t>
-            </a:r>
-          </a:p>
-          <a:p>
-            <a:pPr algn="l"/>
-            <a:r>
-              <a:rPr lang="en-US" sz="1200" b="0" i="0" dirty="0">
-                <a:effectLst/>
-              </a:rPr>
-              <a:t>appropriately commented source code</a:t>
-            </a:r>
-          </a:p>
-          <a:p>
-            <a:pPr algn="l"/>
-            <a:r>
-              <a:rPr lang="en-US" sz="1200" b="0" i="0" dirty="0">
-                <a:effectLst/>
-              </a:rPr>
-              <a:t>documentation of project functionality (test results, screenshots, video capture of project execution, etc.) </a:t>
-            </a:r>
-          </a:p>
-          <a:p>
-            <a:pPr algn="l"/>
-            <a:r>
-              <a:rPr lang="en-US" sz="1200" b="0" i="0" dirty="0">
-                <a:effectLst/>
-              </a:rPr>
-              <a:t>sample output (screen shots and/or reports)</a:t>
-            </a:r>
-          </a:p>
-          <a:p>
-            <a:pPr algn="l"/>
-            <a:r>
-              <a:rPr lang="en-US" sz="1200" b="0" i="0" dirty="0">
-                <a:effectLst/>
-              </a:rPr>
-              <a:t>executables and/or projects</a:t>
-            </a:r>
-          </a:p>
-          <a:p>
-            <a:pPr algn="l"/>
-            <a:r>
-              <a:rPr lang="en-US" sz="1200" b="0" i="0" dirty="0">
-                <a:effectLst/>
-              </a:rPr>
-              <a:t>presentation documents (used to support the presentation of the completed CSC 521 project), including any presentation file(s)</a:t>
-            </a:r>
-          </a:p>
-          <a:p>
-            <a:pPr algn="l"/>
-            <a:r>
-              <a:rPr lang="en-US" sz="1200" b="0" i="0" dirty="0">
-                <a:effectLst/>
-              </a:rPr>
-              <a:t>project journal: a narrative of the progress of the project, in clear, concise English, including any problems encountered and how said problems were addressed</a:t>
-            </a:r>
-          </a:p>
-          <a:p>
-            <a:pPr algn="l"/>
-            <a:r>
-              <a:rPr lang="en-US" sz="1200" b="0" i="0" dirty="0">
-                <a:effectLst/>
-              </a:rPr>
-              <a:t>project post mortem: a summary of what was learned from the project and (based on that experience) discussion of how various aspects of the project might have been approached differently</a:t>
-            </a:r>
-          </a:p>
-          <a:p>
-            <a:pPr algn="l"/>
-            <a:r>
-              <a:rPr lang="en-US" sz="1200" b="0" i="0" dirty="0">
-                <a:effectLst/>
-              </a:rPr>
-              <a:t>a list of what areas of the proposal (if any) were not completed, including reasons why </a:t>
-            </a:r>
-          </a:p>
-          <a:p>
-            <a:pPr algn="l"/>
-            <a:r>
-              <a:rPr lang="en-US" sz="1200" b="0" i="0" dirty="0">
-                <a:effectLst/>
-              </a:rPr>
-              <a:t>presentation of the completed project (PowerPoint format), including screenshots of the functioning project</a:t>
-            </a:r>
-          </a:p>
-          <a:p>
-            <a:pPr algn="l"/>
-            <a:r>
-              <a:rPr lang="en-US" sz="1200" b="0" i="0" dirty="0">
-                <a:effectLst/>
-              </a:rPr>
-              <a:t>user's manual</a:t>
-            </a:r>
-          </a:p>
-          <a:p>
-            <a:pPr marL="114300" indent="0">
-              <a:buNone/>
-            </a:pPr>
-            <a:endParaRPr lang="en-US" dirty="0"/>
-          </a:p>
-        </p:txBody>
-      </p:sp>
-    </p:spTree>
-  </p:cSld>
-  <p:clrMapOvr>
-    <a:masterClrMapping/>
-  </p:clrMapOvr>
-</p:sld>
-</file>
-
-<file path=ppt/slides/slide12.xml><?xml version="1.0" encoding="utf-8"?>
-<p:sld xmlns:a="http://schemas.openxmlformats.org/drawingml/2006/main" xmlns:r="http://schemas.openxmlformats.org/officeDocument/2006/relationships" xmlns:p="http://schemas.openxmlformats.org/presentationml/2006/main">
-  <p:cSld>
-    <p:spTree>
-      <p:nvGrpSpPr>
-        <p:cNvPr id="1" name="Shape 249"/>
-        <p:cNvGrpSpPr/>
-        <p:nvPr/>
-      </p:nvGrpSpPr>
-      <p:grpSpPr>
-        <a:xfrm>
-          <a:off x="0" y="0"/>
-          <a:ext cx="0" cy="0"/>
-          <a:chOff x="0" y="0"/>
-          <a:chExt cx="0" cy="0"/>
-        </a:xfrm>
-      </p:grpSpPr>
-      <p:sp>
-        <p:nvSpPr>
-          <p:cNvPr id="250" name="Google Shape;250;p30"/>
-          <p:cNvSpPr txBox="1">
-            <a:spLocks noGrp="1"/>
-          </p:cNvSpPr>
-          <p:nvPr>
-            <p:ph type="title"/>
-          </p:nvPr>
-        </p:nvSpPr>
-        <p:spPr>
-          <a:xfrm>
-            <a:off x="311700" y="2109233"/>
-            <a:ext cx="8520600" cy="572700"/>
-          </a:xfrm>
-          <a:prstGeom prst="rect">
-            <a:avLst/>
-          </a:prstGeom>
-        </p:spPr>
-        <p:txBody>
-          <a:bodyPr spcFirstLastPara="1" wrap="square" lIns="91425" tIns="91425" rIns="91425" bIns="91425" anchor="t" anchorCtr="0">
-            <a:noAutofit/>
-          </a:bodyPr>
-          <a:lstStyle/>
-          <a:p>
-            <a:pPr marL="0" lvl="0" indent="0" rtl="0">
-              <a:spcBef>
-                <a:spcPts val="0"/>
-              </a:spcBef>
-              <a:spcAft>
-                <a:spcPts val="0"/>
-              </a:spcAft>
-              <a:buNone/>
-            </a:pPr>
-            <a:r>
-              <a:rPr lang="en" dirty="0"/>
-              <a:t>Questions?</a:t>
-            </a:r>
-            <a:endParaRPr dirty="0"/>
-          </a:p>
-        </p:txBody>
-      </p:sp>
-    </p:spTree>
-  </p:cSld>
-  <p:clrMapOvr>
-    <a:masterClrMapping/>
-  </p:clrMapOvr>
-</p:sld>
-</file>
-
-<file path=ppt/slides/slide2.xml><?xml version="1.0" encoding="utf-8"?>
-<p:sld xmlns:a="http://schemas.openxmlformats.org/drawingml/2006/main" xmlns:r="http://schemas.openxmlformats.org/officeDocument/2006/relationships" xmlns:p="http://schemas.openxmlformats.org/presentationml/2006/main">
-  <p:cSld>
-    <p:spTree>
-      <p:nvGrpSpPr>
-        <p:cNvPr id="1" name="Shape 64"/>
-        <p:cNvGrpSpPr/>
-        <p:nvPr/>
-      </p:nvGrpSpPr>
-      <p:grpSpPr>
-        <a:xfrm>
-          <a:off x="0" y="0"/>
-          <a:ext cx="0" cy="0"/>
-          <a:chOff x="0" y="0"/>
-          <a:chExt cx="0" cy="0"/>
-        </a:xfrm>
-      </p:grpSpPr>
-      <p:sp>
-        <p:nvSpPr>
-          <p:cNvPr id="65" name="Google Shape;65;p14"/>
-          <p:cNvSpPr txBox="1">
-            <a:spLocks noGrp="1"/>
-          </p:cNvSpPr>
-          <p:nvPr>
-            <p:ph type="title"/>
-          </p:nvPr>
-        </p:nvSpPr>
-        <p:spPr>
-          <a:prstGeom prst="rect">
-            <a:avLst/>
-          </a:prstGeom>
-        </p:spPr>
-        <p:txBody>
-          <a:bodyPr spcFirstLastPara="1" wrap="square" lIns="91425" tIns="91425" rIns="91425" bIns="91425" anchor="t" anchorCtr="0">
-            <a:noAutofit/>
-          </a:bodyPr>
-          <a:lstStyle/>
-          <a:p>
-            <a:pPr marL="0" lvl="0" indent="0" rtl="0">
-              <a:spcBef>
-                <a:spcPts val="0"/>
-              </a:spcBef>
-              <a:spcAft>
-                <a:spcPts val="0"/>
-              </a:spcAft>
-              <a:buNone/>
-            </a:pPr>
-            <a:r>
-              <a:rPr lang="en" dirty="0"/>
-              <a:t>Overview</a:t>
-            </a:r>
-            <a:endParaRPr dirty="0"/>
-          </a:p>
-        </p:txBody>
-      </p:sp>
-      <p:sp>
-        <p:nvSpPr>
-          <p:cNvPr id="66" name="Google Shape;66;p14"/>
-          <p:cNvSpPr txBox="1">
-            <a:spLocks noGrp="1"/>
-          </p:cNvSpPr>
-          <p:nvPr>
-            <p:ph type="body" idx="1"/>
-          </p:nvPr>
-        </p:nvSpPr>
-        <p:spPr>
-          <a:prstGeom prst="rect">
-            <a:avLst/>
-          </a:prstGeom>
-        </p:spPr>
-        <p:txBody>
-          <a:bodyPr spcFirstLastPara="1" wrap="square" lIns="91425" tIns="91425" rIns="91425" bIns="91425" anchor="t" anchorCtr="0">
-            <a:noAutofit/>
-          </a:bodyPr>
-          <a:lstStyle/>
-          <a:p>
-            <a:pPr marL="457200" lvl="0" indent="-342900" algn="l" rtl="0">
-              <a:spcBef>
-                <a:spcPts val="0"/>
-              </a:spcBef>
-              <a:spcAft>
-                <a:spcPts val="0"/>
-              </a:spcAft>
-              <a:buSzPts val="1800"/>
-              <a:buChar char="-"/>
-            </a:pPr>
-            <a:r>
-              <a:rPr lang="en" dirty="0"/>
-              <a:t>Objectives</a:t>
-            </a:r>
-            <a:endParaRPr dirty="0"/>
-          </a:p>
-          <a:p>
-            <a:pPr marL="457200" lvl="0" indent="-342900" algn="l" rtl="0">
-              <a:spcBef>
-                <a:spcPts val="0"/>
-              </a:spcBef>
-              <a:spcAft>
-                <a:spcPts val="0"/>
-              </a:spcAft>
-              <a:buSzPts val="1800"/>
-              <a:buChar char="-"/>
-            </a:pPr>
-            <a:r>
-              <a:rPr lang="en" dirty="0"/>
-              <a:t>Problem Specifications</a:t>
-            </a:r>
-            <a:endParaRPr dirty="0"/>
-          </a:p>
-          <a:p>
-            <a:pPr marL="457200" lvl="0" indent="-342900" algn="l" rtl="0">
-              <a:spcBef>
-                <a:spcPts val="0"/>
-              </a:spcBef>
-              <a:spcAft>
-                <a:spcPts val="0"/>
-              </a:spcAft>
-              <a:buSzPts val="1800"/>
-              <a:buChar char="-"/>
-            </a:pPr>
-            <a:r>
-              <a:rPr lang="en" dirty="0"/>
-              <a:t>Solution Design</a:t>
-            </a:r>
-            <a:endParaRPr dirty="0"/>
-          </a:p>
-          <a:p>
-            <a:pPr marL="457200" lvl="0" indent="-342900" algn="l" rtl="0">
-              <a:spcBef>
-                <a:spcPts val="0"/>
-              </a:spcBef>
-              <a:spcAft>
-                <a:spcPts val="0"/>
-              </a:spcAft>
-              <a:buSzPts val="1800"/>
-              <a:buChar char="-"/>
-            </a:pPr>
-            <a:r>
-              <a:rPr lang="en" dirty="0"/>
-              <a:t>Tools List</a:t>
-            </a:r>
-            <a:endParaRPr strike="sngStrike" dirty="0">
-              <a:solidFill>
-                <a:srgbClr val="E06666"/>
-              </a:solidFill>
-            </a:endParaRPr>
-          </a:p>
-          <a:p>
-            <a:pPr marL="457200" lvl="0" indent="-342900" algn="l" rtl="0">
-              <a:spcBef>
-                <a:spcPts val="0"/>
-              </a:spcBef>
-              <a:spcAft>
-                <a:spcPts val="0"/>
-              </a:spcAft>
-              <a:buSzPts val="1800"/>
-              <a:buChar char="-"/>
-            </a:pPr>
-            <a:r>
-              <a:rPr lang="en" dirty="0"/>
-              <a:t>Time Schedule</a:t>
-            </a:r>
-            <a:endParaRPr dirty="0"/>
-          </a:p>
-          <a:p>
-            <a:pPr marL="457200" lvl="0" indent="-342900" algn="l" rtl="0">
-              <a:spcBef>
-                <a:spcPts val="0"/>
-              </a:spcBef>
-              <a:spcAft>
-                <a:spcPts val="0"/>
-              </a:spcAft>
-              <a:buSzPts val="1800"/>
-              <a:buChar char="-"/>
-            </a:pPr>
-            <a:r>
-              <a:rPr lang="en" dirty="0"/>
-              <a:t>Grading Scheme</a:t>
-            </a:r>
-            <a:endParaRPr dirty="0"/>
-          </a:p>
-          <a:p>
-            <a:pPr marL="457200" lvl="0" indent="-342900" algn="l" rtl="0">
-              <a:spcBef>
-                <a:spcPts val="0"/>
-              </a:spcBef>
-              <a:spcAft>
-                <a:spcPts val="0"/>
-              </a:spcAft>
-              <a:buSzPts val="1800"/>
-              <a:buChar char="-"/>
-            </a:pPr>
-            <a:r>
-              <a:rPr lang="en" dirty="0"/>
-              <a:t>Questions</a:t>
-            </a:r>
-            <a:endParaRPr dirty="0"/>
-          </a:p>
-        </p:txBody>
-      </p:sp>
-    </p:spTree>
-  </p:cSld>
-  <p:clrMapOvr>
-    <a:masterClrMapping/>
-  </p:clrMapOvr>
-</p:sld>
-</file>
-
-<file path=ppt/slides/slide3.xml><?xml version="1.0" encoding="utf-8"?>
-<p:sld xmlns:a="http://schemas.openxmlformats.org/drawingml/2006/main" xmlns:r="http://schemas.openxmlformats.org/officeDocument/2006/relationships" xmlns:p="http://schemas.openxmlformats.org/presentationml/2006/main">
-  <p:cSld>
-    <p:spTree>
-      <p:nvGrpSpPr>
-        <p:cNvPr id="1" name="Shape 70"/>
-        <p:cNvGrpSpPr/>
-        <p:nvPr/>
-      </p:nvGrpSpPr>
-      <p:grpSpPr>
-        <a:xfrm>
-          <a:off x="0" y="0"/>
-          <a:ext cx="0" cy="0"/>
-          <a:chOff x="0" y="0"/>
-          <a:chExt cx="0" cy="0"/>
-        </a:xfrm>
-      </p:grpSpPr>
-      <p:sp>
-        <p:nvSpPr>
-          <p:cNvPr id="71" name="Google Shape;71;p15"/>
-          <p:cNvSpPr txBox="1">
-            <a:spLocks noGrp="1"/>
-          </p:cNvSpPr>
-          <p:nvPr>
-            <p:ph type="title"/>
-          </p:nvPr>
-        </p:nvSpPr>
-        <p:spPr>
-          <a:prstGeom prst="rect">
-            <a:avLst/>
-          </a:prstGeom>
-        </p:spPr>
-        <p:txBody>
-          <a:bodyPr spcFirstLastPara="1" wrap="square" lIns="91425" tIns="91425" rIns="91425" bIns="91425" anchor="t" anchorCtr="0">
-            <a:noAutofit/>
-          </a:bodyPr>
-          <a:lstStyle/>
-          <a:p>
-            <a:pPr marL="0" lvl="0" indent="0" rtl="0">
-              <a:spcBef>
-                <a:spcPts val="0"/>
-              </a:spcBef>
-              <a:spcAft>
-                <a:spcPts val="0"/>
-              </a:spcAft>
-              <a:buNone/>
-            </a:pPr>
-            <a:r>
-              <a:rPr lang="en" dirty="0"/>
-              <a:t>Objectives</a:t>
-            </a:r>
-            <a:endParaRPr dirty="0"/>
-          </a:p>
-        </p:txBody>
-      </p:sp>
-      <p:sp>
-        <p:nvSpPr>
-          <p:cNvPr id="72" name="Google Shape;72;p15"/>
-          <p:cNvSpPr txBox="1">
-            <a:spLocks noGrp="1"/>
-          </p:cNvSpPr>
-          <p:nvPr>
-            <p:ph type="body" idx="1"/>
-          </p:nvPr>
-        </p:nvSpPr>
-        <p:spPr>
-          <a:prstGeom prst="rect">
-            <a:avLst/>
-          </a:prstGeom>
-        </p:spPr>
-        <p:txBody>
-          <a:bodyPr spcFirstLastPara="1" wrap="square" lIns="91425" tIns="91425" rIns="91425" bIns="91425" anchor="t" anchorCtr="0">
-            <a:noAutofit/>
-          </a:bodyPr>
-          <a:lstStyle/>
-          <a:p>
-            <a:pPr marL="457200" lvl="0" indent="-342900" algn="l" rtl="0">
-              <a:spcBef>
-                <a:spcPts val="0"/>
-              </a:spcBef>
-              <a:spcAft>
-                <a:spcPts val="0"/>
-              </a:spcAft>
-              <a:buSzPts val="1800"/>
-              <a:buChar char="-"/>
-            </a:pPr>
-            <a:r>
-              <a:rPr lang="en" dirty="0"/>
-              <a:t>Learn how to develop a mobile iOS game</a:t>
-            </a:r>
-            <a:endParaRPr dirty="0">
-              <a:solidFill>
-                <a:srgbClr val="E06666"/>
-              </a:solidFill>
-            </a:endParaRPr>
-          </a:p>
-          <a:p>
-            <a:pPr marL="457200" lvl="0" indent="-342900" algn="l" rtl="0">
-              <a:spcBef>
-                <a:spcPts val="0"/>
-              </a:spcBef>
-              <a:spcAft>
-                <a:spcPts val="0"/>
-              </a:spcAft>
-              <a:buSzPts val="1800"/>
-              <a:buChar char="-"/>
-            </a:pPr>
-            <a:r>
-              <a:rPr lang="en" dirty="0"/>
-              <a:t>Learn how to use The Unity Game Engine</a:t>
-            </a:r>
-          </a:p>
-          <a:p>
-            <a:pPr marL="457200" lvl="0" indent="-342900" algn="l" rtl="0">
-              <a:spcBef>
-                <a:spcPts val="0"/>
-              </a:spcBef>
-              <a:spcAft>
-                <a:spcPts val="0"/>
-              </a:spcAft>
-              <a:buSzPts val="1800"/>
-              <a:buChar char="-"/>
-            </a:pPr>
-            <a:r>
-              <a:rPr lang="en" dirty="0"/>
-              <a:t>Learn more about the C# language</a:t>
-            </a:r>
-          </a:p>
-          <a:p>
-            <a:pPr marL="457200" lvl="0" indent="-342900" algn="l" rtl="0">
-              <a:spcBef>
-                <a:spcPts val="0"/>
-              </a:spcBef>
-              <a:spcAft>
-                <a:spcPts val="0"/>
-              </a:spcAft>
-              <a:buSzPts val="1800"/>
-              <a:buChar char="-"/>
-            </a:pPr>
-            <a:r>
-              <a:rPr lang="en" dirty="0"/>
-              <a:t>Further knowledge in Development Lifecycle</a:t>
-            </a:r>
-          </a:p>
-          <a:p>
-            <a:pPr marL="457200" lvl="0" indent="-342900" algn="l" rtl="0">
-              <a:spcBef>
-                <a:spcPts val="0"/>
-              </a:spcBef>
-              <a:spcAft>
-                <a:spcPts val="0"/>
-              </a:spcAft>
-              <a:buSzPts val="1800"/>
-              <a:buChar char="-"/>
-            </a:pPr>
-            <a:r>
-              <a:rPr lang="en" dirty="0"/>
-              <a:t>Implement a database within an IOS Application</a:t>
-            </a:r>
-          </a:p>
-          <a:p>
-            <a:pPr marL="457200" lvl="0" indent="-342900" algn="l" rtl="0">
-              <a:spcBef>
-                <a:spcPts val="0"/>
-              </a:spcBef>
-              <a:spcAft>
-                <a:spcPts val="0"/>
-              </a:spcAft>
-              <a:buSzPts val="1800"/>
-              <a:buChar char="-"/>
-            </a:pPr>
-            <a:r>
-              <a:rPr lang="en" dirty="0"/>
-              <a:t>Satisfying a client need for an applicaiton</a:t>
-            </a:r>
-          </a:p>
-        </p:txBody>
-      </p:sp>
-    </p:spTree>
-  </p:cSld>
-  <p:clrMapOvr>
-    <a:masterClrMapping/>
-  </p:clrMapOvr>
-</p:sld>
-</file>
-
-<file path=ppt/slides/slide4.xml><?xml version="1.0" encoding="utf-8"?>
-<p:sld xmlns:a="http://schemas.openxmlformats.org/drawingml/2006/main" xmlns:r="http://schemas.openxmlformats.org/officeDocument/2006/relationships" xmlns:p="http://schemas.openxmlformats.org/presentationml/2006/main">
-  <p:cSld>
-    <p:spTree>
-      <p:nvGrpSpPr>
-        <p:cNvPr id="1" name="Shape 76"/>
-        <p:cNvGrpSpPr/>
-        <p:nvPr/>
-      </p:nvGrpSpPr>
-      <p:grpSpPr>
-        <a:xfrm>
-          <a:off x="0" y="0"/>
-          <a:ext cx="0" cy="0"/>
-          <a:chOff x="0" y="0"/>
-          <a:chExt cx="0" cy="0"/>
-        </a:xfrm>
-      </p:grpSpPr>
-      <p:sp>
-        <p:nvSpPr>
-          <p:cNvPr id="77" name="Google Shape;77;p16"/>
-          <p:cNvSpPr txBox="1">
-            <a:spLocks noGrp="1"/>
-          </p:cNvSpPr>
-          <p:nvPr>
-            <p:ph type="title"/>
-          </p:nvPr>
-        </p:nvSpPr>
-        <p:spPr>
-          <a:prstGeom prst="rect">
-            <a:avLst/>
-          </a:prstGeom>
-        </p:spPr>
-        <p:txBody>
-          <a:bodyPr spcFirstLastPara="1" wrap="square" lIns="91425" tIns="91425" rIns="91425" bIns="91425" anchor="t" anchorCtr="0">
-            <a:noAutofit/>
-          </a:bodyPr>
-          <a:lstStyle/>
-          <a:p>
-            <a:pPr marL="0" lvl="0" indent="0" rtl="0">
-              <a:spcBef>
-                <a:spcPts val="0"/>
-              </a:spcBef>
-              <a:spcAft>
-                <a:spcPts val="0"/>
-              </a:spcAft>
-              <a:buNone/>
-            </a:pPr>
-            <a:r>
-              <a:rPr lang="en" dirty="0"/>
-              <a:t>Problem Specifications</a:t>
-            </a:r>
-            <a:endParaRPr dirty="0"/>
-          </a:p>
-        </p:txBody>
-      </p:sp>
-      <p:sp>
-        <p:nvSpPr>
-          <p:cNvPr id="78" name="Google Shape;78;p16"/>
-          <p:cNvSpPr txBox="1">
-            <a:spLocks noGrp="1"/>
-          </p:cNvSpPr>
-          <p:nvPr>
-            <p:ph type="body" idx="1"/>
-          </p:nvPr>
-        </p:nvSpPr>
-        <p:spPr>
-          <a:prstGeom prst="rect">
-            <a:avLst/>
-          </a:prstGeom>
-        </p:spPr>
-        <p:txBody>
-          <a:bodyPr spcFirstLastPara="1" wrap="square" lIns="91425" tIns="91425" rIns="91425" bIns="91425" anchor="t" anchorCtr="0">
-            <a:noAutofit/>
-          </a:bodyPr>
-          <a:lstStyle/>
-          <a:p>
-            <a:pPr marL="457200" lvl="0" indent="-342900" algn="l" rtl="0">
-              <a:spcBef>
-                <a:spcPts val="0"/>
-              </a:spcBef>
-              <a:spcAft>
-                <a:spcPts val="0"/>
-              </a:spcAft>
-              <a:buSzPts val="1800"/>
-              <a:buChar char="-"/>
-            </a:pPr>
-            <a:r>
-              <a:rPr lang="en-US" dirty="0"/>
-              <a:t>During COVID, Card games became a nightly routine for my girlfriend and I </a:t>
-            </a:r>
-          </a:p>
-          <a:p>
-            <a:pPr lvl="1" indent="-342900">
-              <a:spcBef>
-                <a:spcPts val="0"/>
-              </a:spcBef>
-              <a:buSzPts val="1800"/>
-              <a:buChar char="-"/>
-            </a:pPr>
-            <a:r>
-              <a:rPr lang="en-US" dirty="0"/>
-              <a:t>Board Games created clutter (small living space)</a:t>
-            </a:r>
-          </a:p>
-          <a:p>
-            <a:pPr lvl="1" indent="-342900">
-              <a:spcBef>
-                <a:spcPts val="0"/>
-              </a:spcBef>
-              <a:buSzPts val="1800"/>
-              <a:buChar char="-"/>
-            </a:pPr>
-            <a:r>
-              <a:rPr lang="en-US" dirty="0"/>
-              <a:t>Lost track of cards quickly</a:t>
-            </a:r>
-          </a:p>
-          <a:p>
-            <a:pPr lvl="1" indent="-342900">
-              <a:spcBef>
-                <a:spcPts val="0"/>
-              </a:spcBef>
-              <a:buSzPts val="1800"/>
-              <a:buChar char="-"/>
-            </a:pPr>
-            <a:r>
-              <a:rPr lang="en-US" dirty="0"/>
-              <a:t>Pet kept making a mess of the piles</a:t>
-            </a:r>
-          </a:p>
-          <a:p>
-            <a:pPr lvl="1" indent="-342900">
-              <a:spcBef>
-                <a:spcPts val="0"/>
-              </a:spcBef>
-              <a:buSzPts val="1800"/>
-              <a:buChar char="-"/>
-            </a:pPr>
-            <a:r>
-              <a:rPr lang="en-US" dirty="0"/>
-              <a:t>Reshuffling and replaying games became annoying</a:t>
-            </a:r>
-          </a:p>
-          <a:p>
-            <a:pPr lvl="1" indent="-342900">
-              <a:spcBef>
-                <a:spcPts val="0"/>
-              </a:spcBef>
-              <a:buSzPts val="1800"/>
-              <a:buChar char="-"/>
-            </a:pPr>
-            <a:r>
-              <a:rPr lang="en-US" dirty="0"/>
-              <a:t>Downloading various games became a potential solution</a:t>
-            </a:r>
-          </a:p>
-          <a:p>
-            <a:pPr lvl="1" indent="-342900">
-              <a:spcBef>
-                <a:spcPts val="0"/>
-              </a:spcBef>
-              <a:buSzPts val="1800"/>
-              <a:buChar char="-"/>
-            </a:pPr>
-            <a:r>
-              <a:rPr lang="en-US" dirty="0"/>
-              <a:t>Downloading this specific game is not possible…No app exists</a:t>
-            </a:r>
-            <a:endParaRPr dirty="0"/>
-          </a:p>
-          <a:p>
-            <a:pPr marL="0" lvl="0" indent="0" algn="l" rtl="0">
-              <a:spcBef>
-                <a:spcPts val="1600"/>
-              </a:spcBef>
-              <a:spcAft>
-                <a:spcPts val="1600"/>
-              </a:spcAft>
-              <a:buNone/>
-            </a:pPr>
-            <a:endParaRPr dirty="0"/>
-          </a:p>
-        </p:txBody>
-      </p:sp>
-    </p:spTree>
-  </p:cSld>
-  <p:clrMapOvr>
-    <a:masterClrMapping/>
-  </p:clrMapOvr>
-</p:sld>
-</file>
-
-<file path=ppt/slides/slide5.xml><?xml version="1.0" encoding="utf-8"?>
-<p:sld xmlns:a="http://schemas.openxmlformats.org/drawingml/2006/main" xmlns:r="http://schemas.openxmlformats.org/officeDocument/2006/relationships" xmlns:p="http://schemas.openxmlformats.org/presentationml/2006/main">
-  <p:cSld>
-    <p:spTree>
-      <p:nvGrpSpPr>
-        <p:cNvPr id="1" name="Shape 84"/>
-        <p:cNvGrpSpPr/>
-        <p:nvPr/>
-      </p:nvGrpSpPr>
-      <p:grpSpPr>
-        <a:xfrm>
-          <a:off x="0" y="0"/>
-          <a:ext cx="0" cy="0"/>
-          <a:chOff x="0" y="0"/>
-          <a:chExt cx="0" cy="0"/>
-        </a:xfrm>
-      </p:grpSpPr>
-      <p:sp>
-        <p:nvSpPr>
-          <p:cNvPr id="85" name="Google Shape;85;p17"/>
-          <p:cNvSpPr txBox="1">
-            <a:spLocks noGrp="1"/>
-          </p:cNvSpPr>
-          <p:nvPr>
-            <p:ph type="title"/>
-          </p:nvPr>
-        </p:nvSpPr>
-        <p:spPr>
-          <a:prstGeom prst="rect">
-            <a:avLst/>
-          </a:prstGeom>
-        </p:spPr>
-        <p:txBody>
-          <a:bodyPr spcFirstLastPara="1" wrap="square" lIns="91425" tIns="91425" rIns="91425" bIns="91425" anchor="t" anchorCtr="0">
-            <a:noAutofit/>
-          </a:bodyPr>
-          <a:lstStyle/>
-          <a:p>
-            <a:pPr marL="0" lvl="0" indent="0" rtl="0">
-              <a:spcBef>
-                <a:spcPts val="0"/>
-              </a:spcBef>
-              <a:spcAft>
-                <a:spcPts val="0"/>
-              </a:spcAft>
-              <a:buNone/>
-            </a:pPr>
-            <a:r>
-              <a:rPr lang="en" dirty="0"/>
-              <a:t>Problem Specifications cont...</a:t>
-            </a:r>
-            <a:endParaRPr dirty="0"/>
-          </a:p>
-        </p:txBody>
-      </p:sp>
-      <p:sp>
-        <p:nvSpPr>
-          <p:cNvPr id="86" name="Google Shape;86;p17"/>
-          <p:cNvSpPr txBox="1">
-            <a:spLocks noGrp="1"/>
-          </p:cNvSpPr>
-          <p:nvPr>
-            <p:ph type="body" idx="1"/>
-          </p:nvPr>
-        </p:nvSpPr>
-        <p:spPr>
-          <a:prstGeom prst="rect">
-            <a:avLst/>
-          </a:prstGeom>
-        </p:spPr>
-        <p:txBody>
-          <a:bodyPr spcFirstLastPara="1" wrap="square" lIns="91425" tIns="91425" rIns="91425" bIns="91425" anchor="t" anchorCtr="0">
-            <a:noAutofit/>
-          </a:bodyPr>
-          <a:lstStyle/>
-          <a:p>
-            <a:pPr marL="457200" lvl="0" indent="-342900" algn="l" rtl="0">
-              <a:spcBef>
-                <a:spcPts val="0"/>
-              </a:spcBef>
-              <a:spcAft>
-                <a:spcPts val="0"/>
-              </a:spcAft>
-              <a:buSzPts val="1800"/>
-              <a:buChar char="-"/>
-            </a:pPr>
-            <a:r>
-              <a:rPr lang="en" dirty="0"/>
-              <a:t>In Devils Grip, the user will be able to:</a:t>
-            </a:r>
-          </a:p>
-          <a:p>
-            <a:pPr lvl="1" indent="-342900">
-              <a:spcBef>
-                <a:spcPts val="0"/>
-              </a:spcBef>
-              <a:buSzPts val="1800"/>
-              <a:buChar char="-"/>
-            </a:pPr>
-            <a:r>
-              <a:rPr lang="en" dirty="0"/>
-              <a:t>Play the game itself </a:t>
-            </a:r>
-          </a:p>
-          <a:p>
-            <a:pPr lvl="1" indent="-342900">
-              <a:spcBef>
-                <a:spcPts val="0"/>
-              </a:spcBef>
-              <a:buSzPts val="1800"/>
-              <a:buChar char="-"/>
-            </a:pPr>
-            <a:r>
-              <a:rPr lang="en" dirty="0"/>
-              <a:t>Choose various backgrounds for cards/background in game</a:t>
-            </a:r>
-          </a:p>
-          <a:p>
-            <a:pPr lvl="1" indent="-342900">
-              <a:spcBef>
-                <a:spcPts val="0"/>
-              </a:spcBef>
-              <a:buSzPts val="1800"/>
-              <a:buChar char="-"/>
-            </a:pPr>
-            <a:r>
-              <a:rPr lang="en" dirty="0"/>
-              <a:t>Change the difficulty</a:t>
-            </a:r>
-          </a:p>
-          <a:p>
-            <a:pPr lvl="1" indent="-342900">
-              <a:spcBef>
-                <a:spcPts val="0"/>
-              </a:spcBef>
-              <a:buSzPts val="1800"/>
-              <a:buChar char="-"/>
-            </a:pPr>
-            <a:r>
-              <a:rPr lang="en-US" dirty="0"/>
-              <a:t>T</a:t>
-            </a:r>
-            <a:r>
-              <a:rPr lang="en" dirty="0"/>
-              <a:t>rack their performance via a Highscore</a:t>
-            </a:r>
-          </a:p>
-          <a:p>
-            <a:pPr lvl="1" indent="-342900">
-              <a:spcBef>
-                <a:spcPts val="0"/>
-              </a:spcBef>
-              <a:buSzPts val="1800"/>
-              <a:buChar char="-"/>
-            </a:pPr>
-            <a:r>
-              <a:rPr lang="en" dirty="0"/>
-              <a:t>Use Anywhere at anytime through IOS device</a:t>
-            </a:r>
-          </a:p>
-          <a:p>
-            <a:pPr lvl="1" indent="-342900">
-              <a:spcBef>
-                <a:spcPts val="0"/>
-              </a:spcBef>
-              <a:buSzPts val="1800"/>
-              <a:buChar char="-"/>
-            </a:pPr>
-            <a:endParaRPr dirty="0"/>
-          </a:p>
-        </p:txBody>
-      </p:sp>
-    </p:spTree>
-  </p:cSld>
-  <p:clrMapOvr>
-    <a:masterClrMapping/>
-  </p:clrMapOvr>
-</p:sld>
-</file>
-
-<file path=ppt/slides/slide6.xml><?xml version="1.0" encoding="utf-8"?>
-<p:sld xmlns:a="http://schemas.openxmlformats.org/drawingml/2006/main" xmlns:r="http://schemas.openxmlformats.org/officeDocument/2006/relationships" xmlns:p="http://schemas.openxmlformats.org/presentationml/2006/main">
-  <p:cSld>
-    <p:spTree>
-      <p:nvGrpSpPr>
-        <p:cNvPr id="1" name="Shape 96"/>
-        <p:cNvGrpSpPr/>
-        <p:nvPr/>
-      </p:nvGrpSpPr>
-      <p:grpSpPr>
-        <a:xfrm>
-          <a:off x="0" y="0"/>
-          <a:ext cx="0" cy="0"/>
-          <a:chOff x="0" y="0"/>
-          <a:chExt cx="0" cy="0"/>
-        </a:xfrm>
-      </p:grpSpPr>
-      <p:sp>
-        <p:nvSpPr>
-          <p:cNvPr id="97" name="Google Shape;97;p19"/>
-          <p:cNvSpPr txBox="1">
-            <a:spLocks noGrp="1"/>
-          </p:cNvSpPr>
-          <p:nvPr>
-            <p:ph type="title"/>
-          </p:nvPr>
-        </p:nvSpPr>
-        <p:spPr>
-          <a:xfrm>
-            <a:off x="321474" y="445025"/>
-            <a:ext cx="3647021" cy="572700"/>
-          </a:xfrm>
-          <a:prstGeom prst="rect">
-            <a:avLst/>
-          </a:prstGeom>
-        </p:spPr>
-        <p:txBody>
-          <a:bodyPr spcFirstLastPara="1" wrap="square" lIns="91425" tIns="91425" rIns="91425" bIns="91425" anchor="t" anchorCtr="0">
-            <a:noAutofit/>
-          </a:bodyPr>
-          <a:lstStyle/>
-          <a:p>
-            <a:pPr marL="0" lvl="0" indent="0" algn="l" rtl="0">
-              <a:spcBef>
-                <a:spcPts val="0"/>
-              </a:spcBef>
-              <a:spcAft>
-                <a:spcPts val="0"/>
-              </a:spcAft>
-              <a:buNone/>
-            </a:pPr>
-            <a:r>
-              <a:rPr lang="en" dirty="0"/>
-              <a:t>Solution Design:Sequence Diagram</a:t>
-            </a:r>
-            <a:endParaRPr dirty="0"/>
-          </a:p>
-        </p:txBody>
-      </p:sp>
-      <p:pic>
-        <p:nvPicPr>
-          <p:cNvPr id="3" name="Picture 2">
-            <a:extLst>
-              <a:ext uri="{FF2B5EF4-FFF2-40B4-BE49-F238E27FC236}">
-                <a16:creationId xmlns:a16="http://schemas.microsoft.com/office/drawing/2014/main" id="{8F4E9681-FCBD-4114-804A-6877E868E2AB}"/>
-              </a:ext>
-            </a:extLst>
-          </p:cNvPr>
-          <p:cNvPicPr>
-            <a:picLocks noChangeAspect="1"/>
-          </p:cNvPicPr>
-          <p:nvPr/>
-        </p:nvPicPr>
-        <p:blipFill>
-          <a:blip r:embed="rId3"/>
-          <a:stretch>
-            <a:fillRect/>
-          </a:stretch>
-        </p:blipFill>
-        <p:spPr>
-          <a:xfrm>
-            <a:off x="4149328" y="0"/>
-            <a:ext cx="4994672" cy="5143500"/>
-          </a:xfrm>
-          <a:prstGeom prst="rect">
-            <a:avLst/>
-          </a:prstGeom>
-        </p:spPr>
-      </p:pic>
-    </p:spTree>
-  </p:cSld>
-  <p:clrMapOvr>
-    <a:masterClrMapping/>
-  </p:clrMapOvr>
-</p:sld>
-</file>
-
-<file path=ppt/slides/slide7.xml><?xml version="1.0" encoding="utf-8"?>
-<p:sld xmlns:a="http://schemas.openxmlformats.org/drawingml/2006/main" xmlns:r="http://schemas.openxmlformats.org/officeDocument/2006/relationships" xmlns:p="http://schemas.openxmlformats.org/presentationml/2006/main">
-  <p:cSld>
-    <p:spTree>
-      <p:nvGrpSpPr>
-        <p:cNvPr id="1" name="Shape 96"/>
-        <p:cNvGrpSpPr/>
-        <p:nvPr/>
-      </p:nvGrpSpPr>
-      <p:grpSpPr>
-        <a:xfrm>
-          <a:off x="0" y="0"/>
-          <a:ext cx="0" cy="0"/>
-          <a:chOff x="0" y="0"/>
-          <a:chExt cx="0" cy="0"/>
-        </a:xfrm>
-      </p:grpSpPr>
-      <p:sp>
-        <p:nvSpPr>
-          <p:cNvPr id="97" name="Google Shape;97;p19"/>
-          <p:cNvSpPr txBox="1">
-            <a:spLocks noGrp="1"/>
-          </p:cNvSpPr>
-          <p:nvPr>
-            <p:ph type="title"/>
-          </p:nvPr>
-        </p:nvSpPr>
-        <p:spPr>
-          <a:xfrm>
-            <a:off x="321474" y="445025"/>
-            <a:ext cx="3647021" cy="572700"/>
-          </a:xfrm>
-          <a:prstGeom prst="rect">
-            <a:avLst/>
-          </a:prstGeom>
-        </p:spPr>
-        <p:txBody>
-          <a:bodyPr spcFirstLastPara="1" wrap="square" lIns="91425" tIns="91425" rIns="91425" bIns="91425" anchor="t" anchorCtr="0">
-            <a:noAutofit/>
-          </a:bodyPr>
-          <a:lstStyle/>
-          <a:p>
-            <a:pPr marL="0" lvl="0" indent="0" algn="l" rtl="0">
-              <a:spcBef>
-                <a:spcPts val="0"/>
-              </a:spcBef>
-              <a:spcAft>
-                <a:spcPts val="0"/>
-              </a:spcAft>
-              <a:buNone/>
-            </a:pPr>
-            <a:r>
-              <a:rPr lang="en" dirty="0"/>
-              <a:t>Solution Design:UML/UI/</a:t>
-            </a:r>
-            <a:br>
-              <a:rPr lang="en" dirty="0"/>
-            </a:br>
-            <a:r>
-              <a:rPr lang="en" dirty="0"/>
-              <a:t>SQL Database Design (Preliminary and subject to change upon implementation)</a:t>
-            </a:r>
-            <a:endParaRPr dirty="0"/>
-          </a:p>
-        </p:txBody>
-      </p:sp>
-      <p:pic>
-        <p:nvPicPr>
-          <p:cNvPr id="5" name="Picture 4">
-            <a:extLst>
-              <a:ext uri="{FF2B5EF4-FFF2-40B4-BE49-F238E27FC236}">
-                <a16:creationId xmlns:a16="http://schemas.microsoft.com/office/drawing/2014/main" id="{1D1E90BC-BE63-48F5-A097-96198FCD8D6C}"/>
-              </a:ext>
-            </a:extLst>
-          </p:cNvPr>
-          <p:cNvPicPr>
-            <a:picLocks noChangeAspect="1"/>
-          </p:cNvPicPr>
-          <p:nvPr/>
-        </p:nvPicPr>
-        <p:blipFill>
-          <a:blip r:embed="rId3"/>
-          <a:stretch>
-            <a:fillRect/>
-          </a:stretch>
-        </p:blipFill>
-        <p:spPr>
-          <a:xfrm>
-            <a:off x="4191303" y="0"/>
-            <a:ext cx="4958247" cy="5143500"/>
-          </a:xfrm>
-          <a:prstGeom prst="rect">
-            <a:avLst/>
-          </a:prstGeom>
-        </p:spPr>
-      </p:pic>
-    </p:spTree>
-    <p:extLst>
-      <p:ext uri="{BB962C8B-B14F-4D97-AF65-F5344CB8AC3E}">
-        <p14:creationId xmlns:p14="http://schemas.microsoft.com/office/powerpoint/2010/main" val="1159490155"/>
-      </p:ext>
-    </p:extLst>
-  </p:cSld>
-  <p:clrMapOvr>
-    <a:masterClrMapping/>
-  </p:clrMapOvr>
-</p:sld>
-</file>
-
-<file path=ppt/slides/slide8.xml><?xml version="1.0" encoding="utf-8"?>
-<p:sld xmlns:a="http://schemas.openxmlformats.org/drawingml/2006/main" xmlns:r="http://schemas.openxmlformats.org/officeDocument/2006/relationships" xmlns:p="http://schemas.openxmlformats.org/presentationml/2006/main">
-  <p:cSld>
-    <p:spTree>
-      <p:nvGrpSpPr>
-        <p:cNvPr id="1" name="Shape 114"/>
-        <p:cNvGrpSpPr/>
-        <p:nvPr/>
-      </p:nvGrpSpPr>
-      <p:grpSpPr>
-        <a:xfrm>
-          <a:off x="0" y="0"/>
-          <a:ext cx="0" cy="0"/>
-          <a:chOff x="0" y="0"/>
-          <a:chExt cx="0" cy="0"/>
-        </a:xfrm>
-      </p:grpSpPr>
-      <p:sp>
-        <p:nvSpPr>
-          <p:cNvPr id="115" name="Google Shape;115;p22"/>
-          <p:cNvSpPr txBox="1">
-            <a:spLocks noGrp="1"/>
-          </p:cNvSpPr>
-          <p:nvPr>
-            <p:ph type="title"/>
-          </p:nvPr>
-        </p:nvSpPr>
-        <p:spPr>
-          <a:prstGeom prst="rect">
-            <a:avLst/>
-          </a:prstGeom>
-        </p:spPr>
-        <p:txBody>
-          <a:bodyPr spcFirstLastPara="1" wrap="square" lIns="91425" tIns="91425" rIns="91425" bIns="91425" anchor="t" anchorCtr="0">
-            <a:noAutofit/>
-          </a:bodyPr>
-          <a:lstStyle/>
-          <a:p>
-            <a:pPr marL="0" lvl="0" indent="0" rtl="0">
-              <a:spcBef>
-                <a:spcPts val="0"/>
-              </a:spcBef>
-              <a:spcAft>
-                <a:spcPts val="0"/>
-              </a:spcAft>
-              <a:buNone/>
-            </a:pPr>
-            <a:r>
-              <a:rPr lang="en" dirty="0"/>
-              <a:t>Tools List</a:t>
-            </a:r>
-            <a:endParaRPr dirty="0"/>
-          </a:p>
-        </p:txBody>
-      </p:sp>
-      <p:sp>
-        <p:nvSpPr>
-          <p:cNvPr id="116" name="Google Shape;116;p22"/>
-          <p:cNvSpPr txBox="1">
-            <a:spLocks noGrp="1"/>
-          </p:cNvSpPr>
-          <p:nvPr>
-            <p:ph type="body" idx="1"/>
-          </p:nvPr>
-        </p:nvSpPr>
-        <p:spPr>
-          <a:prstGeom prst="rect">
-            <a:avLst/>
-          </a:prstGeom>
-        </p:spPr>
-        <p:txBody>
-          <a:bodyPr spcFirstLastPara="1" wrap="square" lIns="91425" tIns="91425" rIns="91425" bIns="91425" anchor="t" anchorCtr="0">
-            <a:noAutofit/>
-          </a:bodyPr>
-          <a:lstStyle/>
-          <a:p>
-            <a:pPr marL="0" lvl="0" indent="0" algn="l" rtl="0">
-              <a:spcBef>
-                <a:spcPts val="0"/>
-              </a:spcBef>
-              <a:spcAft>
-                <a:spcPts val="0"/>
-              </a:spcAft>
-              <a:buNone/>
-            </a:pPr>
-            <a:endParaRPr sz="1100" dirty="0">
-              <a:latin typeface="Times New Roman"/>
-              <a:ea typeface="Times New Roman"/>
-              <a:cs typeface="Times New Roman"/>
-              <a:sym typeface="Times New Roman"/>
-            </a:endParaRPr>
-          </a:p>
-          <a:p>
-            <a:pPr marL="457200" lvl="0" indent="-298450" algn="l" rtl="0">
-              <a:spcBef>
-                <a:spcPts val="0"/>
-              </a:spcBef>
-              <a:spcAft>
-                <a:spcPts val="0"/>
-              </a:spcAft>
-              <a:buClr>
-                <a:srgbClr val="FFFFFF"/>
-              </a:buClr>
-              <a:buSzPts val="1100"/>
-              <a:buFont typeface="Times New Roman"/>
-              <a:buChar char="●"/>
-            </a:pPr>
-            <a:r>
-              <a:rPr lang="en" sz="1100" dirty="0">
-                <a:latin typeface="Times New Roman"/>
-                <a:ea typeface="Times New Roman"/>
-                <a:cs typeface="Times New Roman"/>
-                <a:sym typeface="Times New Roman"/>
-              </a:rPr>
-              <a:t>Github</a:t>
-            </a:r>
-            <a:endParaRPr sz="1100" dirty="0">
-              <a:latin typeface="Times New Roman"/>
-              <a:ea typeface="Times New Roman"/>
-              <a:cs typeface="Times New Roman"/>
-              <a:sym typeface="Times New Roman"/>
-            </a:endParaRPr>
-          </a:p>
-          <a:p>
-            <a:pPr marL="457200" lvl="0" indent="-298450" algn="l" rtl="0">
-              <a:spcBef>
-                <a:spcPts val="0"/>
-              </a:spcBef>
-              <a:spcAft>
-                <a:spcPts val="0"/>
-              </a:spcAft>
-              <a:buClr>
-                <a:srgbClr val="FFFFFF"/>
-              </a:buClr>
-              <a:buSzPts val="1100"/>
-              <a:buFont typeface="Times New Roman"/>
-              <a:buChar char="●"/>
-            </a:pPr>
-            <a:r>
-              <a:rPr lang="en-US" sz="1100" dirty="0">
-                <a:latin typeface="Times New Roman"/>
-                <a:ea typeface="Times New Roman"/>
-                <a:cs typeface="Times New Roman"/>
-                <a:sym typeface="Times New Roman"/>
-              </a:rPr>
-              <a:t>Unity</a:t>
-            </a:r>
-          </a:p>
-          <a:p>
-            <a:pPr marL="457200" lvl="0" indent="-298450" algn="l" rtl="0">
-              <a:spcBef>
-                <a:spcPts val="0"/>
-              </a:spcBef>
-              <a:spcAft>
-                <a:spcPts val="0"/>
-              </a:spcAft>
-              <a:buClr>
-                <a:srgbClr val="FFFFFF"/>
-              </a:buClr>
-              <a:buSzPts val="1100"/>
-              <a:buFont typeface="Times New Roman"/>
-              <a:buChar char="●"/>
-            </a:pPr>
-            <a:r>
-              <a:rPr lang="en-US" sz="1100" dirty="0">
-                <a:latin typeface="Times New Roman"/>
-                <a:ea typeface="Times New Roman"/>
-                <a:cs typeface="Times New Roman"/>
-                <a:sym typeface="Times New Roman"/>
-              </a:rPr>
-              <a:t>Visual Studio</a:t>
-            </a:r>
-          </a:p>
-          <a:p>
-            <a:pPr marL="457200" lvl="0" indent="-298450" algn="l" rtl="0">
-              <a:spcBef>
-                <a:spcPts val="0"/>
-              </a:spcBef>
-              <a:spcAft>
-                <a:spcPts val="0"/>
-              </a:spcAft>
-              <a:buClr>
-                <a:srgbClr val="FFFFFF"/>
-              </a:buClr>
-              <a:buSzPts val="1100"/>
-              <a:buFont typeface="Times New Roman"/>
-              <a:buChar char="●"/>
-            </a:pPr>
-            <a:r>
-              <a:rPr lang="en-US" sz="1100" dirty="0" err="1">
-                <a:latin typeface="Times New Roman"/>
-                <a:ea typeface="Times New Roman"/>
-                <a:cs typeface="Times New Roman"/>
-                <a:sym typeface="Times New Roman"/>
-              </a:rPr>
-              <a:t>Xcode</a:t>
-            </a:r>
-            <a:endParaRPr lang="en-US" sz="1100" dirty="0">
-              <a:latin typeface="Times New Roman"/>
-              <a:ea typeface="Times New Roman"/>
-              <a:cs typeface="Times New Roman"/>
-              <a:sym typeface="Times New Roman"/>
-            </a:endParaRPr>
-          </a:p>
-          <a:p>
-            <a:pPr marL="457200" lvl="0" indent="-298450" algn="l" rtl="0">
-              <a:spcBef>
-                <a:spcPts val="0"/>
-              </a:spcBef>
-              <a:spcAft>
-                <a:spcPts val="0"/>
-              </a:spcAft>
-              <a:buClr>
-                <a:srgbClr val="FFFFFF"/>
-              </a:buClr>
-              <a:buSzPts val="1100"/>
-              <a:buFont typeface="Times New Roman"/>
-              <a:buChar char="●"/>
-            </a:pPr>
-            <a:r>
-              <a:rPr lang="en-US" sz="1100" dirty="0">
-                <a:latin typeface="Times New Roman"/>
-                <a:ea typeface="Times New Roman"/>
-                <a:cs typeface="Times New Roman"/>
-                <a:sym typeface="Times New Roman"/>
-              </a:rPr>
-              <a:t>Swift UI</a:t>
-            </a:r>
-          </a:p>
-          <a:p>
-            <a:pPr marL="457200" lvl="0" indent="-298450" algn="l" rtl="0">
-              <a:spcBef>
-                <a:spcPts val="0"/>
-              </a:spcBef>
-              <a:spcAft>
-                <a:spcPts val="0"/>
-              </a:spcAft>
-              <a:buClr>
-                <a:srgbClr val="FFFFFF"/>
-              </a:buClr>
-              <a:buSzPts val="1100"/>
-              <a:buFont typeface="Times New Roman"/>
-              <a:buChar char="●"/>
-            </a:pPr>
-            <a:r>
-              <a:rPr lang="en-US" sz="1100" dirty="0">
-                <a:latin typeface="Times New Roman"/>
-                <a:ea typeface="Times New Roman"/>
-                <a:cs typeface="Times New Roman"/>
-                <a:sym typeface="Times New Roman"/>
-              </a:rPr>
-              <a:t>Rocket Data</a:t>
-            </a:r>
-          </a:p>
-          <a:p>
-            <a:pPr indent="-298450">
-              <a:buClr>
-                <a:srgbClr val="FFFFFF"/>
-              </a:buClr>
-              <a:buSzPts val="1100"/>
-              <a:buFont typeface="Times New Roman"/>
-              <a:buChar char="●"/>
-            </a:pPr>
-            <a:r>
-              <a:rPr lang="en-US" sz="1100" dirty="0">
-                <a:latin typeface="Times New Roman"/>
-                <a:ea typeface="Times New Roman"/>
-                <a:cs typeface="Times New Roman"/>
-                <a:sym typeface="Times New Roman"/>
-              </a:rPr>
-              <a:t>Core Data (Apple local iOS storage framework)</a:t>
-            </a:r>
-            <a:endParaRPr sz="1100" dirty="0">
-              <a:latin typeface="Times New Roman"/>
-              <a:ea typeface="Times New Roman"/>
-              <a:cs typeface="Times New Roman"/>
-              <a:sym typeface="Times New Roman"/>
-            </a:endParaRPr>
-          </a:p>
-          <a:p>
-            <a:pPr marL="457200" lvl="0" indent="-298450" algn="l" rtl="0">
-              <a:spcBef>
-                <a:spcPts val="0"/>
-              </a:spcBef>
-              <a:spcAft>
-                <a:spcPts val="0"/>
-              </a:spcAft>
-              <a:buClr>
-                <a:srgbClr val="FFFFFF"/>
-              </a:buClr>
-              <a:buSzPts val="1100"/>
-              <a:buFont typeface="Times New Roman"/>
-              <a:buChar char="●"/>
-            </a:pPr>
-            <a:r>
-              <a:rPr lang="en" sz="1100" dirty="0">
-                <a:latin typeface="Times New Roman"/>
-                <a:ea typeface="Times New Roman"/>
-                <a:cs typeface="Times New Roman"/>
-                <a:sym typeface="Times New Roman"/>
-              </a:rPr>
-              <a:t>Xcode’s Emulator</a:t>
-            </a:r>
-            <a:endParaRPr sz="1100" dirty="0">
-              <a:latin typeface="Times New Roman"/>
-              <a:ea typeface="Times New Roman"/>
-              <a:cs typeface="Times New Roman"/>
-              <a:sym typeface="Times New Roman"/>
-            </a:endParaRPr>
-          </a:p>
-          <a:p>
-            <a:pPr marL="457200" lvl="0" indent="-298450" algn="l" rtl="0">
-              <a:spcBef>
-                <a:spcPts val="0"/>
-              </a:spcBef>
-              <a:spcAft>
-                <a:spcPts val="0"/>
-              </a:spcAft>
-              <a:buClr>
-                <a:srgbClr val="FFFFFF"/>
-              </a:buClr>
-              <a:buSzPts val="1100"/>
-              <a:buFont typeface="Times New Roman"/>
-              <a:buChar char="●"/>
-            </a:pPr>
-            <a:r>
-              <a:rPr lang="en" sz="1100" dirty="0">
-                <a:latin typeface="Times New Roman"/>
-                <a:ea typeface="Times New Roman"/>
-                <a:cs typeface="Times New Roman"/>
-                <a:sym typeface="Times New Roman"/>
-              </a:rPr>
-              <a:t>iOS device </a:t>
-            </a:r>
-          </a:p>
-          <a:p>
-            <a:pPr marL="457200" lvl="0" indent="-298450" algn="l" rtl="0">
-              <a:spcBef>
-                <a:spcPts val="0"/>
-              </a:spcBef>
-              <a:spcAft>
-                <a:spcPts val="0"/>
-              </a:spcAft>
-              <a:buClr>
-                <a:srgbClr val="FFFFFF"/>
-              </a:buClr>
-              <a:buSzPts val="1100"/>
-              <a:buFont typeface="Times New Roman"/>
-              <a:buChar char="●"/>
-            </a:pPr>
-            <a:r>
-              <a:rPr lang="en" sz="1100" dirty="0">
-                <a:latin typeface="Times New Roman"/>
-                <a:ea typeface="Times New Roman"/>
-                <a:cs typeface="Times New Roman"/>
-                <a:sym typeface="Times New Roman"/>
-              </a:rPr>
-              <a:t>Windows PC</a:t>
-            </a:r>
-          </a:p>
-          <a:p>
-            <a:pPr marL="457200" lvl="0" indent="-298450" algn="l" rtl="0">
-              <a:spcBef>
-                <a:spcPts val="0"/>
-              </a:spcBef>
-              <a:spcAft>
-                <a:spcPts val="0"/>
-              </a:spcAft>
-              <a:buClr>
-                <a:srgbClr val="FFFFFF"/>
-              </a:buClr>
-              <a:buSzPts val="1100"/>
-              <a:buFont typeface="Times New Roman"/>
-              <a:buChar char="●"/>
-            </a:pPr>
-            <a:r>
-              <a:rPr lang="en" sz="1100" dirty="0">
-                <a:latin typeface="Times New Roman"/>
-                <a:ea typeface="Times New Roman"/>
-                <a:cs typeface="Times New Roman"/>
-                <a:sym typeface="Times New Roman"/>
-              </a:rPr>
-              <a:t>Mac</a:t>
-            </a:r>
-          </a:p>
-          <a:p>
-            <a:pPr marL="0" lvl="0" indent="0" algn="l" rtl="0">
-              <a:spcBef>
-                <a:spcPts val="0"/>
-              </a:spcBef>
-              <a:spcAft>
-                <a:spcPts val="1600"/>
-              </a:spcAft>
-              <a:buNone/>
-            </a:pPr>
-            <a:endParaRPr dirty="0"/>
-          </a:p>
-        </p:txBody>
-      </p:sp>
-    </p:spTree>
-  </p:cSld>
-  <p:clrMapOvr>
-    <a:masterClrMapping/>
-  </p:clrMapOvr>
-</p:sld>
-</file>
-
-<file path=ppt/slides/slide9.xml><?xml version="1.0" encoding="utf-8"?>
 <p:sld xmlns:a="http://schemas.openxmlformats.org/drawingml/2006/main" xmlns:r="http://schemas.openxmlformats.org/officeDocument/2006/relationships" xmlns:p="http://schemas.openxmlformats.org/presentationml/2006/main">
   <p:cSld>
     <p:spTree>
@@ -11168,6 +9458,2236 @@
 </p:sld>
 </file>
 
+<file path=ppt/slides/slide11.xml><?xml version="1.0" encoding="utf-8"?>
+<p:sld xmlns:a="http://schemas.openxmlformats.org/drawingml/2006/main" xmlns:r="http://schemas.openxmlformats.org/officeDocument/2006/relationships" xmlns:p="http://schemas.openxmlformats.org/presentationml/2006/main">
+  <p:cSld>
+    <p:spTree>
+      <p:nvGrpSpPr>
+        <p:cNvPr id="1" name=""/>
+        <p:cNvGrpSpPr/>
+        <p:nvPr/>
+      </p:nvGrpSpPr>
+      <p:grpSpPr>
+        <a:xfrm>
+          <a:off x="0" y="0"/>
+          <a:ext cx="0" cy="0"/>
+          <a:chOff x="0" y="0"/>
+          <a:chExt cx="0" cy="0"/>
+        </a:xfrm>
+      </p:grpSpPr>
+      <p:sp>
+        <p:nvSpPr>
+          <p:cNvPr id="2" name="Title 1">
+            <a:extLst>
+              <a:ext uri="{FF2B5EF4-FFF2-40B4-BE49-F238E27FC236}">
+                <a16:creationId xmlns:a16="http://schemas.microsoft.com/office/drawing/2014/main" id="{0DBAE1D3-2670-465F-A867-905D15C6CF52}"/>
+              </a:ext>
+            </a:extLst>
+          </p:cNvPr>
+          <p:cNvSpPr>
+            <a:spLocks noGrp="1"/>
+          </p:cNvSpPr>
+          <p:nvPr>
+            <p:ph type="title"/>
+          </p:nvPr>
+        </p:nvSpPr>
+        <p:spPr/>
+        <p:txBody>
+          <a:bodyPr/>
+          <a:lstStyle/>
+          <a:p>
+            <a:r>
+              <a:rPr lang="en-US" dirty="0"/>
+              <a:t>Grading Scheme</a:t>
+            </a:r>
+          </a:p>
+        </p:txBody>
+      </p:sp>
+      <p:sp>
+        <p:nvSpPr>
+          <p:cNvPr id="3" name="Text Placeholder 2">
+            <a:extLst>
+              <a:ext uri="{FF2B5EF4-FFF2-40B4-BE49-F238E27FC236}">
+                <a16:creationId xmlns:a16="http://schemas.microsoft.com/office/drawing/2014/main" id="{4281DA53-9098-4B05-B372-7F418EBBA41F}"/>
+              </a:ext>
+            </a:extLst>
+          </p:cNvPr>
+          <p:cNvSpPr>
+            <a:spLocks noGrp="1"/>
+          </p:cNvSpPr>
+          <p:nvPr>
+            <p:ph type="body" idx="1"/>
+          </p:nvPr>
+        </p:nvSpPr>
+        <p:spPr>
+          <a:xfrm>
+            <a:off x="2429435" y="1161440"/>
+            <a:ext cx="5360893" cy="3416400"/>
+          </a:xfrm>
+        </p:spPr>
+        <p:txBody>
+          <a:bodyPr/>
+          <a:lstStyle/>
+          <a:p>
+            <a:r>
+              <a:rPr lang="en-US" sz="1800" dirty="0"/>
+              <a:t>Final Presentation: 10%</a:t>
+            </a:r>
+          </a:p>
+          <a:p>
+            <a:r>
+              <a:rPr lang="en-US" sz="1800" dirty="0"/>
+              <a:t>Report: 10%</a:t>
+            </a:r>
+          </a:p>
+          <a:p>
+            <a:r>
+              <a:rPr lang="en-US" sz="1800" dirty="0"/>
+              <a:t>Test cases: 10%</a:t>
+            </a:r>
+          </a:p>
+          <a:p>
+            <a:r>
+              <a:rPr lang="en-US" sz="1800" dirty="0"/>
+              <a:t>Database Framework Implementation: 10%</a:t>
+            </a:r>
+          </a:p>
+          <a:p>
+            <a:r>
+              <a:rPr lang="en-US" sz="1800" dirty="0"/>
+              <a:t>PC Executable: 20%</a:t>
+            </a:r>
+          </a:p>
+          <a:p>
+            <a:r>
+              <a:rPr lang="en-US" sz="1800" dirty="0"/>
+              <a:t>Mac integration/ UI for IOS: 20%</a:t>
+            </a:r>
+          </a:p>
+          <a:p>
+            <a:r>
+              <a:rPr lang="en-US" sz="1800" dirty="0"/>
+              <a:t>IOS App: 20%</a:t>
+            </a:r>
+          </a:p>
+          <a:p>
+            <a:endParaRPr lang="en-US" dirty="0"/>
+          </a:p>
+          <a:p>
+            <a:endParaRPr lang="en-US" dirty="0"/>
+          </a:p>
+          <a:p>
+            <a:endParaRPr lang="en-US" dirty="0"/>
+          </a:p>
+        </p:txBody>
+      </p:sp>
+    </p:spTree>
+    <p:extLst>
+      <p:ext uri="{BB962C8B-B14F-4D97-AF65-F5344CB8AC3E}">
+        <p14:creationId xmlns:p14="http://schemas.microsoft.com/office/powerpoint/2010/main" val="740749005"/>
+      </p:ext>
+    </p:extLst>
+  </p:cSld>
+  <p:clrMapOvr>
+    <a:masterClrMapping/>
+  </p:clrMapOvr>
+</p:sld>
+</file>
+
+<file path=ppt/slides/slide12.xml><?xml version="1.0" encoding="utf-8"?>
+<p:sld xmlns:a="http://schemas.openxmlformats.org/drawingml/2006/main" xmlns:r="http://schemas.openxmlformats.org/officeDocument/2006/relationships" xmlns:p="http://schemas.openxmlformats.org/presentationml/2006/main">
+  <p:cSld>
+    <p:spTree>
+      <p:nvGrpSpPr>
+        <p:cNvPr id="1" name="Shape 237"/>
+        <p:cNvGrpSpPr/>
+        <p:nvPr/>
+      </p:nvGrpSpPr>
+      <p:grpSpPr>
+        <a:xfrm>
+          <a:off x="0" y="0"/>
+          <a:ext cx="0" cy="0"/>
+          <a:chOff x="0" y="0"/>
+          <a:chExt cx="0" cy="0"/>
+        </a:xfrm>
+      </p:grpSpPr>
+      <p:sp>
+        <p:nvSpPr>
+          <p:cNvPr id="238" name="Google Shape;238;p28"/>
+          <p:cNvSpPr txBox="1">
+            <a:spLocks noGrp="1"/>
+          </p:cNvSpPr>
+          <p:nvPr>
+            <p:ph type="title"/>
+          </p:nvPr>
+        </p:nvSpPr>
+        <p:spPr>
+          <a:prstGeom prst="rect">
+            <a:avLst/>
+          </a:prstGeom>
+        </p:spPr>
+        <p:txBody>
+          <a:bodyPr spcFirstLastPara="1" wrap="square" lIns="91425" tIns="91425" rIns="91425" bIns="91425" anchor="t" anchorCtr="0">
+            <a:noAutofit/>
+          </a:bodyPr>
+          <a:lstStyle/>
+          <a:p>
+            <a:pPr marL="0" lvl="0" indent="0" rtl="0">
+              <a:spcBef>
+                <a:spcPts val="0"/>
+              </a:spcBef>
+              <a:spcAft>
+                <a:spcPts val="0"/>
+              </a:spcAft>
+              <a:buNone/>
+            </a:pPr>
+            <a:r>
+              <a:rPr lang="en" dirty="0"/>
+              <a:t>Deliverables</a:t>
+            </a:r>
+            <a:endParaRPr dirty="0"/>
+          </a:p>
+        </p:txBody>
+      </p:sp>
+      <p:sp>
+        <p:nvSpPr>
+          <p:cNvPr id="3" name="Text Placeholder 2">
+            <a:extLst>
+              <a:ext uri="{FF2B5EF4-FFF2-40B4-BE49-F238E27FC236}">
+                <a16:creationId xmlns:a16="http://schemas.microsoft.com/office/drawing/2014/main" id="{5966776C-FC6C-4C7C-B87F-26CAB876CCE8}"/>
+              </a:ext>
+            </a:extLst>
+          </p:cNvPr>
+          <p:cNvSpPr>
+            <a:spLocks noGrp="1"/>
+          </p:cNvSpPr>
+          <p:nvPr>
+            <p:ph type="body" idx="1"/>
+          </p:nvPr>
+        </p:nvSpPr>
+        <p:spPr/>
+        <p:txBody>
+          <a:bodyPr/>
+          <a:lstStyle/>
+          <a:p>
+            <a:pPr algn="l"/>
+            <a:r>
+              <a:rPr lang="en-US" sz="1200" b="0" i="0" dirty="0">
+                <a:effectLst/>
+              </a:rPr>
+              <a:t>original proposal and presentation file(s) (from CSC 520)</a:t>
+            </a:r>
+          </a:p>
+          <a:p>
+            <a:pPr algn="l"/>
+            <a:r>
+              <a:rPr lang="en-US" sz="1200" b="0" i="0" dirty="0">
+                <a:effectLst/>
+              </a:rPr>
+              <a:t>amendments to the proposal (approved by the project supervisor)</a:t>
+            </a:r>
+          </a:p>
+          <a:p>
+            <a:pPr algn="l"/>
+            <a:r>
+              <a:rPr lang="en-US" sz="1200" b="0" i="0" dirty="0">
+                <a:effectLst/>
+              </a:rPr>
+              <a:t>system architecture diagram(s) (UML, DFD context, etc.), enhanced with details determined during implementation </a:t>
+            </a:r>
+          </a:p>
+          <a:p>
+            <a:pPr algn="l"/>
+            <a:r>
+              <a:rPr lang="en-US" sz="1200" b="0" i="0" dirty="0">
+                <a:effectLst/>
+              </a:rPr>
+              <a:t>appropriately commented source code</a:t>
+            </a:r>
+          </a:p>
+          <a:p>
+            <a:pPr algn="l"/>
+            <a:r>
+              <a:rPr lang="en-US" sz="1200" b="0" i="0" dirty="0">
+                <a:effectLst/>
+              </a:rPr>
+              <a:t>documentation of project functionality (test results, screenshots, video capture of project execution, etc.) </a:t>
+            </a:r>
+          </a:p>
+          <a:p>
+            <a:pPr algn="l"/>
+            <a:r>
+              <a:rPr lang="en-US" sz="1200" b="0" i="0" dirty="0">
+                <a:effectLst/>
+              </a:rPr>
+              <a:t>sample output (screen shots and/or reports)</a:t>
+            </a:r>
+          </a:p>
+          <a:p>
+            <a:pPr algn="l"/>
+            <a:r>
+              <a:rPr lang="en-US" sz="1200" b="0" i="0" dirty="0">
+                <a:effectLst/>
+              </a:rPr>
+              <a:t>executables and/or projects</a:t>
+            </a:r>
+          </a:p>
+          <a:p>
+            <a:pPr algn="l"/>
+            <a:r>
+              <a:rPr lang="en-US" sz="1200" b="0" i="0" dirty="0">
+                <a:effectLst/>
+              </a:rPr>
+              <a:t>presentation documents (used to support the presentation of the completed CSC 521 project), including any presentation file(s)</a:t>
+            </a:r>
+          </a:p>
+          <a:p>
+            <a:pPr algn="l"/>
+            <a:r>
+              <a:rPr lang="en-US" sz="1200" b="0" i="0" dirty="0">
+                <a:effectLst/>
+              </a:rPr>
+              <a:t>project journal: a narrative of the progress of the project, in clear, concise English, including any problems encountered and how said problems were addressed</a:t>
+            </a:r>
+          </a:p>
+          <a:p>
+            <a:pPr algn="l"/>
+            <a:r>
+              <a:rPr lang="en-US" sz="1200" b="0" i="0" dirty="0">
+                <a:effectLst/>
+              </a:rPr>
+              <a:t>project post mortem: a summary of what was learned from the project and (based on that experience) discussion of how various aspects of the project might have been approached differently</a:t>
+            </a:r>
+          </a:p>
+          <a:p>
+            <a:pPr algn="l"/>
+            <a:r>
+              <a:rPr lang="en-US" sz="1200" b="0" i="0" dirty="0">
+                <a:effectLst/>
+              </a:rPr>
+              <a:t>a list of what areas of the proposal (if any) were not completed, including reasons why </a:t>
+            </a:r>
+          </a:p>
+          <a:p>
+            <a:pPr algn="l"/>
+            <a:r>
+              <a:rPr lang="en-US" sz="1200" b="0" i="0" dirty="0">
+                <a:effectLst/>
+              </a:rPr>
+              <a:t>presentation of the completed project (PowerPoint format), including screenshots of the functioning project</a:t>
+            </a:r>
+          </a:p>
+          <a:p>
+            <a:pPr algn="l"/>
+            <a:r>
+              <a:rPr lang="en-US" sz="1200" b="0" i="0" dirty="0">
+                <a:effectLst/>
+              </a:rPr>
+              <a:t>user's manual</a:t>
+            </a:r>
+          </a:p>
+          <a:p>
+            <a:pPr marL="114300" indent="0">
+              <a:buNone/>
+            </a:pPr>
+            <a:endParaRPr lang="en-US" dirty="0"/>
+          </a:p>
+        </p:txBody>
+      </p:sp>
+    </p:spTree>
+  </p:cSld>
+  <p:clrMapOvr>
+    <a:masterClrMapping/>
+  </p:clrMapOvr>
+</p:sld>
+</file>
+
+<file path=ppt/slides/slide13.xml><?xml version="1.0" encoding="utf-8"?>
+<p:sld xmlns:a="http://schemas.openxmlformats.org/drawingml/2006/main" xmlns:r="http://schemas.openxmlformats.org/officeDocument/2006/relationships" xmlns:p="http://schemas.openxmlformats.org/presentationml/2006/main">
+  <p:cSld>
+    <p:spTree>
+      <p:nvGrpSpPr>
+        <p:cNvPr id="1" name="Shape 249"/>
+        <p:cNvGrpSpPr/>
+        <p:nvPr/>
+      </p:nvGrpSpPr>
+      <p:grpSpPr>
+        <a:xfrm>
+          <a:off x="0" y="0"/>
+          <a:ext cx="0" cy="0"/>
+          <a:chOff x="0" y="0"/>
+          <a:chExt cx="0" cy="0"/>
+        </a:xfrm>
+      </p:grpSpPr>
+      <p:sp>
+        <p:nvSpPr>
+          <p:cNvPr id="250" name="Google Shape;250;p30"/>
+          <p:cNvSpPr txBox="1">
+            <a:spLocks noGrp="1"/>
+          </p:cNvSpPr>
+          <p:nvPr>
+            <p:ph type="title"/>
+          </p:nvPr>
+        </p:nvSpPr>
+        <p:spPr>
+          <a:xfrm>
+            <a:off x="311700" y="2109233"/>
+            <a:ext cx="8520600" cy="572700"/>
+          </a:xfrm>
+          <a:prstGeom prst="rect">
+            <a:avLst/>
+          </a:prstGeom>
+        </p:spPr>
+        <p:txBody>
+          <a:bodyPr spcFirstLastPara="1" wrap="square" lIns="91425" tIns="91425" rIns="91425" bIns="91425" anchor="t" anchorCtr="0">
+            <a:noAutofit/>
+          </a:bodyPr>
+          <a:lstStyle/>
+          <a:p>
+            <a:pPr marL="0" lvl="0" indent="0" rtl="0">
+              <a:spcBef>
+                <a:spcPts val="0"/>
+              </a:spcBef>
+              <a:spcAft>
+                <a:spcPts val="0"/>
+              </a:spcAft>
+              <a:buNone/>
+            </a:pPr>
+            <a:r>
+              <a:rPr lang="en" dirty="0"/>
+              <a:t>Questions?</a:t>
+            </a:r>
+            <a:endParaRPr dirty="0"/>
+          </a:p>
+        </p:txBody>
+      </p:sp>
+    </p:spTree>
+  </p:cSld>
+  <p:clrMapOvr>
+    <a:masterClrMapping/>
+  </p:clrMapOvr>
+</p:sld>
+</file>
+
+<file path=ppt/slides/slide2.xml><?xml version="1.0" encoding="utf-8"?>
+<p:sld xmlns:a="http://schemas.openxmlformats.org/drawingml/2006/main" xmlns:r="http://schemas.openxmlformats.org/officeDocument/2006/relationships" xmlns:p="http://schemas.openxmlformats.org/presentationml/2006/main">
+  <p:cSld>
+    <p:spTree>
+      <p:nvGrpSpPr>
+        <p:cNvPr id="1" name="Shape 64"/>
+        <p:cNvGrpSpPr/>
+        <p:nvPr/>
+      </p:nvGrpSpPr>
+      <p:grpSpPr>
+        <a:xfrm>
+          <a:off x="0" y="0"/>
+          <a:ext cx="0" cy="0"/>
+          <a:chOff x="0" y="0"/>
+          <a:chExt cx="0" cy="0"/>
+        </a:xfrm>
+      </p:grpSpPr>
+      <p:sp>
+        <p:nvSpPr>
+          <p:cNvPr id="65" name="Google Shape;65;p14"/>
+          <p:cNvSpPr txBox="1">
+            <a:spLocks noGrp="1"/>
+          </p:cNvSpPr>
+          <p:nvPr>
+            <p:ph type="title"/>
+          </p:nvPr>
+        </p:nvSpPr>
+        <p:spPr>
+          <a:prstGeom prst="rect">
+            <a:avLst/>
+          </a:prstGeom>
+        </p:spPr>
+        <p:txBody>
+          <a:bodyPr spcFirstLastPara="1" wrap="square" lIns="91425" tIns="91425" rIns="91425" bIns="91425" anchor="t" anchorCtr="0">
+            <a:noAutofit/>
+          </a:bodyPr>
+          <a:lstStyle/>
+          <a:p>
+            <a:pPr marL="0" lvl="0" indent="0" rtl="0">
+              <a:spcBef>
+                <a:spcPts val="0"/>
+              </a:spcBef>
+              <a:spcAft>
+                <a:spcPts val="0"/>
+              </a:spcAft>
+              <a:buNone/>
+            </a:pPr>
+            <a:r>
+              <a:rPr lang="en" dirty="0"/>
+              <a:t>Overview</a:t>
+            </a:r>
+            <a:endParaRPr dirty="0"/>
+          </a:p>
+        </p:txBody>
+      </p:sp>
+      <p:sp>
+        <p:nvSpPr>
+          <p:cNvPr id="66" name="Google Shape;66;p14"/>
+          <p:cNvSpPr txBox="1">
+            <a:spLocks noGrp="1"/>
+          </p:cNvSpPr>
+          <p:nvPr>
+            <p:ph type="body" idx="1"/>
+          </p:nvPr>
+        </p:nvSpPr>
+        <p:spPr>
+          <a:prstGeom prst="rect">
+            <a:avLst/>
+          </a:prstGeom>
+        </p:spPr>
+        <p:txBody>
+          <a:bodyPr spcFirstLastPara="1" wrap="square" lIns="91425" tIns="91425" rIns="91425" bIns="91425" anchor="t" anchorCtr="0">
+            <a:noAutofit/>
+          </a:bodyPr>
+          <a:lstStyle/>
+          <a:p>
+            <a:pPr marL="457200" lvl="0" indent="-342900" algn="l" rtl="0">
+              <a:spcBef>
+                <a:spcPts val="0"/>
+              </a:spcBef>
+              <a:spcAft>
+                <a:spcPts val="0"/>
+              </a:spcAft>
+              <a:buSzPts val="1800"/>
+              <a:buChar char="-"/>
+            </a:pPr>
+            <a:r>
+              <a:rPr lang="en" dirty="0"/>
+              <a:t>Objectives</a:t>
+            </a:r>
+            <a:endParaRPr dirty="0"/>
+          </a:p>
+          <a:p>
+            <a:pPr marL="457200" lvl="0" indent="-342900" algn="l" rtl="0">
+              <a:spcBef>
+                <a:spcPts val="0"/>
+              </a:spcBef>
+              <a:spcAft>
+                <a:spcPts val="0"/>
+              </a:spcAft>
+              <a:buSzPts val="1800"/>
+              <a:buChar char="-"/>
+            </a:pPr>
+            <a:r>
+              <a:rPr lang="en" dirty="0"/>
+              <a:t>Problem Specifications</a:t>
+            </a:r>
+            <a:endParaRPr dirty="0"/>
+          </a:p>
+          <a:p>
+            <a:pPr marL="457200" lvl="0" indent="-342900" algn="l" rtl="0">
+              <a:spcBef>
+                <a:spcPts val="0"/>
+              </a:spcBef>
+              <a:spcAft>
+                <a:spcPts val="0"/>
+              </a:spcAft>
+              <a:buSzPts val="1800"/>
+              <a:buChar char="-"/>
+            </a:pPr>
+            <a:r>
+              <a:rPr lang="en" dirty="0"/>
+              <a:t>Solution Process/Design</a:t>
+            </a:r>
+          </a:p>
+          <a:p>
+            <a:pPr lvl="1" indent="-342900">
+              <a:spcBef>
+                <a:spcPts val="0"/>
+              </a:spcBef>
+              <a:buSzPts val="1800"/>
+              <a:buChar char="-"/>
+            </a:pPr>
+            <a:r>
+              <a:rPr lang="en" dirty="0"/>
+              <a:t>Sequence Digram</a:t>
+            </a:r>
+          </a:p>
+          <a:p>
+            <a:pPr lvl="1" indent="-342900">
+              <a:spcBef>
+                <a:spcPts val="0"/>
+              </a:spcBef>
+              <a:buSzPts val="1800"/>
+              <a:buChar char="-"/>
+            </a:pPr>
+            <a:r>
+              <a:rPr lang="en" dirty="0"/>
+              <a:t>UML/UI/DB Framework Design</a:t>
+            </a:r>
+          </a:p>
+          <a:p>
+            <a:pPr lvl="1" indent="-342900">
+              <a:spcBef>
+                <a:spcPts val="0"/>
+              </a:spcBef>
+              <a:buSzPts val="1800"/>
+              <a:buChar char="-"/>
+            </a:pPr>
+            <a:r>
+              <a:rPr lang="en"/>
+              <a:t>Prototypes</a:t>
+            </a:r>
+            <a:endParaRPr lang="en" dirty="0"/>
+          </a:p>
+          <a:p>
+            <a:pPr marL="457200" lvl="0" indent="-342900" algn="l" rtl="0">
+              <a:spcBef>
+                <a:spcPts val="0"/>
+              </a:spcBef>
+              <a:spcAft>
+                <a:spcPts val="0"/>
+              </a:spcAft>
+              <a:buSzPts val="1800"/>
+              <a:buChar char="-"/>
+            </a:pPr>
+            <a:r>
+              <a:rPr lang="en" dirty="0"/>
+              <a:t>Benchmark Specification</a:t>
+            </a:r>
+            <a:endParaRPr dirty="0"/>
+          </a:p>
+          <a:p>
+            <a:pPr marL="457200" lvl="0" indent="-342900" algn="l" rtl="0">
+              <a:spcBef>
+                <a:spcPts val="0"/>
+              </a:spcBef>
+              <a:spcAft>
+                <a:spcPts val="0"/>
+              </a:spcAft>
+              <a:buSzPts val="1800"/>
+              <a:buChar char="-"/>
+            </a:pPr>
+            <a:r>
+              <a:rPr lang="en" dirty="0"/>
+              <a:t>Tools List</a:t>
+            </a:r>
+            <a:endParaRPr strike="sngStrike" dirty="0">
+              <a:solidFill>
+                <a:srgbClr val="E06666"/>
+              </a:solidFill>
+            </a:endParaRPr>
+          </a:p>
+          <a:p>
+            <a:pPr marL="457200" lvl="0" indent="-342900" algn="l" rtl="0">
+              <a:spcBef>
+                <a:spcPts val="0"/>
+              </a:spcBef>
+              <a:spcAft>
+                <a:spcPts val="0"/>
+              </a:spcAft>
+              <a:buSzPts val="1800"/>
+              <a:buChar char="-"/>
+            </a:pPr>
+            <a:r>
+              <a:rPr lang="en" dirty="0"/>
+              <a:t>Time Schedule</a:t>
+            </a:r>
+            <a:endParaRPr dirty="0"/>
+          </a:p>
+          <a:p>
+            <a:pPr marL="457200" lvl="0" indent="-342900" algn="l" rtl="0">
+              <a:spcBef>
+                <a:spcPts val="0"/>
+              </a:spcBef>
+              <a:spcAft>
+                <a:spcPts val="0"/>
+              </a:spcAft>
+              <a:buSzPts val="1800"/>
+              <a:buChar char="-"/>
+            </a:pPr>
+            <a:r>
+              <a:rPr lang="en" dirty="0"/>
+              <a:t>Grading Scheme</a:t>
+            </a:r>
+          </a:p>
+          <a:p>
+            <a:pPr marL="457200" lvl="0" indent="-342900" algn="l" rtl="0">
+              <a:spcBef>
+                <a:spcPts val="0"/>
+              </a:spcBef>
+              <a:spcAft>
+                <a:spcPts val="0"/>
+              </a:spcAft>
+              <a:buSzPts val="1800"/>
+              <a:buChar char="-"/>
+            </a:pPr>
+            <a:r>
+              <a:rPr lang="en" dirty="0"/>
+              <a:t>Deliverables</a:t>
+            </a:r>
+            <a:endParaRPr dirty="0"/>
+          </a:p>
+          <a:p>
+            <a:pPr marL="457200" lvl="0" indent="-342900" algn="l" rtl="0">
+              <a:spcBef>
+                <a:spcPts val="0"/>
+              </a:spcBef>
+              <a:spcAft>
+                <a:spcPts val="0"/>
+              </a:spcAft>
+              <a:buSzPts val="1800"/>
+              <a:buChar char="-"/>
+            </a:pPr>
+            <a:r>
+              <a:rPr lang="en" dirty="0"/>
+              <a:t>Questions</a:t>
+            </a:r>
+            <a:endParaRPr dirty="0"/>
+          </a:p>
+        </p:txBody>
+      </p:sp>
+    </p:spTree>
+  </p:cSld>
+  <p:clrMapOvr>
+    <a:masterClrMapping/>
+  </p:clrMapOvr>
+</p:sld>
+</file>
+
+<file path=ppt/slides/slide3.xml><?xml version="1.0" encoding="utf-8"?>
+<p:sld xmlns:a="http://schemas.openxmlformats.org/drawingml/2006/main" xmlns:r="http://schemas.openxmlformats.org/officeDocument/2006/relationships" xmlns:p="http://schemas.openxmlformats.org/presentationml/2006/main">
+  <p:cSld>
+    <p:spTree>
+      <p:nvGrpSpPr>
+        <p:cNvPr id="1" name="Shape 70"/>
+        <p:cNvGrpSpPr/>
+        <p:nvPr/>
+      </p:nvGrpSpPr>
+      <p:grpSpPr>
+        <a:xfrm>
+          <a:off x="0" y="0"/>
+          <a:ext cx="0" cy="0"/>
+          <a:chOff x="0" y="0"/>
+          <a:chExt cx="0" cy="0"/>
+        </a:xfrm>
+      </p:grpSpPr>
+      <p:sp>
+        <p:nvSpPr>
+          <p:cNvPr id="71" name="Google Shape;71;p15"/>
+          <p:cNvSpPr txBox="1">
+            <a:spLocks noGrp="1"/>
+          </p:cNvSpPr>
+          <p:nvPr>
+            <p:ph type="title"/>
+          </p:nvPr>
+        </p:nvSpPr>
+        <p:spPr>
+          <a:prstGeom prst="rect">
+            <a:avLst/>
+          </a:prstGeom>
+        </p:spPr>
+        <p:txBody>
+          <a:bodyPr spcFirstLastPara="1" wrap="square" lIns="91425" tIns="91425" rIns="91425" bIns="91425" anchor="t" anchorCtr="0">
+            <a:noAutofit/>
+          </a:bodyPr>
+          <a:lstStyle/>
+          <a:p>
+            <a:pPr marL="0" lvl="0" indent="0" rtl="0">
+              <a:spcBef>
+                <a:spcPts val="0"/>
+              </a:spcBef>
+              <a:spcAft>
+                <a:spcPts val="0"/>
+              </a:spcAft>
+              <a:buNone/>
+            </a:pPr>
+            <a:r>
+              <a:rPr lang="en" dirty="0"/>
+              <a:t>Objectives</a:t>
+            </a:r>
+            <a:endParaRPr dirty="0"/>
+          </a:p>
+        </p:txBody>
+      </p:sp>
+      <p:sp>
+        <p:nvSpPr>
+          <p:cNvPr id="72" name="Google Shape;72;p15"/>
+          <p:cNvSpPr txBox="1">
+            <a:spLocks noGrp="1"/>
+          </p:cNvSpPr>
+          <p:nvPr>
+            <p:ph type="body" idx="1"/>
+          </p:nvPr>
+        </p:nvSpPr>
+        <p:spPr>
+          <a:prstGeom prst="rect">
+            <a:avLst/>
+          </a:prstGeom>
+        </p:spPr>
+        <p:txBody>
+          <a:bodyPr spcFirstLastPara="1" wrap="square" lIns="91425" tIns="91425" rIns="91425" bIns="91425" anchor="t" anchorCtr="0">
+            <a:noAutofit/>
+          </a:bodyPr>
+          <a:lstStyle/>
+          <a:p>
+            <a:pPr marL="457200" lvl="0" indent="-342900" algn="l" rtl="0">
+              <a:spcBef>
+                <a:spcPts val="0"/>
+              </a:spcBef>
+              <a:spcAft>
+                <a:spcPts val="0"/>
+              </a:spcAft>
+              <a:buSzPts val="1800"/>
+              <a:buChar char="-"/>
+            </a:pPr>
+            <a:r>
+              <a:rPr lang="en" dirty="0"/>
+              <a:t>Learn how to develop a mobile iOS game</a:t>
+            </a:r>
+            <a:endParaRPr dirty="0">
+              <a:solidFill>
+                <a:srgbClr val="E06666"/>
+              </a:solidFill>
+            </a:endParaRPr>
+          </a:p>
+          <a:p>
+            <a:pPr marL="457200" lvl="0" indent="-342900" algn="l" rtl="0">
+              <a:spcBef>
+                <a:spcPts val="0"/>
+              </a:spcBef>
+              <a:spcAft>
+                <a:spcPts val="0"/>
+              </a:spcAft>
+              <a:buSzPts val="1800"/>
+              <a:buChar char="-"/>
+            </a:pPr>
+            <a:r>
+              <a:rPr lang="en" dirty="0"/>
+              <a:t>Learn how to use The Unity Game Engine</a:t>
+            </a:r>
+          </a:p>
+          <a:p>
+            <a:pPr marL="457200" lvl="0" indent="-342900" algn="l" rtl="0">
+              <a:spcBef>
+                <a:spcPts val="0"/>
+              </a:spcBef>
+              <a:spcAft>
+                <a:spcPts val="0"/>
+              </a:spcAft>
+              <a:buSzPts val="1800"/>
+              <a:buChar char="-"/>
+            </a:pPr>
+            <a:r>
+              <a:rPr lang="en" dirty="0"/>
+              <a:t>Learn more about the C# language</a:t>
+            </a:r>
+          </a:p>
+          <a:p>
+            <a:pPr marL="457200" lvl="0" indent="-342900" algn="l" rtl="0">
+              <a:spcBef>
+                <a:spcPts val="0"/>
+              </a:spcBef>
+              <a:spcAft>
+                <a:spcPts val="0"/>
+              </a:spcAft>
+              <a:buSzPts val="1800"/>
+              <a:buChar char="-"/>
+            </a:pPr>
+            <a:r>
+              <a:rPr lang="en" dirty="0"/>
+              <a:t>Further knowledge in Development Lifecycle</a:t>
+            </a:r>
+          </a:p>
+          <a:p>
+            <a:pPr marL="457200" lvl="0" indent="-342900" algn="l" rtl="0">
+              <a:spcBef>
+                <a:spcPts val="0"/>
+              </a:spcBef>
+              <a:spcAft>
+                <a:spcPts val="0"/>
+              </a:spcAft>
+              <a:buSzPts val="1800"/>
+              <a:buChar char="-"/>
+            </a:pPr>
+            <a:r>
+              <a:rPr lang="en" dirty="0"/>
+              <a:t>Satisfying a client need for an applicaiton</a:t>
+            </a:r>
+          </a:p>
+        </p:txBody>
+      </p:sp>
+    </p:spTree>
+  </p:cSld>
+  <p:clrMapOvr>
+    <a:masterClrMapping/>
+  </p:clrMapOvr>
+</p:sld>
+</file>
+
+<file path=ppt/slides/slide4.xml><?xml version="1.0" encoding="utf-8"?>
+<p:sld xmlns:a="http://schemas.openxmlformats.org/drawingml/2006/main" xmlns:r="http://schemas.openxmlformats.org/officeDocument/2006/relationships" xmlns:p="http://schemas.openxmlformats.org/presentationml/2006/main">
+  <p:cSld>
+    <p:spTree>
+      <p:nvGrpSpPr>
+        <p:cNvPr id="1" name="Shape 76"/>
+        <p:cNvGrpSpPr/>
+        <p:nvPr/>
+      </p:nvGrpSpPr>
+      <p:grpSpPr>
+        <a:xfrm>
+          <a:off x="0" y="0"/>
+          <a:ext cx="0" cy="0"/>
+          <a:chOff x="0" y="0"/>
+          <a:chExt cx="0" cy="0"/>
+        </a:xfrm>
+      </p:grpSpPr>
+      <p:sp>
+        <p:nvSpPr>
+          <p:cNvPr id="77" name="Google Shape;77;p16"/>
+          <p:cNvSpPr txBox="1">
+            <a:spLocks noGrp="1"/>
+          </p:cNvSpPr>
+          <p:nvPr>
+            <p:ph type="title"/>
+          </p:nvPr>
+        </p:nvSpPr>
+        <p:spPr>
+          <a:prstGeom prst="rect">
+            <a:avLst/>
+          </a:prstGeom>
+        </p:spPr>
+        <p:txBody>
+          <a:bodyPr spcFirstLastPara="1" wrap="square" lIns="91425" tIns="91425" rIns="91425" bIns="91425" anchor="t" anchorCtr="0">
+            <a:noAutofit/>
+          </a:bodyPr>
+          <a:lstStyle/>
+          <a:p>
+            <a:pPr marL="0" lvl="0" indent="0" rtl="0">
+              <a:spcBef>
+                <a:spcPts val="0"/>
+              </a:spcBef>
+              <a:spcAft>
+                <a:spcPts val="0"/>
+              </a:spcAft>
+              <a:buNone/>
+            </a:pPr>
+            <a:r>
+              <a:rPr lang="en" dirty="0"/>
+              <a:t>Problem Specifications</a:t>
+            </a:r>
+            <a:endParaRPr dirty="0"/>
+          </a:p>
+        </p:txBody>
+      </p:sp>
+      <p:sp>
+        <p:nvSpPr>
+          <p:cNvPr id="78" name="Google Shape;78;p16"/>
+          <p:cNvSpPr txBox="1">
+            <a:spLocks noGrp="1"/>
+          </p:cNvSpPr>
+          <p:nvPr>
+            <p:ph type="body" idx="1"/>
+          </p:nvPr>
+        </p:nvSpPr>
+        <p:spPr>
+          <a:prstGeom prst="rect">
+            <a:avLst/>
+          </a:prstGeom>
+        </p:spPr>
+        <p:txBody>
+          <a:bodyPr spcFirstLastPara="1" wrap="square" lIns="91425" tIns="91425" rIns="91425" bIns="91425" anchor="t" anchorCtr="0">
+            <a:noAutofit/>
+          </a:bodyPr>
+          <a:lstStyle/>
+          <a:p>
+            <a:pPr marL="457200" lvl="0" indent="-342900" algn="l" rtl="0">
+              <a:spcBef>
+                <a:spcPts val="0"/>
+              </a:spcBef>
+              <a:spcAft>
+                <a:spcPts val="0"/>
+              </a:spcAft>
+              <a:buSzPts val="1800"/>
+              <a:buChar char="-"/>
+            </a:pPr>
+            <a:r>
+              <a:rPr lang="en-US" dirty="0"/>
+              <a:t>During COVID, Card games became a nightly routine for my girlfriend and I </a:t>
+            </a:r>
+          </a:p>
+          <a:p>
+            <a:pPr lvl="1" indent="-342900">
+              <a:spcBef>
+                <a:spcPts val="0"/>
+              </a:spcBef>
+              <a:buSzPts val="1800"/>
+              <a:buChar char="-"/>
+            </a:pPr>
+            <a:r>
+              <a:rPr lang="en-US" dirty="0"/>
+              <a:t>Board Games created clutter (small living space)</a:t>
+            </a:r>
+          </a:p>
+          <a:p>
+            <a:pPr lvl="1" indent="-342900">
+              <a:spcBef>
+                <a:spcPts val="0"/>
+              </a:spcBef>
+              <a:buSzPts val="1800"/>
+              <a:buChar char="-"/>
+            </a:pPr>
+            <a:r>
+              <a:rPr lang="en-US" dirty="0"/>
+              <a:t>Lost track of cards quickly</a:t>
+            </a:r>
+          </a:p>
+          <a:p>
+            <a:pPr lvl="1" indent="-342900">
+              <a:spcBef>
+                <a:spcPts val="0"/>
+              </a:spcBef>
+              <a:buSzPts val="1800"/>
+              <a:buChar char="-"/>
+            </a:pPr>
+            <a:r>
+              <a:rPr lang="en-US" dirty="0"/>
+              <a:t>Pet kept making a mess of the piles</a:t>
+            </a:r>
+          </a:p>
+          <a:p>
+            <a:pPr lvl="1" indent="-342900">
+              <a:spcBef>
+                <a:spcPts val="0"/>
+              </a:spcBef>
+              <a:buSzPts val="1800"/>
+              <a:buChar char="-"/>
+            </a:pPr>
+            <a:r>
+              <a:rPr lang="en-US" dirty="0"/>
+              <a:t>Reshuffling and replaying games became annoying</a:t>
+            </a:r>
+          </a:p>
+          <a:p>
+            <a:pPr lvl="1" indent="-342900">
+              <a:spcBef>
+                <a:spcPts val="0"/>
+              </a:spcBef>
+              <a:buSzPts val="1800"/>
+              <a:buChar char="-"/>
+            </a:pPr>
+            <a:r>
+              <a:rPr lang="en-US" dirty="0"/>
+              <a:t>Downloading various games became a potential solution</a:t>
+            </a:r>
+          </a:p>
+          <a:p>
+            <a:pPr lvl="1" indent="-342900">
+              <a:spcBef>
+                <a:spcPts val="0"/>
+              </a:spcBef>
+              <a:buSzPts val="1800"/>
+              <a:buChar char="-"/>
+            </a:pPr>
+            <a:r>
+              <a:rPr lang="en-US" dirty="0"/>
+              <a:t>Downloading this specific game is (presumably) not possible…No app was found</a:t>
+            </a:r>
+          </a:p>
+          <a:p>
+            <a:pPr lvl="1" indent="-342900">
+              <a:spcBef>
+                <a:spcPts val="0"/>
+              </a:spcBef>
+              <a:buSzPts val="1800"/>
+              <a:buChar char="-"/>
+            </a:pPr>
+            <a:endParaRPr lang="en-US" dirty="0"/>
+          </a:p>
+          <a:p>
+            <a:pPr marL="457200" lvl="0" indent="-342900" algn="l" rtl="0">
+              <a:spcBef>
+                <a:spcPts val="0"/>
+              </a:spcBef>
+              <a:spcAft>
+                <a:spcPts val="0"/>
+              </a:spcAft>
+              <a:buSzPts val="1800"/>
+              <a:buChar char="-"/>
+            </a:pPr>
+            <a:r>
+              <a:rPr lang="en" dirty="0"/>
+              <a:t>In Devils Grip, the user will be able to:</a:t>
+            </a:r>
+          </a:p>
+          <a:p>
+            <a:pPr lvl="1" indent="-342900">
+              <a:spcBef>
+                <a:spcPts val="0"/>
+              </a:spcBef>
+              <a:buSzPts val="1800"/>
+              <a:buChar char="-"/>
+            </a:pPr>
+            <a:r>
+              <a:rPr lang="en" dirty="0"/>
+              <a:t>Play the game itself </a:t>
+            </a:r>
+          </a:p>
+          <a:p>
+            <a:pPr lvl="1" indent="-342900">
+              <a:spcBef>
+                <a:spcPts val="0"/>
+              </a:spcBef>
+              <a:buSzPts val="1800"/>
+              <a:buChar char="-"/>
+            </a:pPr>
+            <a:r>
+              <a:rPr lang="en" dirty="0"/>
+              <a:t>Change the difficulty</a:t>
+            </a:r>
+          </a:p>
+          <a:p>
+            <a:pPr lvl="1" indent="-342900">
+              <a:spcBef>
+                <a:spcPts val="0"/>
+              </a:spcBef>
+              <a:buSzPts val="1800"/>
+              <a:buChar char="-"/>
+            </a:pPr>
+            <a:r>
+              <a:rPr lang="en-US" dirty="0"/>
+              <a:t>T</a:t>
+            </a:r>
+            <a:r>
+              <a:rPr lang="en" dirty="0"/>
+              <a:t>rack their performance via a Highscore</a:t>
+            </a:r>
+          </a:p>
+          <a:p>
+            <a:pPr lvl="1" indent="-342900">
+              <a:spcBef>
+                <a:spcPts val="0"/>
+              </a:spcBef>
+              <a:buSzPts val="1800"/>
+              <a:buChar char="-"/>
+            </a:pPr>
+            <a:r>
+              <a:rPr lang="en" dirty="0"/>
+              <a:t>Use Anywhere at anytime through IOS device</a:t>
+            </a:r>
+          </a:p>
+          <a:p>
+            <a:pPr lvl="1" indent="-342900">
+              <a:spcBef>
+                <a:spcPts val="0"/>
+              </a:spcBef>
+              <a:buSzPts val="1800"/>
+              <a:buChar char="-"/>
+            </a:pPr>
+            <a:endParaRPr dirty="0"/>
+          </a:p>
+        </p:txBody>
+      </p:sp>
+    </p:spTree>
+  </p:cSld>
+  <p:clrMapOvr>
+    <a:masterClrMapping/>
+  </p:clrMapOvr>
+</p:sld>
+</file>
+
+<file path=ppt/slides/slide5.xml><?xml version="1.0" encoding="utf-8"?>
+<p:sld xmlns:a="http://schemas.openxmlformats.org/drawingml/2006/main" xmlns:r="http://schemas.openxmlformats.org/officeDocument/2006/relationships" xmlns:p="http://schemas.openxmlformats.org/presentationml/2006/main">
+  <p:cSld>
+    <p:spTree>
+      <p:nvGrpSpPr>
+        <p:cNvPr id="1" name="Shape 96"/>
+        <p:cNvGrpSpPr/>
+        <p:nvPr/>
+      </p:nvGrpSpPr>
+      <p:grpSpPr>
+        <a:xfrm>
+          <a:off x="0" y="0"/>
+          <a:ext cx="0" cy="0"/>
+          <a:chOff x="0" y="0"/>
+          <a:chExt cx="0" cy="0"/>
+        </a:xfrm>
+      </p:grpSpPr>
+      <p:sp>
+        <p:nvSpPr>
+          <p:cNvPr id="97" name="Google Shape;97;p19"/>
+          <p:cNvSpPr txBox="1">
+            <a:spLocks noGrp="1"/>
+          </p:cNvSpPr>
+          <p:nvPr>
+            <p:ph type="title"/>
+          </p:nvPr>
+        </p:nvSpPr>
+        <p:spPr>
+          <a:xfrm>
+            <a:off x="321474" y="445025"/>
+            <a:ext cx="3647021" cy="572700"/>
+          </a:xfrm>
+          <a:prstGeom prst="rect">
+            <a:avLst/>
+          </a:prstGeom>
+        </p:spPr>
+        <p:txBody>
+          <a:bodyPr spcFirstLastPara="1" wrap="square" lIns="91425" tIns="91425" rIns="91425" bIns="91425" anchor="t" anchorCtr="0">
+            <a:noAutofit/>
+          </a:bodyPr>
+          <a:lstStyle/>
+          <a:p>
+            <a:pPr marL="0" lvl="0" indent="0" algn="l" rtl="0">
+              <a:spcBef>
+                <a:spcPts val="0"/>
+              </a:spcBef>
+              <a:spcAft>
+                <a:spcPts val="0"/>
+              </a:spcAft>
+              <a:buNone/>
+            </a:pPr>
+            <a:r>
+              <a:rPr lang="en" dirty="0"/>
+              <a:t>Solution Design:Sequence Diagram</a:t>
+            </a:r>
+            <a:endParaRPr dirty="0"/>
+          </a:p>
+        </p:txBody>
+      </p:sp>
+      <p:pic>
+        <p:nvPicPr>
+          <p:cNvPr id="4" name="Picture 3">
+            <a:extLst>
+              <a:ext uri="{FF2B5EF4-FFF2-40B4-BE49-F238E27FC236}">
+                <a16:creationId xmlns:a16="http://schemas.microsoft.com/office/drawing/2014/main" id="{155CBD00-65BF-4C46-A503-66C93E194F69}"/>
+              </a:ext>
+            </a:extLst>
+          </p:cNvPr>
+          <p:cNvPicPr/>
+          <p:nvPr/>
+        </p:nvPicPr>
+        <p:blipFill>
+          <a:blip r:embed="rId3">
+            <a:extLst>
+              <a:ext uri="{28A0092B-C50C-407E-A947-70E740481C1C}">
+                <a14:useLocalDpi xmlns:a14="http://schemas.microsoft.com/office/drawing/2010/main" val="0"/>
+              </a:ext>
+            </a:extLst>
+          </a:blip>
+          <a:stretch>
+            <a:fillRect/>
+          </a:stretch>
+        </p:blipFill>
+        <p:spPr>
+          <a:xfrm>
+            <a:off x="3968494" y="0"/>
+            <a:ext cx="5175505" cy="5143500"/>
+          </a:xfrm>
+          <a:prstGeom prst="rect">
+            <a:avLst/>
+          </a:prstGeom>
+        </p:spPr>
+      </p:pic>
+    </p:spTree>
+  </p:cSld>
+  <p:clrMapOvr>
+    <a:masterClrMapping/>
+  </p:clrMapOvr>
+</p:sld>
+</file>
+
+<file path=ppt/slides/slide6.xml><?xml version="1.0" encoding="utf-8"?>
+<p:sld xmlns:a="http://schemas.openxmlformats.org/drawingml/2006/main" xmlns:r="http://schemas.openxmlformats.org/officeDocument/2006/relationships" xmlns:p="http://schemas.openxmlformats.org/presentationml/2006/main">
+  <p:cSld>
+    <p:spTree>
+      <p:nvGrpSpPr>
+        <p:cNvPr id="1" name="Shape 96"/>
+        <p:cNvGrpSpPr/>
+        <p:nvPr/>
+      </p:nvGrpSpPr>
+      <p:grpSpPr>
+        <a:xfrm>
+          <a:off x="0" y="0"/>
+          <a:ext cx="0" cy="0"/>
+          <a:chOff x="0" y="0"/>
+          <a:chExt cx="0" cy="0"/>
+        </a:xfrm>
+      </p:grpSpPr>
+      <p:sp>
+        <p:nvSpPr>
+          <p:cNvPr id="97" name="Google Shape;97;p19"/>
+          <p:cNvSpPr txBox="1">
+            <a:spLocks noGrp="1"/>
+          </p:cNvSpPr>
+          <p:nvPr>
+            <p:ph type="title"/>
+          </p:nvPr>
+        </p:nvSpPr>
+        <p:spPr>
+          <a:xfrm>
+            <a:off x="321474" y="445025"/>
+            <a:ext cx="3647021" cy="572700"/>
+          </a:xfrm>
+          <a:prstGeom prst="rect">
+            <a:avLst/>
+          </a:prstGeom>
+        </p:spPr>
+        <p:txBody>
+          <a:bodyPr spcFirstLastPara="1" wrap="square" lIns="91425" tIns="91425" rIns="91425" bIns="91425" anchor="t" anchorCtr="0">
+            <a:noAutofit/>
+          </a:bodyPr>
+          <a:lstStyle/>
+          <a:p>
+            <a:pPr marL="0" lvl="0" indent="0" algn="l" rtl="0">
+              <a:spcBef>
+                <a:spcPts val="0"/>
+              </a:spcBef>
+              <a:spcAft>
+                <a:spcPts val="0"/>
+              </a:spcAft>
+              <a:buNone/>
+            </a:pPr>
+            <a:r>
+              <a:rPr lang="en" dirty="0"/>
+              <a:t>Solution Design:UML/UI/</a:t>
+            </a:r>
+            <a:br>
+              <a:rPr lang="en" dirty="0"/>
+            </a:br>
+            <a:r>
+              <a:rPr lang="en" dirty="0"/>
+              <a:t>Database Design (Preliminary and subject to change upon implementation)</a:t>
+            </a:r>
+            <a:endParaRPr dirty="0"/>
+          </a:p>
+        </p:txBody>
+      </p:sp>
+      <p:pic>
+        <p:nvPicPr>
+          <p:cNvPr id="2" name="Picture 1">
+            <a:extLst>
+              <a:ext uri="{FF2B5EF4-FFF2-40B4-BE49-F238E27FC236}">
+                <a16:creationId xmlns:a16="http://schemas.microsoft.com/office/drawing/2014/main" id="{ACAD1889-2871-44E9-8C22-DE3EB2C37BEB}"/>
+              </a:ext>
+            </a:extLst>
+          </p:cNvPr>
+          <p:cNvPicPr>
+            <a:picLocks noChangeAspect="1"/>
+          </p:cNvPicPr>
+          <p:nvPr/>
+        </p:nvPicPr>
+        <p:blipFill>
+          <a:blip r:embed="rId3"/>
+          <a:stretch>
+            <a:fillRect/>
+          </a:stretch>
+        </p:blipFill>
+        <p:spPr>
+          <a:xfrm>
+            <a:off x="5120349" y="0"/>
+            <a:ext cx="4062382" cy="5143500"/>
+          </a:xfrm>
+          <a:prstGeom prst="rect">
+            <a:avLst/>
+          </a:prstGeom>
+        </p:spPr>
+      </p:pic>
+    </p:spTree>
+    <p:extLst>
+      <p:ext uri="{BB962C8B-B14F-4D97-AF65-F5344CB8AC3E}">
+        <p14:creationId xmlns:p14="http://schemas.microsoft.com/office/powerpoint/2010/main" val="1159490155"/>
+      </p:ext>
+    </p:extLst>
+  </p:cSld>
+  <p:clrMapOvr>
+    <a:masterClrMapping/>
+  </p:clrMapOvr>
+</p:sld>
+</file>
+
+<file path=ppt/slides/slide7.xml><?xml version="1.0" encoding="utf-8"?>
+<p:sld xmlns:a="http://schemas.openxmlformats.org/drawingml/2006/main" xmlns:r="http://schemas.openxmlformats.org/officeDocument/2006/relationships" xmlns:p="http://schemas.openxmlformats.org/presentationml/2006/main">
+  <p:cSld>
+    <p:spTree>
+      <p:nvGrpSpPr>
+        <p:cNvPr id="1" name="Shape 96"/>
+        <p:cNvGrpSpPr/>
+        <p:nvPr/>
+      </p:nvGrpSpPr>
+      <p:grpSpPr>
+        <a:xfrm>
+          <a:off x="0" y="0"/>
+          <a:ext cx="0" cy="0"/>
+          <a:chOff x="0" y="0"/>
+          <a:chExt cx="0" cy="0"/>
+        </a:xfrm>
+      </p:grpSpPr>
+      <p:sp>
+        <p:nvSpPr>
+          <p:cNvPr id="97" name="Google Shape;97;p19"/>
+          <p:cNvSpPr txBox="1">
+            <a:spLocks noGrp="1"/>
+          </p:cNvSpPr>
+          <p:nvPr>
+            <p:ph type="title"/>
+          </p:nvPr>
+        </p:nvSpPr>
+        <p:spPr>
+          <a:xfrm>
+            <a:off x="1940231" y="0"/>
+            <a:ext cx="5263538" cy="572700"/>
+          </a:xfrm>
+          <a:prstGeom prst="rect">
+            <a:avLst/>
+          </a:prstGeom>
+        </p:spPr>
+        <p:txBody>
+          <a:bodyPr spcFirstLastPara="1" wrap="square" lIns="91425" tIns="91425" rIns="91425" bIns="91425" anchor="t" anchorCtr="0">
+            <a:noAutofit/>
+          </a:bodyPr>
+          <a:lstStyle/>
+          <a:p>
+            <a:pPr marL="0" lvl="0" indent="0" rtl="0">
+              <a:spcBef>
+                <a:spcPts val="0"/>
+              </a:spcBef>
+              <a:spcAft>
+                <a:spcPts val="0"/>
+              </a:spcAft>
+              <a:buNone/>
+            </a:pPr>
+            <a:r>
+              <a:rPr lang="en" dirty="0"/>
+              <a:t>Solution Design:Prototypes</a:t>
+            </a:r>
+            <a:endParaRPr dirty="0"/>
+          </a:p>
+        </p:txBody>
+      </p:sp>
+      <p:pic>
+        <p:nvPicPr>
+          <p:cNvPr id="4" name="Picture 3">
+            <a:extLst>
+              <a:ext uri="{FF2B5EF4-FFF2-40B4-BE49-F238E27FC236}">
+                <a16:creationId xmlns:a16="http://schemas.microsoft.com/office/drawing/2014/main" id="{2CD66AF1-FADE-47A0-B531-C0F4D76E946E}"/>
+              </a:ext>
+            </a:extLst>
+          </p:cNvPr>
+          <p:cNvPicPr/>
+          <p:nvPr/>
+        </p:nvPicPr>
+        <p:blipFill>
+          <a:blip r:embed="rId3"/>
+          <a:stretch>
+            <a:fillRect/>
+          </a:stretch>
+        </p:blipFill>
+        <p:spPr>
+          <a:xfrm>
+            <a:off x="170329" y="853589"/>
+            <a:ext cx="2671483" cy="1459305"/>
+          </a:xfrm>
+          <a:prstGeom prst="rect">
+            <a:avLst/>
+          </a:prstGeom>
+        </p:spPr>
+      </p:pic>
+      <p:pic>
+        <p:nvPicPr>
+          <p:cNvPr id="6" name="Picture 5">
+            <a:extLst>
+              <a:ext uri="{FF2B5EF4-FFF2-40B4-BE49-F238E27FC236}">
+                <a16:creationId xmlns:a16="http://schemas.microsoft.com/office/drawing/2014/main" id="{F2C70A6A-D891-4C4E-A9E9-33362D20C2F0}"/>
+              </a:ext>
+            </a:extLst>
+          </p:cNvPr>
+          <p:cNvPicPr/>
+          <p:nvPr/>
+        </p:nvPicPr>
+        <p:blipFill>
+          <a:blip r:embed="rId4"/>
+          <a:stretch>
+            <a:fillRect/>
+          </a:stretch>
+        </p:blipFill>
+        <p:spPr>
+          <a:xfrm>
+            <a:off x="3155576" y="853588"/>
+            <a:ext cx="2671483" cy="1459305"/>
+          </a:xfrm>
+          <a:prstGeom prst="rect">
+            <a:avLst/>
+          </a:prstGeom>
+        </p:spPr>
+      </p:pic>
+      <p:pic>
+        <p:nvPicPr>
+          <p:cNvPr id="7" name="Picture 6">
+            <a:extLst>
+              <a:ext uri="{FF2B5EF4-FFF2-40B4-BE49-F238E27FC236}">
+                <a16:creationId xmlns:a16="http://schemas.microsoft.com/office/drawing/2014/main" id="{AE09F49A-0D86-424B-9FC1-776F480814B3}"/>
+              </a:ext>
+            </a:extLst>
+          </p:cNvPr>
+          <p:cNvPicPr/>
+          <p:nvPr/>
+        </p:nvPicPr>
+        <p:blipFill>
+          <a:blip r:embed="rId5"/>
+          <a:stretch>
+            <a:fillRect/>
+          </a:stretch>
+        </p:blipFill>
+        <p:spPr>
+          <a:xfrm>
+            <a:off x="6140823" y="853588"/>
+            <a:ext cx="2671483" cy="1459305"/>
+          </a:xfrm>
+          <a:prstGeom prst="rect">
+            <a:avLst/>
+          </a:prstGeom>
+        </p:spPr>
+      </p:pic>
+      <p:pic>
+        <p:nvPicPr>
+          <p:cNvPr id="8" name="Picture 7">
+            <a:extLst>
+              <a:ext uri="{FF2B5EF4-FFF2-40B4-BE49-F238E27FC236}">
+                <a16:creationId xmlns:a16="http://schemas.microsoft.com/office/drawing/2014/main" id="{D7AA91E2-24D6-4B15-AADA-D1A6AE0E042F}"/>
+              </a:ext>
+            </a:extLst>
+          </p:cNvPr>
+          <p:cNvPicPr/>
+          <p:nvPr/>
+        </p:nvPicPr>
+        <p:blipFill>
+          <a:blip r:embed="rId6"/>
+          <a:stretch>
+            <a:fillRect/>
+          </a:stretch>
+        </p:blipFill>
+        <p:spPr>
+          <a:xfrm>
+            <a:off x="170329" y="2593783"/>
+            <a:ext cx="2671483" cy="1459305"/>
+          </a:xfrm>
+          <a:prstGeom prst="rect">
+            <a:avLst/>
+          </a:prstGeom>
+        </p:spPr>
+      </p:pic>
+      <p:pic>
+        <p:nvPicPr>
+          <p:cNvPr id="9" name="Picture 8">
+            <a:extLst>
+              <a:ext uri="{FF2B5EF4-FFF2-40B4-BE49-F238E27FC236}">
+                <a16:creationId xmlns:a16="http://schemas.microsoft.com/office/drawing/2014/main" id="{47EF3032-E673-4CE8-A44A-A201C0E497B8}"/>
+              </a:ext>
+            </a:extLst>
+          </p:cNvPr>
+          <p:cNvPicPr/>
+          <p:nvPr/>
+        </p:nvPicPr>
+        <p:blipFill>
+          <a:blip r:embed="rId7"/>
+          <a:stretch>
+            <a:fillRect/>
+          </a:stretch>
+        </p:blipFill>
+        <p:spPr>
+          <a:xfrm>
+            <a:off x="3155576" y="2571750"/>
+            <a:ext cx="2671483" cy="1459305"/>
+          </a:xfrm>
+          <a:prstGeom prst="rect">
+            <a:avLst/>
+          </a:prstGeom>
+        </p:spPr>
+      </p:pic>
+      <p:pic>
+        <p:nvPicPr>
+          <p:cNvPr id="10" name="Picture 9">
+            <a:extLst>
+              <a:ext uri="{FF2B5EF4-FFF2-40B4-BE49-F238E27FC236}">
+                <a16:creationId xmlns:a16="http://schemas.microsoft.com/office/drawing/2014/main" id="{7A4DE171-9623-49E5-9A87-3798711391ED}"/>
+              </a:ext>
+            </a:extLst>
+          </p:cNvPr>
+          <p:cNvPicPr/>
+          <p:nvPr/>
+        </p:nvPicPr>
+        <p:blipFill>
+          <a:blip r:embed="rId8"/>
+          <a:stretch>
+            <a:fillRect/>
+          </a:stretch>
+        </p:blipFill>
+        <p:spPr>
+          <a:xfrm>
+            <a:off x="6140823" y="2603788"/>
+            <a:ext cx="2671483" cy="1459305"/>
+          </a:xfrm>
+          <a:prstGeom prst="rect">
+            <a:avLst/>
+          </a:prstGeom>
+        </p:spPr>
+      </p:pic>
+    </p:spTree>
+    <p:extLst>
+      <p:ext uri="{BB962C8B-B14F-4D97-AF65-F5344CB8AC3E}">
+        <p14:creationId xmlns:p14="http://schemas.microsoft.com/office/powerpoint/2010/main" val="1801052186"/>
+      </p:ext>
+    </p:extLst>
+  </p:cSld>
+  <p:clrMapOvr>
+    <a:masterClrMapping/>
+  </p:clrMapOvr>
+</p:sld>
+</file>
+
+<file path=ppt/slides/slide8.xml><?xml version="1.0" encoding="utf-8"?>
+<p:sld xmlns:a="http://schemas.openxmlformats.org/drawingml/2006/main" xmlns:r="http://schemas.openxmlformats.org/officeDocument/2006/relationships" xmlns:p="http://schemas.openxmlformats.org/presentationml/2006/main">
+  <p:cSld>
+    <p:spTree>
+      <p:nvGrpSpPr>
+        <p:cNvPr id="1" name="Shape 114"/>
+        <p:cNvGrpSpPr/>
+        <p:nvPr/>
+      </p:nvGrpSpPr>
+      <p:grpSpPr>
+        <a:xfrm>
+          <a:off x="0" y="0"/>
+          <a:ext cx="0" cy="0"/>
+          <a:chOff x="0" y="0"/>
+          <a:chExt cx="0" cy="0"/>
+        </a:xfrm>
+      </p:grpSpPr>
+      <p:sp>
+        <p:nvSpPr>
+          <p:cNvPr id="115" name="Google Shape;115;p22"/>
+          <p:cNvSpPr txBox="1">
+            <a:spLocks noGrp="1"/>
+          </p:cNvSpPr>
+          <p:nvPr>
+            <p:ph type="title"/>
+          </p:nvPr>
+        </p:nvSpPr>
+        <p:spPr>
+          <a:prstGeom prst="rect">
+            <a:avLst/>
+          </a:prstGeom>
+        </p:spPr>
+        <p:txBody>
+          <a:bodyPr spcFirstLastPara="1" wrap="square" lIns="91425" tIns="91425" rIns="91425" bIns="91425" anchor="t" anchorCtr="0">
+            <a:noAutofit/>
+          </a:bodyPr>
+          <a:lstStyle/>
+          <a:p>
+            <a:pPr marL="0" lvl="0" indent="0" rtl="0">
+              <a:spcBef>
+                <a:spcPts val="0"/>
+              </a:spcBef>
+              <a:spcAft>
+                <a:spcPts val="0"/>
+              </a:spcAft>
+              <a:buNone/>
+            </a:pPr>
+            <a:r>
+              <a:rPr lang="en" dirty="0"/>
+              <a:t>Benchmark Specification</a:t>
+            </a:r>
+            <a:endParaRPr dirty="0"/>
+          </a:p>
+        </p:txBody>
+      </p:sp>
+      <p:sp>
+        <p:nvSpPr>
+          <p:cNvPr id="116" name="Google Shape;116;p22"/>
+          <p:cNvSpPr txBox="1">
+            <a:spLocks noGrp="1"/>
+          </p:cNvSpPr>
+          <p:nvPr>
+            <p:ph type="body" idx="1"/>
+          </p:nvPr>
+        </p:nvSpPr>
+        <p:spPr>
+          <a:prstGeom prst="rect">
+            <a:avLst/>
+          </a:prstGeom>
+        </p:spPr>
+        <p:txBody>
+          <a:bodyPr spcFirstLastPara="1" wrap="square" lIns="91425" tIns="91425" rIns="91425" bIns="91425" anchor="t" anchorCtr="0">
+            <a:noAutofit/>
+          </a:bodyPr>
+          <a:lstStyle/>
+          <a:p>
+            <a:pPr marL="0" lvl="0" indent="0" algn="l" rtl="0">
+              <a:spcBef>
+                <a:spcPts val="0"/>
+              </a:spcBef>
+              <a:spcAft>
+                <a:spcPts val="0"/>
+              </a:spcAft>
+              <a:buNone/>
+            </a:pPr>
+            <a:endParaRPr sz="1100" dirty="0">
+              <a:latin typeface="Times New Roman"/>
+              <a:ea typeface="Times New Roman"/>
+              <a:cs typeface="Times New Roman"/>
+              <a:sym typeface="Times New Roman"/>
+            </a:endParaRPr>
+          </a:p>
+          <a:p>
+            <a:pPr marL="457200" lvl="0" indent="-342900" algn="l" rtl="0">
+              <a:spcBef>
+                <a:spcPts val="0"/>
+              </a:spcBef>
+              <a:spcAft>
+                <a:spcPts val="0"/>
+              </a:spcAft>
+              <a:buSzPts val="1800"/>
+              <a:buChar char="-"/>
+            </a:pPr>
+            <a:r>
+              <a:rPr lang="en-US" sz="1200" dirty="0"/>
+              <a:t>Benchmark One</a:t>
+            </a:r>
+          </a:p>
+          <a:p>
+            <a:pPr lvl="1" indent="-342900">
+              <a:spcBef>
+                <a:spcPts val="0"/>
+              </a:spcBef>
+              <a:buSzPts val="1800"/>
+              <a:buChar char="-"/>
+            </a:pPr>
+            <a:r>
+              <a:rPr lang="en-US" sz="1200" dirty="0"/>
+              <a:t>Playable on PC through Unity Development and Implementation</a:t>
+            </a:r>
+          </a:p>
+          <a:p>
+            <a:pPr>
+              <a:buChar char="-"/>
+            </a:pPr>
+            <a:endParaRPr lang="en-US" sz="1200" dirty="0"/>
+          </a:p>
+          <a:p>
+            <a:pPr>
+              <a:buChar char="-"/>
+            </a:pPr>
+            <a:r>
+              <a:rPr lang="en-US" sz="1200" dirty="0"/>
+              <a:t>Benchmark Two</a:t>
+            </a:r>
+          </a:p>
+          <a:p>
+            <a:pPr lvl="1">
+              <a:buChar char="-"/>
+            </a:pPr>
+            <a:r>
+              <a:rPr lang="en-US" sz="1200" dirty="0"/>
+              <a:t>Exportation to XCode for IOS development</a:t>
+            </a:r>
+          </a:p>
+          <a:p>
+            <a:pPr>
+              <a:buChar char="-"/>
+            </a:pPr>
+            <a:endParaRPr lang="en-US" sz="1200" dirty="0"/>
+          </a:p>
+          <a:p>
+            <a:pPr>
+              <a:buChar char="-"/>
+            </a:pPr>
+            <a:r>
+              <a:rPr lang="en-US" sz="1200" dirty="0"/>
+              <a:t>Benchmark Three</a:t>
+            </a:r>
+          </a:p>
+          <a:p>
+            <a:pPr lvl="1">
+              <a:buChar char="-"/>
+            </a:pPr>
+            <a:r>
+              <a:rPr lang="en-US" sz="1200" dirty="0"/>
+              <a:t>Swift UI completion</a:t>
+            </a:r>
+          </a:p>
+          <a:p>
+            <a:pPr>
+              <a:buChar char="-"/>
+            </a:pPr>
+            <a:endParaRPr lang="en-US" sz="1200" dirty="0"/>
+          </a:p>
+          <a:p>
+            <a:pPr>
+              <a:buChar char="-"/>
+            </a:pPr>
+            <a:r>
+              <a:rPr lang="en-US" sz="1200" dirty="0"/>
+              <a:t>Benchmark Four</a:t>
+            </a:r>
+          </a:p>
+          <a:p>
+            <a:pPr lvl="1">
+              <a:buChar char="-"/>
+            </a:pPr>
+            <a:r>
+              <a:rPr lang="en-US" sz="1200" dirty="0"/>
+              <a:t>Playable on IOS Device</a:t>
+            </a:r>
+          </a:p>
+          <a:p>
+            <a:pPr marL="742950" lvl="1" indent="-285750">
+              <a:spcAft>
+                <a:spcPts val="1600"/>
+              </a:spcAft>
+            </a:pPr>
+            <a:endParaRPr lang="en-US" dirty="0"/>
+          </a:p>
+        </p:txBody>
+      </p:sp>
+    </p:spTree>
+  </p:cSld>
+  <p:clrMapOvr>
+    <a:masterClrMapping/>
+  </p:clrMapOvr>
+</p:sld>
+</file>
+
+<file path=ppt/slides/slide9.xml><?xml version="1.0" encoding="utf-8"?>
+<p:sld xmlns:a="http://schemas.openxmlformats.org/drawingml/2006/main" xmlns:r="http://schemas.openxmlformats.org/officeDocument/2006/relationships" xmlns:p="http://schemas.openxmlformats.org/presentationml/2006/main">
+  <p:cSld>
+    <p:spTree>
+      <p:nvGrpSpPr>
+        <p:cNvPr id="1" name="Shape 114"/>
+        <p:cNvGrpSpPr/>
+        <p:nvPr/>
+      </p:nvGrpSpPr>
+      <p:grpSpPr>
+        <a:xfrm>
+          <a:off x="0" y="0"/>
+          <a:ext cx="0" cy="0"/>
+          <a:chOff x="0" y="0"/>
+          <a:chExt cx="0" cy="0"/>
+        </a:xfrm>
+      </p:grpSpPr>
+      <p:sp>
+        <p:nvSpPr>
+          <p:cNvPr id="115" name="Google Shape;115;p22"/>
+          <p:cNvSpPr txBox="1">
+            <a:spLocks noGrp="1"/>
+          </p:cNvSpPr>
+          <p:nvPr>
+            <p:ph type="title"/>
+          </p:nvPr>
+        </p:nvSpPr>
+        <p:spPr>
+          <a:prstGeom prst="rect">
+            <a:avLst/>
+          </a:prstGeom>
+        </p:spPr>
+        <p:txBody>
+          <a:bodyPr spcFirstLastPara="1" wrap="square" lIns="91425" tIns="91425" rIns="91425" bIns="91425" anchor="t" anchorCtr="0">
+            <a:noAutofit/>
+          </a:bodyPr>
+          <a:lstStyle/>
+          <a:p>
+            <a:pPr marL="0" lvl="0" indent="0" rtl="0">
+              <a:spcBef>
+                <a:spcPts val="0"/>
+              </a:spcBef>
+              <a:spcAft>
+                <a:spcPts val="0"/>
+              </a:spcAft>
+              <a:buNone/>
+            </a:pPr>
+            <a:r>
+              <a:rPr lang="en" dirty="0"/>
+              <a:t>Tools List</a:t>
+            </a:r>
+            <a:endParaRPr dirty="0"/>
+          </a:p>
+        </p:txBody>
+      </p:sp>
+      <p:sp>
+        <p:nvSpPr>
+          <p:cNvPr id="116" name="Google Shape;116;p22"/>
+          <p:cNvSpPr txBox="1">
+            <a:spLocks noGrp="1"/>
+          </p:cNvSpPr>
+          <p:nvPr>
+            <p:ph type="body" idx="1"/>
+          </p:nvPr>
+        </p:nvSpPr>
+        <p:spPr>
+          <a:prstGeom prst="rect">
+            <a:avLst/>
+          </a:prstGeom>
+        </p:spPr>
+        <p:txBody>
+          <a:bodyPr spcFirstLastPara="1" wrap="square" lIns="91425" tIns="91425" rIns="91425" bIns="91425" anchor="t" anchorCtr="0">
+            <a:noAutofit/>
+          </a:bodyPr>
+          <a:lstStyle/>
+          <a:p>
+            <a:pPr marL="0" lvl="0" indent="0" algn="l" rtl="0">
+              <a:spcBef>
+                <a:spcPts val="0"/>
+              </a:spcBef>
+              <a:spcAft>
+                <a:spcPts val="0"/>
+              </a:spcAft>
+              <a:buNone/>
+            </a:pPr>
+            <a:endParaRPr sz="1100" dirty="0">
+              <a:latin typeface="Times New Roman"/>
+              <a:ea typeface="Times New Roman"/>
+              <a:cs typeface="Times New Roman"/>
+              <a:sym typeface="Times New Roman"/>
+            </a:endParaRPr>
+          </a:p>
+          <a:p>
+            <a:pPr marL="457200" lvl="0" indent="-298450" algn="l" rtl="0">
+              <a:spcBef>
+                <a:spcPts val="0"/>
+              </a:spcBef>
+              <a:spcAft>
+                <a:spcPts val="0"/>
+              </a:spcAft>
+              <a:buClr>
+                <a:srgbClr val="FFFFFF"/>
+              </a:buClr>
+              <a:buSzPts val="1100"/>
+              <a:buFont typeface="Times New Roman"/>
+              <a:buChar char="●"/>
+            </a:pPr>
+            <a:r>
+              <a:rPr lang="en" sz="1100" dirty="0">
+                <a:latin typeface="Times New Roman"/>
+                <a:ea typeface="Times New Roman"/>
+                <a:cs typeface="Times New Roman"/>
+                <a:sym typeface="Times New Roman"/>
+              </a:rPr>
+              <a:t>Github</a:t>
+            </a:r>
+            <a:endParaRPr sz="1100" dirty="0">
+              <a:latin typeface="Times New Roman"/>
+              <a:ea typeface="Times New Roman"/>
+              <a:cs typeface="Times New Roman"/>
+              <a:sym typeface="Times New Roman"/>
+            </a:endParaRPr>
+          </a:p>
+          <a:p>
+            <a:pPr marL="457200" lvl="0" indent="-298450" algn="l" rtl="0">
+              <a:spcBef>
+                <a:spcPts val="0"/>
+              </a:spcBef>
+              <a:spcAft>
+                <a:spcPts val="0"/>
+              </a:spcAft>
+              <a:buClr>
+                <a:srgbClr val="FFFFFF"/>
+              </a:buClr>
+              <a:buSzPts val="1100"/>
+              <a:buFont typeface="Times New Roman"/>
+              <a:buChar char="●"/>
+            </a:pPr>
+            <a:r>
+              <a:rPr lang="en-US" sz="1100" dirty="0">
+                <a:latin typeface="Times New Roman"/>
+                <a:ea typeface="Times New Roman"/>
+                <a:cs typeface="Times New Roman"/>
+                <a:sym typeface="Times New Roman"/>
+              </a:rPr>
+              <a:t>Unity</a:t>
+            </a:r>
+          </a:p>
+          <a:p>
+            <a:pPr marL="457200" lvl="0" indent="-298450" algn="l" rtl="0">
+              <a:spcBef>
+                <a:spcPts val="0"/>
+              </a:spcBef>
+              <a:spcAft>
+                <a:spcPts val="0"/>
+              </a:spcAft>
+              <a:buClr>
+                <a:srgbClr val="FFFFFF"/>
+              </a:buClr>
+              <a:buSzPts val="1100"/>
+              <a:buFont typeface="Times New Roman"/>
+              <a:buChar char="●"/>
+            </a:pPr>
+            <a:r>
+              <a:rPr lang="en-US" sz="1100" dirty="0">
+                <a:latin typeface="Times New Roman"/>
+                <a:ea typeface="Times New Roman"/>
+                <a:cs typeface="Times New Roman"/>
+                <a:sym typeface="Times New Roman"/>
+              </a:rPr>
+              <a:t>Visual Studio</a:t>
+            </a:r>
+          </a:p>
+          <a:p>
+            <a:pPr marL="457200" lvl="0" indent="-298450" algn="l" rtl="0">
+              <a:spcBef>
+                <a:spcPts val="0"/>
+              </a:spcBef>
+              <a:spcAft>
+                <a:spcPts val="0"/>
+              </a:spcAft>
+              <a:buClr>
+                <a:srgbClr val="FFFFFF"/>
+              </a:buClr>
+              <a:buSzPts val="1100"/>
+              <a:buFont typeface="Times New Roman"/>
+              <a:buChar char="●"/>
+            </a:pPr>
+            <a:r>
+              <a:rPr lang="en-US" sz="1100" dirty="0" err="1">
+                <a:latin typeface="Times New Roman"/>
+                <a:ea typeface="Times New Roman"/>
+                <a:cs typeface="Times New Roman"/>
+                <a:sym typeface="Times New Roman"/>
+              </a:rPr>
+              <a:t>Xcode</a:t>
+            </a:r>
+            <a:endParaRPr lang="en-US" sz="1100" dirty="0">
+              <a:latin typeface="Times New Roman"/>
+              <a:ea typeface="Times New Roman"/>
+              <a:cs typeface="Times New Roman"/>
+              <a:sym typeface="Times New Roman"/>
+            </a:endParaRPr>
+          </a:p>
+          <a:p>
+            <a:pPr marL="457200" lvl="0" indent="-298450" algn="l" rtl="0">
+              <a:spcBef>
+                <a:spcPts val="0"/>
+              </a:spcBef>
+              <a:spcAft>
+                <a:spcPts val="0"/>
+              </a:spcAft>
+              <a:buClr>
+                <a:srgbClr val="FFFFFF"/>
+              </a:buClr>
+              <a:buSzPts val="1100"/>
+              <a:buFont typeface="Times New Roman"/>
+              <a:buChar char="●"/>
+            </a:pPr>
+            <a:r>
+              <a:rPr lang="en-US" sz="1100" dirty="0">
+                <a:latin typeface="Times New Roman"/>
+                <a:ea typeface="Times New Roman"/>
+                <a:cs typeface="Times New Roman"/>
+                <a:sym typeface="Times New Roman"/>
+              </a:rPr>
+              <a:t>Swift UI</a:t>
+            </a:r>
+          </a:p>
+          <a:p>
+            <a:pPr marL="457200" lvl="0" indent="-298450" algn="l" rtl="0">
+              <a:spcBef>
+                <a:spcPts val="0"/>
+              </a:spcBef>
+              <a:spcAft>
+                <a:spcPts val="0"/>
+              </a:spcAft>
+              <a:buClr>
+                <a:srgbClr val="FFFFFF"/>
+              </a:buClr>
+              <a:buSzPts val="1100"/>
+              <a:buFont typeface="Times New Roman"/>
+              <a:buChar char="●"/>
+            </a:pPr>
+            <a:r>
+              <a:rPr lang="en-US" sz="1100" dirty="0">
+                <a:latin typeface="Times New Roman"/>
+                <a:ea typeface="Times New Roman"/>
+                <a:cs typeface="Times New Roman"/>
+                <a:sym typeface="Times New Roman"/>
+              </a:rPr>
+              <a:t>Rocket Data</a:t>
+            </a:r>
+          </a:p>
+          <a:p>
+            <a:pPr indent="-298450">
+              <a:buClr>
+                <a:srgbClr val="FFFFFF"/>
+              </a:buClr>
+              <a:buSzPts val="1100"/>
+              <a:buFont typeface="Times New Roman"/>
+              <a:buChar char="●"/>
+            </a:pPr>
+            <a:r>
+              <a:rPr lang="en-US" sz="1100" dirty="0">
+                <a:latin typeface="Times New Roman"/>
+                <a:ea typeface="Times New Roman"/>
+                <a:cs typeface="Times New Roman"/>
+                <a:sym typeface="Times New Roman"/>
+              </a:rPr>
+              <a:t>Core Data (Apple local iOS storage framework)</a:t>
+            </a:r>
+            <a:endParaRPr sz="1100" dirty="0">
+              <a:latin typeface="Times New Roman"/>
+              <a:ea typeface="Times New Roman"/>
+              <a:cs typeface="Times New Roman"/>
+              <a:sym typeface="Times New Roman"/>
+            </a:endParaRPr>
+          </a:p>
+          <a:p>
+            <a:pPr marL="457200" lvl="0" indent="-298450" algn="l" rtl="0">
+              <a:spcBef>
+                <a:spcPts val="0"/>
+              </a:spcBef>
+              <a:spcAft>
+                <a:spcPts val="0"/>
+              </a:spcAft>
+              <a:buClr>
+                <a:srgbClr val="FFFFFF"/>
+              </a:buClr>
+              <a:buSzPts val="1100"/>
+              <a:buFont typeface="Times New Roman"/>
+              <a:buChar char="●"/>
+            </a:pPr>
+            <a:r>
+              <a:rPr lang="en" sz="1100" dirty="0">
+                <a:latin typeface="Times New Roman"/>
+                <a:ea typeface="Times New Roman"/>
+                <a:cs typeface="Times New Roman"/>
+                <a:sym typeface="Times New Roman"/>
+              </a:rPr>
+              <a:t>Xcode’s Emulator</a:t>
+            </a:r>
+            <a:endParaRPr sz="1100" dirty="0">
+              <a:latin typeface="Times New Roman"/>
+              <a:ea typeface="Times New Roman"/>
+              <a:cs typeface="Times New Roman"/>
+              <a:sym typeface="Times New Roman"/>
+            </a:endParaRPr>
+          </a:p>
+          <a:p>
+            <a:pPr marL="457200" lvl="0" indent="-298450" algn="l" rtl="0">
+              <a:spcBef>
+                <a:spcPts val="0"/>
+              </a:spcBef>
+              <a:spcAft>
+                <a:spcPts val="0"/>
+              </a:spcAft>
+              <a:buClr>
+                <a:srgbClr val="FFFFFF"/>
+              </a:buClr>
+              <a:buSzPts val="1100"/>
+              <a:buFont typeface="Times New Roman"/>
+              <a:buChar char="●"/>
+            </a:pPr>
+            <a:r>
+              <a:rPr lang="en" sz="1100" dirty="0">
+                <a:latin typeface="Times New Roman"/>
+                <a:ea typeface="Times New Roman"/>
+                <a:cs typeface="Times New Roman"/>
+                <a:sym typeface="Times New Roman"/>
+              </a:rPr>
+              <a:t>iOS device </a:t>
+            </a:r>
+          </a:p>
+          <a:p>
+            <a:pPr marL="457200" lvl="0" indent="-298450" algn="l" rtl="0">
+              <a:spcBef>
+                <a:spcPts val="0"/>
+              </a:spcBef>
+              <a:spcAft>
+                <a:spcPts val="0"/>
+              </a:spcAft>
+              <a:buClr>
+                <a:srgbClr val="FFFFFF"/>
+              </a:buClr>
+              <a:buSzPts val="1100"/>
+              <a:buFont typeface="Times New Roman"/>
+              <a:buChar char="●"/>
+            </a:pPr>
+            <a:r>
+              <a:rPr lang="en" sz="1100" dirty="0">
+                <a:latin typeface="Times New Roman"/>
+                <a:ea typeface="Times New Roman"/>
+                <a:cs typeface="Times New Roman"/>
+                <a:sym typeface="Times New Roman"/>
+              </a:rPr>
+              <a:t>Windows PC</a:t>
+            </a:r>
+          </a:p>
+          <a:p>
+            <a:pPr marL="457200" lvl="0" indent="-298450" algn="l" rtl="0">
+              <a:spcBef>
+                <a:spcPts val="0"/>
+              </a:spcBef>
+              <a:spcAft>
+                <a:spcPts val="0"/>
+              </a:spcAft>
+              <a:buClr>
+                <a:srgbClr val="FFFFFF"/>
+              </a:buClr>
+              <a:buSzPts val="1100"/>
+              <a:buFont typeface="Times New Roman"/>
+              <a:buChar char="●"/>
+            </a:pPr>
+            <a:r>
+              <a:rPr lang="en" sz="1100" dirty="0">
+                <a:latin typeface="Times New Roman"/>
+                <a:ea typeface="Times New Roman"/>
+                <a:cs typeface="Times New Roman"/>
+                <a:sym typeface="Times New Roman"/>
+              </a:rPr>
+              <a:t>Mac</a:t>
+            </a:r>
+          </a:p>
+          <a:p>
+            <a:pPr marL="457200" lvl="0" indent="-298450" algn="l" rtl="0">
+              <a:spcBef>
+                <a:spcPts val="0"/>
+              </a:spcBef>
+              <a:spcAft>
+                <a:spcPts val="0"/>
+              </a:spcAft>
+              <a:buClr>
+                <a:srgbClr val="FFFFFF"/>
+              </a:buClr>
+              <a:buSzPts val="1100"/>
+              <a:buFont typeface="Times New Roman"/>
+              <a:buChar char="●"/>
+            </a:pPr>
+            <a:r>
+              <a:rPr lang="en" sz="1100" dirty="0">
+                <a:latin typeface="Times New Roman"/>
+                <a:ea typeface="Times New Roman"/>
+                <a:cs typeface="Times New Roman"/>
+                <a:sym typeface="Times New Roman"/>
+              </a:rPr>
+              <a:t>Proto.io</a:t>
+            </a:r>
+          </a:p>
+          <a:p>
+            <a:pPr marL="0" lvl="0" indent="0" algn="l" rtl="0">
+              <a:spcBef>
+                <a:spcPts val="0"/>
+              </a:spcBef>
+              <a:spcAft>
+                <a:spcPts val="1600"/>
+              </a:spcAft>
+              <a:buNone/>
+            </a:pPr>
+            <a:endParaRPr dirty="0"/>
+          </a:p>
+        </p:txBody>
+      </p:sp>
+    </p:spTree>
+    <p:extLst>
+      <p:ext uri="{BB962C8B-B14F-4D97-AF65-F5344CB8AC3E}">
+        <p14:creationId xmlns:p14="http://schemas.microsoft.com/office/powerpoint/2010/main" val="4256814849"/>
+      </p:ext>
+    </p:extLst>
+  </p:cSld>
+  <p:clrMapOvr>
+    <a:masterClrMapping/>
+  </p:clrMapOvr>
+</p:sld>
+</file>
+
 <file path=ppt/theme/theme1.xml><?xml version="1.0" encoding="utf-8"?>
 <a:theme xmlns:a="http://schemas.openxmlformats.org/drawingml/2006/main" name="Damask">
   <a:themeElements>

</xml_diff>

<commit_message>
Finalized Report and Presentation
</commit_message>
<xml_diff>
--- a/CSC_520_Devils_Grip.pptx
+++ b/CSC_520_Devils_Grip.pptx
@@ -2065,7 +2065,7 @@
           <a:p>
             <a:fld id="{48A87A34-81AB-432B-8DAE-1953F412C126}" type="datetimeFigureOut">
               <a:rPr lang="en-US" dirty="0"/>
-              <a:t>12/8/2020</a:t>
+              <a:t>12/9/2020</a:t>
             </a:fld>
             <a:endParaRPr lang="en-US" dirty="0"/>
           </a:p>
@@ -2362,7 +2362,7 @@
           <a:p>
             <a:fld id="{48A87A34-81AB-432B-8DAE-1953F412C126}" type="datetimeFigureOut">
               <a:rPr lang="en-US" dirty="0"/>
-              <a:t>12/8/2020</a:t>
+              <a:t>12/9/2020</a:t>
             </a:fld>
             <a:endParaRPr lang="en-US" dirty="0"/>
           </a:p>
@@ -2564,7 +2564,7 @@
           <a:p>
             <a:fld id="{48A87A34-81AB-432B-8DAE-1953F412C126}" type="datetimeFigureOut">
               <a:rPr lang="en-US" dirty="0"/>
-              <a:t>12/8/2020</a:t>
+              <a:t>12/9/2020</a:t>
             </a:fld>
             <a:endParaRPr lang="en-US" dirty="0"/>
           </a:p>
@@ -2835,7 +2835,7 @@
           <a:p>
             <a:fld id="{48A87A34-81AB-432B-8DAE-1953F412C126}" type="datetimeFigureOut">
               <a:rPr lang="en-US" dirty="0"/>
-              <a:t>12/8/2020</a:t>
+              <a:t>12/9/2020</a:t>
             </a:fld>
             <a:endParaRPr lang="en-US" dirty="0"/>
           </a:p>
@@ -3269,7 +3269,7 @@
           <a:p>
             <a:fld id="{48A87A34-81AB-432B-8DAE-1953F412C126}" type="datetimeFigureOut">
               <a:rPr lang="en-US" dirty="0"/>
-              <a:t>12/8/2020</a:t>
+              <a:t>12/9/2020</a:t>
             </a:fld>
             <a:endParaRPr lang="en-US" dirty="0"/>
           </a:p>
@@ -3825,7 +3825,7 @@
           <a:p>
             <a:fld id="{48A87A34-81AB-432B-8DAE-1953F412C126}" type="datetimeFigureOut">
               <a:rPr lang="en-US" dirty="0"/>
-              <a:t>12/8/2020</a:t>
+              <a:t>12/9/2020</a:t>
             </a:fld>
             <a:endParaRPr lang="en-US" dirty="0"/>
           </a:p>
@@ -4675,7 +4675,7 @@
           <a:p>
             <a:fld id="{48A87A34-81AB-432B-8DAE-1953F412C126}" type="datetimeFigureOut">
               <a:rPr lang="en-US" dirty="0"/>
-              <a:t>12/8/2020</a:t>
+              <a:t>12/9/2020</a:t>
             </a:fld>
             <a:endParaRPr lang="en-US" dirty="0"/>
           </a:p>
@@ -4855,7 +4855,7 @@
           <a:p>
             <a:fld id="{48A87A34-81AB-432B-8DAE-1953F412C126}" type="datetimeFigureOut">
               <a:rPr lang="en-US" dirty="0"/>
-              <a:t>12/8/2020</a:t>
+              <a:t>12/9/2020</a:t>
             </a:fld>
             <a:endParaRPr lang="en-US" dirty="0"/>
           </a:p>
@@ -5049,7 +5049,7 @@
           <a:p>
             <a:fld id="{48A87A34-81AB-432B-8DAE-1953F412C126}" type="datetimeFigureOut">
               <a:rPr lang="en-US" dirty="0"/>
-              <a:t>12/8/2020</a:t>
+              <a:t>12/9/2020</a:t>
             </a:fld>
             <a:endParaRPr lang="en-US" dirty="0"/>
           </a:p>
@@ -5596,7 +5596,7 @@
           <a:p>
             <a:fld id="{48A87A34-81AB-432B-8DAE-1953F412C126}" type="datetimeFigureOut">
               <a:rPr lang="en-US" dirty="0"/>
-              <a:t>12/8/2020</a:t>
+              <a:t>12/9/2020</a:t>
             </a:fld>
             <a:endParaRPr lang="en-US" dirty="0"/>
           </a:p>
@@ -5854,7 +5854,7 @@
           <a:p>
             <a:fld id="{48A87A34-81AB-432B-8DAE-1953F412C126}" type="datetimeFigureOut">
               <a:rPr lang="en-US" dirty="0"/>
-              <a:t>12/8/2020</a:t>
+              <a:t>12/9/2020</a:t>
             </a:fld>
             <a:endParaRPr lang="en-US" dirty="0"/>
           </a:p>
@@ -6101,7 +6101,7 @@
           <a:p>
             <a:fld id="{48A87A34-81AB-432B-8DAE-1953F412C126}" type="datetimeFigureOut">
               <a:rPr lang="en-US" dirty="0"/>
-              <a:t>12/8/2020</a:t>
+              <a:t>12/9/2020</a:t>
             </a:fld>
             <a:endParaRPr lang="en-US" dirty="0"/>
           </a:p>
@@ -6484,7 +6484,7 @@
           <a:p>
             <a:fld id="{48A87A34-81AB-432B-8DAE-1953F412C126}" type="datetimeFigureOut">
               <a:rPr lang="en-US" dirty="0"/>
-              <a:t>12/8/2020</a:t>
+              <a:t>12/9/2020</a:t>
             </a:fld>
             <a:endParaRPr lang="en-US" dirty="0"/>
           </a:p>
@@ -6612,7 +6612,7 @@
           <a:p>
             <a:fld id="{48A87A34-81AB-432B-8DAE-1953F412C126}" type="datetimeFigureOut">
               <a:rPr lang="en-US" dirty="0"/>
-              <a:t>12/8/2020</a:t>
+              <a:t>12/9/2020</a:t>
             </a:fld>
             <a:endParaRPr lang="en-US" dirty="0"/>
           </a:p>
@@ -6717,7 +6717,7 @@
           <a:p>
             <a:fld id="{48A87A34-81AB-432B-8DAE-1953F412C126}" type="datetimeFigureOut">
               <a:rPr lang="en-US" dirty="0"/>
-              <a:t>12/8/2020</a:t>
+              <a:t>12/9/2020</a:t>
             </a:fld>
             <a:endParaRPr lang="en-US" dirty="0"/>
           </a:p>
@@ -6977,7 +6977,7 @@
           <a:p>
             <a:fld id="{48A87A34-81AB-432B-8DAE-1953F412C126}" type="datetimeFigureOut">
               <a:rPr lang="en-US" dirty="0"/>
-              <a:t>12/8/2020</a:t>
+              <a:t>12/9/2020</a:t>
             </a:fld>
             <a:endParaRPr lang="en-US" dirty="0"/>
           </a:p>
@@ -7274,7 +7274,7 @@
           <a:p>
             <a:fld id="{48A87A34-81AB-432B-8DAE-1953F412C126}" type="datetimeFigureOut">
               <a:rPr lang="en-US" dirty="0"/>
-              <a:t>12/8/2020</a:t>
+              <a:t>12/9/2020</a:t>
             </a:fld>
             <a:endParaRPr lang="en-US" dirty="0"/>
           </a:p>
@@ -7498,7 +7498,7 @@
             <a:fld id="{48A87A34-81AB-432B-8DAE-1953F412C126}" type="datetimeFigureOut">
               <a:rPr lang="en-US" dirty="0"/>
               <a:pPr/>
-              <a:t>12/8/2020</a:t>
+              <a:t>12/9/2020</a:t>
             </a:fld>
             <a:endParaRPr lang="en-US" dirty="0"/>
           </a:p>
@@ -8080,7 +8080,7 @@
             </a:pPr>
             <a:r>
               <a:rPr lang="en" dirty="0"/>
-              <a:t>Advisor: Dr. Bo Hatfield</a:t>
+              <a:t>CSC 521 Project Supervisor: Dr. Thomas Schmidt</a:t>
             </a:r>
             <a:endParaRPr dirty="0"/>
           </a:p>
@@ -8191,8 +8191,8 @@
         </p:nvGrpSpPr>
         <p:grpSpPr>
           <a:xfrm>
-            <a:off x="728760" y="1751262"/>
-            <a:ext cx="1356358" cy="1496137"/>
+            <a:off x="729439" y="1751262"/>
+            <a:ext cx="1356358" cy="1513366"/>
             <a:chOff x="1083025" y="1574015"/>
             <a:chExt cx="1834900" cy="2024268"/>
           </a:xfrm>
@@ -8295,6 +8295,121 @@
                 </a:spcAft>
                 <a:buNone/>
               </a:pPr>
+              <a:endParaRPr lang="en" sz="1000" b="1" dirty="0">
+                <a:solidFill>
+                  <a:srgbClr val="858585"/>
+                </a:solidFill>
+                <a:latin typeface="Roboto"/>
+                <a:ea typeface="Roboto"/>
+                <a:cs typeface="Roboto"/>
+                <a:sym typeface="Roboto"/>
+              </a:endParaRPr>
+            </a:p>
+            <a:p>
+              <a:pPr marL="0" lvl="0" indent="0" algn="l" rtl="0">
+                <a:lnSpc>
+                  <a:spcPct val="115000"/>
+                </a:lnSpc>
+                <a:spcBef>
+                  <a:spcPts val="0"/>
+                </a:spcBef>
+                <a:spcAft>
+                  <a:spcPts val="0"/>
+                </a:spcAft>
+                <a:buNone/>
+              </a:pPr>
+              <a:endParaRPr lang="en" sz="1000" b="1" dirty="0">
+                <a:solidFill>
+                  <a:srgbClr val="858585"/>
+                </a:solidFill>
+                <a:latin typeface="Roboto"/>
+                <a:ea typeface="Roboto"/>
+                <a:cs typeface="Roboto"/>
+                <a:sym typeface="Roboto"/>
+              </a:endParaRPr>
+            </a:p>
+            <a:p>
+              <a:pPr marL="0" lvl="0" indent="0" algn="l" rtl="0">
+                <a:lnSpc>
+                  <a:spcPct val="115000"/>
+                </a:lnSpc>
+                <a:spcBef>
+                  <a:spcPts val="0"/>
+                </a:spcBef>
+                <a:spcAft>
+                  <a:spcPts val="0"/>
+                </a:spcAft>
+                <a:buNone/>
+              </a:pPr>
+              <a:endParaRPr lang="en" sz="1000" b="1" dirty="0">
+                <a:solidFill>
+                  <a:srgbClr val="858585"/>
+                </a:solidFill>
+                <a:latin typeface="Roboto"/>
+                <a:ea typeface="Roboto"/>
+                <a:cs typeface="Roboto"/>
+                <a:sym typeface="Roboto"/>
+              </a:endParaRPr>
+            </a:p>
+            <a:p>
+              <a:pPr marL="0" lvl="0" indent="0" algn="l" rtl="0">
+                <a:lnSpc>
+                  <a:spcPct val="115000"/>
+                </a:lnSpc>
+                <a:spcBef>
+                  <a:spcPts val="0"/>
+                </a:spcBef>
+                <a:spcAft>
+                  <a:spcPts val="0"/>
+                </a:spcAft>
+                <a:buNone/>
+              </a:pPr>
+              <a:endParaRPr lang="en" sz="1000" b="1" dirty="0">
+                <a:solidFill>
+                  <a:srgbClr val="858585"/>
+                </a:solidFill>
+                <a:latin typeface="Roboto"/>
+                <a:ea typeface="Roboto"/>
+                <a:cs typeface="Roboto"/>
+                <a:sym typeface="Roboto"/>
+              </a:endParaRPr>
+            </a:p>
+            <a:p>
+              <a:pPr marL="0" lvl="0" indent="0" algn="l" rtl="0">
+                <a:lnSpc>
+                  <a:spcPct val="115000"/>
+                </a:lnSpc>
+                <a:spcBef>
+                  <a:spcPts val="0"/>
+                </a:spcBef>
+                <a:spcAft>
+                  <a:spcPts val="0"/>
+                </a:spcAft>
+                <a:buNone/>
+              </a:pPr>
+              <a:endParaRPr lang="en" sz="1000" b="1" dirty="0">
+                <a:solidFill>
+                  <a:srgbClr val="858585"/>
+                </a:solidFill>
+                <a:latin typeface="Roboto"/>
+                <a:ea typeface="Roboto"/>
+                <a:cs typeface="Roboto"/>
+                <a:sym typeface="Roboto"/>
+              </a:endParaRPr>
+            </a:p>
+            <a:p>
+              <a:pPr marL="0" lvl="0" indent="0" algn="l" rtl="0">
+                <a:lnSpc>
+                  <a:spcPct val="115000"/>
+                </a:lnSpc>
+                <a:spcBef>
+                  <a:spcPts val="0"/>
+                </a:spcBef>
+                <a:spcAft>
+                  <a:spcPts val="0"/>
+                </a:spcAft>
+                <a:buNone/>
+              </a:pPr>
               <a:r>
                 <a:rPr lang="en" sz="1000" b="1" dirty="0">
                   <a:solidFill>
@@ -8305,7 +8420,7 @@
                   <a:cs typeface="Roboto"/>
                   <a:sym typeface="Roboto"/>
                 </a:rPr>
-                <a:t>Unity Scripting/Object integration</a:t>
+                <a:t>Unity Scripting/ integration/PC playable </a:t>
               </a:r>
               <a:endParaRPr sz="1000" b="1" dirty="0">
                 <a:solidFill>
@@ -9549,19 +9664,13 @@
           <a:p>
             <a:r>
               <a:rPr lang="en-US" sz="1800" dirty="0"/>
-              <a:t>Database Framework Implementation: 10%</a:t>
+              <a:t>Playable Game on PC: 25%</a:t>
             </a:r>
           </a:p>
           <a:p>
             <a:r>
               <a:rPr lang="en-US" sz="1800" dirty="0"/>
-              <a:t>PC Executable: 20%</a:t>
-            </a:r>
-          </a:p>
-          <a:p>
-            <a:r>
-              <a:rPr lang="en-US" sz="1800" dirty="0"/>
-              <a:t>Mac integration/ UI for IOS: 20%</a:t>
+              <a:t>Mac integration/ UI for IOS: 25%</a:t>
             </a:r>
           </a:p>
           <a:p>
@@ -9756,7 +9865,7 @@
               <a:rPr lang="en-US" sz="1200" b="0" i="0" dirty="0">
                 <a:effectLst/>
               </a:rPr>
-              <a:t>project post mortem: a summary of what was learned from the project and (based on that experience) discussion of how various aspects of the project might have been approached differently</a:t>
+              <a:t>project postmortem: a summary of what was learned from the project and (based on that experience) discussion of how various aspects of the project might have been approached differently</a:t>
             </a:r>
           </a:p>
           <a:p>
@@ -9775,15 +9884,6 @@
                 <a:effectLst/>
               </a:rPr>
               <a:t>presentation of the completed project (PowerPoint format), including screenshots of the functioning project</a:t>
-            </a:r>
-          </a:p>
-          <a:p>
-            <a:pPr algn="l"/>
-            <a:r>
-              <a:rPr lang="en-US" sz="1200" b="0" i="0" dirty="0">
-                <a:effectLst/>
-              </a:rPr>
-              <a:t>user's manual</a:t>
             </a:r>
           </a:p>
           <a:p>
@@ -10029,10 +10129,9 @@
               <a:buChar char="-"/>
             </a:pPr>
             <a:r>
-              <a:rPr lang="en"/>
+              <a:rPr lang="en" dirty="0"/>
               <a:t>Prototypes</a:t>
             </a:r>
-            <a:endParaRPr lang="en" dirty="0"/>
           </a:p>
           <a:p>
             <a:pPr marL="457200" lvl="0" indent="-342900" algn="l" rtl="0">
@@ -10306,7 +10405,7 @@
             </a:pPr>
             <a:r>
               <a:rPr lang="en" dirty="0"/>
-              <a:t>Satisfying a client need for an applicaiton</a:t>
+              <a:t>Communicate with a real-world client</a:t>
             </a:r>
           </a:p>
         </p:txBody>
@@ -10385,6 +10484,10 @@
           </p:nvPr>
         </p:nvSpPr>
         <p:spPr>
+          <a:xfrm>
+            <a:off x="210100" y="1215075"/>
+            <a:ext cx="8520600" cy="3416400"/>
+          </a:xfrm>
           <a:prstGeom prst="rect">
             <a:avLst/>
           </a:prstGeom>
@@ -10405,98 +10508,7 @@
               <a:buSzPts val="1800"/>
               <a:buChar char="-"/>
             </a:pPr>
-            <a:r>
-              <a:rPr lang="en-US" dirty="0"/>
-              <a:t>During COVID, Card games became a nightly routine for my girlfriend and I </a:t>
-            </a:r>
-          </a:p>
-          <a:p>
-            <a:pPr lvl="1" indent="-342900">
-              <a:spcBef>
-                <a:spcPts val="0"/>
-              </a:spcBef>
-              <a:buSzPts val="1800"/>
-              <a:buChar char="-"/>
-            </a:pPr>
-            <a:r>
-              <a:rPr lang="en-US" dirty="0"/>
-              <a:t>Board Games created clutter (small living space)</a:t>
-            </a:r>
-          </a:p>
-          <a:p>
-            <a:pPr lvl="1" indent="-342900">
-              <a:spcBef>
-                <a:spcPts val="0"/>
-              </a:spcBef>
-              <a:buSzPts val="1800"/>
-              <a:buChar char="-"/>
-            </a:pPr>
-            <a:r>
-              <a:rPr lang="en-US" dirty="0"/>
-              <a:t>Lost track of cards quickly</a:t>
-            </a:r>
-          </a:p>
-          <a:p>
-            <a:pPr lvl="1" indent="-342900">
-              <a:spcBef>
-                <a:spcPts val="0"/>
-              </a:spcBef>
-              <a:buSzPts val="1800"/>
-              <a:buChar char="-"/>
-            </a:pPr>
-            <a:r>
-              <a:rPr lang="en-US" dirty="0"/>
-              <a:t>Pet kept making a mess of the piles</a:t>
-            </a:r>
-          </a:p>
-          <a:p>
-            <a:pPr lvl="1" indent="-342900">
-              <a:spcBef>
-                <a:spcPts val="0"/>
-              </a:spcBef>
-              <a:buSzPts val="1800"/>
-              <a:buChar char="-"/>
-            </a:pPr>
-            <a:r>
-              <a:rPr lang="en-US" dirty="0"/>
-              <a:t>Reshuffling and replaying games became annoying</a:t>
-            </a:r>
-          </a:p>
-          <a:p>
-            <a:pPr lvl="1" indent="-342900">
-              <a:spcBef>
-                <a:spcPts val="0"/>
-              </a:spcBef>
-              <a:buSzPts val="1800"/>
-              <a:buChar char="-"/>
-            </a:pPr>
-            <a:r>
-              <a:rPr lang="en-US" dirty="0"/>
-              <a:t>Downloading various games became a potential solution</a:t>
-            </a:r>
-          </a:p>
-          <a:p>
-            <a:pPr lvl="1" indent="-342900">
-              <a:spcBef>
-                <a:spcPts val="0"/>
-              </a:spcBef>
-              <a:buSzPts val="1800"/>
-              <a:buChar char="-"/>
-            </a:pPr>
-            <a:r>
-              <a:rPr lang="en-US" dirty="0"/>
-              <a:t>Downloading this specific game is (presumably) not possible…No app was found</a:t>
-            </a:r>
-          </a:p>
-          <a:p>
-            <a:pPr lvl="1" indent="-342900">
-              <a:spcBef>
-                <a:spcPts val="0"/>
-              </a:spcBef>
-              <a:buSzPts val="1800"/>
-              <a:buChar char="-"/>
-            </a:pPr>
-            <a:endParaRPr lang="en-US" dirty="0"/>
+            <a:endParaRPr lang="en-US" sz="1400" dirty="0"/>
           </a:p>
           <a:p>
             <a:pPr marL="457200" lvl="0" indent="-342900" algn="l" rtl="0">
@@ -10510,8 +10522,8 @@
               <a:buChar char="-"/>
             </a:pPr>
             <a:r>
-              <a:rPr lang="en" dirty="0"/>
-              <a:t>In Devils Grip, the user will be able to:</a:t>
+              <a:rPr lang="en-US" sz="1400" dirty="0"/>
+              <a:t>During COVID, Card games became a nightly routine for my girlfriend and I </a:t>
             </a:r>
           </a:p>
           <a:p>
@@ -10523,8 +10535,8 @@
               <a:buChar char="-"/>
             </a:pPr>
             <a:r>
-              <a:rPr lang="en" dirty="0"/>
-              <a:t>Play the game itself </a:t>
+              <a:rPr lang="en-US" sz="1200" dirty="0"/>
+              <a:t>Board Games created clutter (small living space)</a:t>
             </a:r>
           </a:p>
           <a:p>
@@ -10536,8 +10548,8 @@
               <a:buChar char="-"/>
             </a:pPr>
             <a:r>
-              <a:rPr lang="en" dirty="0"/>
-              <a:t>Change the difficulty</a:t>
+              <a:rPr lang="en-US" sz="1200" dirty="0"/>
+              <a:t>Lost track of cards quickly</a:t>
             </a:r>
           </a:p>
           <a:p>
@@ -10549,12 +10561,8 @@
               <a:buChar char="-"/>
             </a:pPr>
             <a:r>
-              <a:rPr lang="en-US" dirty="0"/>
-              <a:t>T</a:t>
-            </a:r>
-            <a:r>
-              <a:rPr lang="en" dirty="0"/>
-              <a:t>rack their performance via a Highscore</a:t>
+              <a:rPr lang="en-US" sz="1200" dirty="0"/>
+              <a:t>Pet kept making a mess of the piles</a:t>
             </a:r>
           </a:p>
           <a:p>
@@ -10566,7 +10574,135 @@
               <a:buChar char="-"/>
             </a:pPr>
             <a:r>
-              <a:rPr lang="en" dirty="0"/>
+              <a:rPr lang="en-US" sz="1200" dirty="0"/>
+              <a:t>Reshuffling and replaying games became annoying</a:t>
+            </a:r>
+          </a:p>
+          <a:p>
+            <a:pPr lvl="1" indent="-342900">
+              <a:spcBef>
+                <a:spcPts val="0"/>
+              </a:spcBef>
+              <a:buSzPts val="1800"/>
+              <a:buChar char="-"/>
+            </a:pPr>
+            <a:r>
+              <a:rPr lang="en-US" sz="1200" dirty="0"/>
+              <a:t>Downloading various games became a potential solution</a:t>
+            </a:r>
+          </a:p>
+          <a:p>
+            <a:pPr lvl="1" indent="-342900">
+              <a:spcBef>
+                <a:spcPts val="0"/>
+              </a:spcBef>
+              <a:buSzPts val="1800"/>
+              <a:buChar char="-"/>
+            </a:pPr>
+            <a:r>
+              <a:rPr lang="en-US" sz="1200" dirty="0"/>
+              <a:t>Downloading this specific game is (presumably) not possible…No app was found</a:t>
+            </a:r>
+          </a:p>
+          <a:p>
+            <a:pPr lvl="1" indent="-342900">
+              <a:spcBef>
+                <a:spcPts val="0"/>
+              </a:spcBef>
+              <a:buSzPts val="1800"/>
+              <a:buChar char="-"/>
+            </a:pPr>
+            <a:endParaRPr lang="en-US" sz="1200" dirty="0"/>
+          </a:p>
+          <a:p>
+            <a:pPr marL="571500" lvl="1" indent="0">
+              <a:spcBef>
+                <a:spcPts val="0"/>
+              </a:spcBef>
+              <a:buSzPts val="1800"/>
+              <a:buNone/>
+            </a:pPr>
+            <a:endParaRPr lang="en-US" sz="1200" dirty="0"/>
+          </a:p>
+          <a:p>
+            <a:pPr lvl="1" indent="-342900">
+              <a:spcBef>
+                <a:spcPts val="0"/>
+              </a:spcBef>
+              <a:buSzPts val="1800"/>
+              <a:buChar char="-"/>
+            </a:pPr>
+            <a:endParaRPr lang="en-US" sz="1200" dirty="0"/>
+          </a:p>
+          <a:p>
+            <a:pPr marL="457200" lvl="0" indent="-342900" algn="l" rtl="0">
+              <a:spcBef>
+                <a:spcPts val="0"/>
+              </a:spcBef>
+              <a:spcAft>
+                <a:spcPts val="0"/>
+              </a:spcAft>
+              <a:buSzPts val="1800"/>
+              <a:buChar char="-"/>
+            </a:pPr>
+            <a:r>
+              <a:rPr lang="en" sz="1400" dirty="0"/>
+              <a:t>In Devils Grip, the user will be able to:</a:t>
+            </a:r>
+          </a:p>
+          <a:p>
+            <a:pPr lvl="1" indent="-342900">
+              <a:spcBef>
+                <a:spcPts val="0"/>
+              </a:spcBef>
+              <a:buSzPts val="1800"/>
+              <a:buChar char="-"/>
+            </a:pPr>
+            <a:r>
+              <a:rPr lang="en" sz="1200" dirty="0"/>
+              <a:t>Play the game itself </a:t>
+            </a:r>
+          </a:p>
+          <a:p>
+            <a:pPr lvl="1" indent="-342900">
+              <a:spcBef>
+                <a:spcPts val="0"/>
+              </a:spcBef>
+              <a:buSzPts val="1800"/>
+              <a:buChar char="-"/>
+            </a:pPr>
+            <a:r>
+              <a:rPr lang="en" sz="1200" dirty="0"/>
+              <a:t>Change the difficulty</a:t>
+            </a:r>
+          </a:p>
+          <a:p>
+            <a:pPr lvl="1" indent="-342900">
+              <a:spcBef>
+                <a:spcPts val="0"/>
+              </a:spcBef>
+              <a:buSzPts val="1800"/>
+              <a:buChar char="-"/>
+            </a:pPr>
+            <a:r>
+              <a:rPr lang="en-US" sz="1200" dirty="0"/>
+              <a:t>T</a:t>
+            </a:r>
+            <a:r>
+              <a:rPr lang="en" sz="1200" dirty="0"/>
+              <a:t>rack their performance via a Highscore</a:t>
+            </a:r>
+          </a:p>
+          <a:p>
+            <a:pPr lvl="1" indent="-342900">
+              <a:spcBef>
+                <a:spcPts val="0"/>
+              </a:spcBef>
+              <a:buSzPts val="1800"/>
+              <a:buChar char="-"/>
+            </a:pPr>
+            <a:r>
+              <a:rPr lang="en" sz="1200" dirty="0"/>
               <a:t>Use Anywhere at anytime through IOS device</a:t>
             </a:r>
           </a:p>
@@ -10579,6 +10715,314 @@
               <a:buChar char="-"/>
             </a:pPr>
             <a:endParaRPr dirty="0"/>
+          </a:p>
+        </p:txBody>
+      </p:sp>
+      <p:sp>
+        <p:nvSpPr>
+          <p:cNvPr id="4" name="Google Shape;77;p16">
+            <a:extLst>
+              <a:ext uri="{FF2B5EF4-FFF2-40B4-BE49-F238E27FC236}">
+                <a16:creationId xmlns:a16="http://schemas.microsoft.com/office/drawing/2014/main" id="{0AD6F9B3-529E-4D3B-B4F5-593DD67ECC2C}"/>
+              </a:ext>
+            </a:extLst>
+          </p:cNvPr>
+          <p:cNvSpPr txBox="1">
+            <a:spLocks/>
+          </p:cNvSpPr>
+          <p:nvPr/>
+        </p:nvSpPr>
+        <p:spPr>
+          <a:xfrm>
+            <a:off x="-2660100" y="1095650"/>
+            <a:ext cx="8520600" cy="572700"/>
+          </a:xfrm>
+          <a:prstGeom prst="rect">
+            <a:avLst/>
+          </a:prstGeom>
+        </p:spPr>
+        <p:txBody>
+          <a:bodyPr spcFirstLastPara="1" vert="horz" wrap="square" lIns="91425" tIns="91425" rIns="91425" bIns="91425" rtlCol="0" anchor="t" anchorCtr="0">
+            <a:noAutofit/>
+          </a:bodyPr>
+          <a:lstStyle>
+            <a:lvl1pPr lvl="0" algn="ctr" defTabSz="685800" rtl="0" eaLnBrk="1" latinLnBrk="0" hangingPunct="1">
+              <a:lnSpc>
+                <a:spcPct val="90000"/>
+              </a:lnSpc>
+              <a:spcBef>
+                <a:spcPts val="0"/>
+              </a:spcBef>
+              <a:spcAft>
+                <a:spcPts val="0"/>
+              </a:spcAft>
+              <a:buSzPts val="3000"/>
+              <a:buNone/>
+              <a:defRPr sz="2550" b="1" i="0" kern="1200" cap="all">
+                <a:solidFill>
+                  <a:schemeClr val="tx1"/>
+                </a:solidFill>
+                <a:effectLst>
+                  <a:outerShdw blurRad="50800" dist="63500" dir="2700000" algn="tl" rotWithShape="0">
+                    <a:srgbClr val="000000">
+                      <a:alpha val="48000"/>
+                    </a:srgbClr>
+                  </a:outerShdw>
+                </a:effectLst>
+                <a:latin typeface="+mj-lt"/>
+                <a:ea typeface="+mj-ea"/>
+                <a:cs typeface="+mj-cs"/>
+              </a:defRPr>
+            </a:lvl1pPr>
+            <a:lvl2pPr lvl="1">
+              <a:spcBef>
+                <a:spcPts val="0"/>
+              </a:spcBef>
+              <a:spcAft>
+                <a:spcPts val="0"/>
+              </a:spcAft>
+              <a:buSzPts val="3000"/>
+              <a:buNone/>
+              <a:defRPr/>
+            </a:lvl2pPr>
+            <a:lvl3pPr lvl="2">
+              <a:spcBef>
+                <a:spcPts val="0"/>
+              </a:spcBef>
+              <a:spcAft>
+                <a:spcPts val="0"/>
+              </a:spcAft>
+              <a:buSzPts val="3000"/>
+              <a:buNone/>
+              <a:defRPr/>
+            </a:lvl3pPr>
+            <a:lvl4pPr lvl="3">
+              <a:spcBef>
+                <a:spcPts val="0"/>
+              </a:spcBef>
+              <a:spcAft>
+                <a:spcPts val="0"/>
+              </a:spcAft>
+              <a:buSzPts val="3000"/>
+              <a:buNone/>
+              <a:defRPr/>
+            </a:lvl4pPr>
+            <a:lvl5pPr lvl="4">
+              <a:spcBef>
+                <a:spcPts val="0"/>
+              </a:spcBef>
+              <a:spcAft>
+                <a:spcPts val="0"/>
+              </a:spcAft>
+              <a:buSzPts val="3000"/>
+              <a:buNone/>
+              <a:defRPr/>
+            </a:lvl5pPr>
+            <a:lvl6pPr lvl="5">
+              <a:spcBef>
+                <a:spcPts val="0"/>
+              </a:spcBef>
+              <a:spcAft>
+                <a:spcPts val="0"/>
+              </a:spcAft>
+              <a:buSzPts val="3000"/>
+              <a:buNone/>
+              <a:defRPr/>
+            </a:lvl6pPr>
+            <a:lvl7pPr lvl="6">
+              <a:spcBef>
+                <a:spcPts val="0"/>
+              </a:spcBef>
+              <a:spcAft>
+                <a:spcPts val="0"/>
+              </a:spcAft>
+              <a:buSzPts val="3000"/>
+              <a:buNone/>
+              <a:defRPr/>
+            </a:lvl7pPr>
+            <a:lvl8pPr lvl="7">
+              <a:spcBef>
+                <a:spcPts val="0"/>
+              </a:spcBef>
+              <a:spcAft>
+                <a:spcPts val="0"/>
+              </a:spcAft>
+              <a:buSzPts val="3000"/>
+              <a:buNone/>
+              <a:defRPr/>
+            </a:lvl8pPr>
+            <a:lvl9pPr lvl="8">
+              <a:spcBef>
+                <a:spcPts val="0"/>
+              </a:spcBef>
+              <a:spcAft>
+                <a:spcPts val="0"/>
+              </a:spcAft>
+              <a:buSzPts val="3000"/>
+              <a:buNone/>
+              <a:defRPr/>
+            </a:lvl9pPr>
+          </a:lstStyle>
+          <a:p>
+            <a:r>
+              <a:rPr lang="en-US" sz="2000" dirty="0"/>
+              <a:t>Motivation</a:t>
+            </a:r>
+            <a:endParaRPr lang="en-US" dirty="0"/>
+          </a:p>
+        </p:txBody>
+      </p:sp>
+      <p:sp>
+        <p:nvSpPr>
+          <p:cNvPr id="5" name="Google Shape;77;p16">
+            <a:extLst>
+              <a:ext uri="{FF2B5EF4-FFF2-40B4-BE49-F238E27FC236}">
+                <a16:creationId xmlns:a16="http://schemas.microsoft.com/office/drawing/2014/main" id="{56890285-10A6-4A73-A250-C3AD9AC5EC35}"/>
+              </a:ext>
+            </a:extLst>
+          </p:cNvPr>
+          <p:cNvSpPr txBox="1">
+            <a:spLocks/>
+          </p:cNvSpPr>
+          <p:nvPr/>
+        </p:nvSpPr>
+        <p:spPr>
+          <a:xfrm>
+            <a:off x="-1803849" y="3355725"/>
+            <a:ext cx="8520600" cy="572700"/>
+          </a:xfrm>
+          <a:prstGeom prst="rect">
+            <a:avLst/>
+          </a:prstGeom>
+        </p:spPr>
+        <p:txBody>
+          <a:bodyPr spcFirstLastPara="1" vert="horz" wrap="square" lIns="91425" tIns="91425" rIns="91425" bIns="91425" rtlCol="0" anchor="t" anchorCtr="0">
+            <a:noAutofit/>
+          </a:bodyPr>
+          <a:lstStyle>
+            <a:lvl1pPr lvl="0" algn="ctr" defTabSz="685800" rtl="0" eaLnBrk="1" latinLnBrk="0" hangingPunct="1">
+              <a:lnSpc>
+                <a:spcPct val="90000"/>
+              </a:lnSpc>
+              <a:spcBef>
+                <a:spcPts val="0"/>
+              </a:spcBef>
+              <a:spcAft>
+                <a:spcPts val="0"/>
+              </a:spcAft>
+              <a:buSzPts val="3000"/>
+              <a:buNone/>
+              <a:defRPr sz="2550" b="1" i="0" kern="1200" cap="all">
+                <a:solidFill>
+                  <a:schemeClr val="tx1"/>
+                </a:solidFill>
+                <a:effectLst>
+                  <a:outerShdw blurRad="50800" dist="63500" dir="2700000" algn="tl" rotWithShape="0">
+                    <a:srgbClr val="000000">
+                      <a:alpha val="48000"/>
+                    </a:srgbClr>
+                  </a:outerShdw>
+                </a:effectLst>
+                <a:latin typeface="+mj-lt"/>
+                <a:ea typeface="+mj-ea"/>
+                <a:cs typeface="+mj-cs"/>
+              </a:defRPr>
+            </a:lvl1pPr>
+            <a:lvl2pPr lvl="1">
+              <a:spcBef>
+                <a:spcPts val="0"/>
+              </a:spcBef>
+              <a:spcAft>
+                <a:spcPts val="0"/>
+              </a:spcAft>
+              <a:buSzPts val="3000"/>
+              <a:buNone/>
+              <a:defRPr/>
+            </a:lvl2pPr>
+            <a:lvl3pPr lvl="2">
+              <a:spcBef>
+                <a:spcPts val="0"/>
+              </a:spcBef>
+              <a:spcAft>
+                <a:spcPts val="0"/>
+              </a:spcAft>
+              <a:buSzPts val="3000"/>
+              <a:buNone/>
+              <a:defRPr/>
+            </a:lvl3pPr>
+            <a:lvl4pPr lvl="3">
+              <a:spcBef>
+                <a:spcPts val="0"/>
+              </a:spcBef>
+              <a:spcAft>
+                <a:spcPts val="0"/>
+              </a:spcAft>
+              <a:buSzPts val="3000"/>
+              <a:buNone/>
+              <a:defRPr/>
+            </a:lvl4pPr>
+            <a:lvl5pPr lvl="4">
+              <a:spcBef>
+                <a:spcPts val="0"/>
+              </a:spcBef>
+              <a:spcAft>
+                <a:spcPts val="0"/>
+              </a:spcAft>
+              <a:buSzPts val="3000"/>
+              <a:buNone/>
+              <a:defRPr/>
+            </a:lvl5pPr>
+            <a:lvl6pPr lvl="5">
+              <a:spcBef>
+                <a:spcPts val="0"/>
+              </a:spcBef>
+              <a:spcAft>
+                <a:spcPts val="0"/>
+              </a:spcAft>
+              <a:buSzPts val="3000"/>
+              <a:buNone/>
+              <a:defRPr/>
+            </a:lvl6pPr>
+            <a:lvl7pPr lvl="6">
+              <a:spcBef>
+                <a:spcPts val="0"/>
+              </a:spcBef>
+              <a:spcAft>
+                <a:spcPts val="0"/>
+              </a:spcAft>
+              <a:buSzPts val="3000"/>
+              <a:buNone/>
+              <a:defRPr/>
+            </a:lvl7pPr>
+            <a:lvl8pPr lvl="7">
+              <a:spcBef>
+                <a:spcPts val="0"/>
+              </a:spcBef>
+              <a:spcAft>
+                <a:spcPts val="0"/>
+              </a:spcAft>
+              <a:buSzPts val="3000"/>
+              <a:buNone/>
+              <a:defRPr/>
+            </a:lvl8pPr>
+            <a:lvl9pPr lvl="8">
+              <a:spcBef>
+                <a:spcPts val="0"/>
+              </a:spcBef>
+              <a:spcAft>
+                <a:spcPts val="0"/>
+              </a:spcAft>
+              <a:buSzPts val="3000"/>
+              <a:buNone/>
+              <a:defRPr/>
+            </a:lvl9pPr>
+          </a:lstStyle>
+          <a:p>
+            <a:r>
+              <a:rPr lang="en-US" sz="2000" dirty="0"/>
+              <a:t>Problem Specification</a:t>
+            </a:r>
+            <a:endParaRPr lang="en-US" dirty="0"/>
           </a:p>
         </p:txBody>
       </p:sp>
@@ -10759,10 +11203,10 @@
       </p:sp>
       <p:pic>
         <p:nvPicPr>
-          <p:cNvPr id="2" name="Picture 1">
+          <p:cNvPr id="3" name="Picture 2">
             <a:extLst>
               <a:ext uri="{FF2B5EF4-FFF2-40B4-BE49-F238E27FC236}">
-                <a16:creationId xmlns:a16="http://schemas.microsoft.com/office/drawing/2014/main" id="{ACAD1889-2871-44E9-8C22-DE3EB2C37BEB}"/>
+                <a16:creationId xmlns:a16="http://schemas.microsoft.com/office/drawing/2014/main" id="{04042C31-18B3-4B06-8F2B-9A55045772C3}"/>
               </a:ext>
             </a:extLst>
           </p:cNvPr>
@@ -10779,8 +11223,8 @@
         </p:blipFill>
         <p:spPr>
           <a:xfrm>
-            <a:off x="5120349" y="0"/>
-            <a:ext cx="4062382" cy="5143500"/>
+            <a:off x="5056853" y="0"/>
+            <a:ext cx="4087147" cy="5143500"/>
           </a:xfrm>
           <a:prstGeom prst="rect">
             <a:avLst/>
@@ -11158,7 +11602,7 @@
             </a:pPr>
             <a:r>
               <a:rPr lang="en-US" sz="1200" dirty="0"/>
-              <a:t>Playable on PC through Unity Development and Implementation</a:t>
+              <a:t>Playable on Windows PC through Unity Development and Implementation/playable on computer</a:t>
             </a:r>
           </a:p>
           <a:p>
@@ -11317,6 +11761,10 @@
           </p:nvPr>
         </p:nvSpPr>
         <p:spPr>
+          <a:xfrm>
+            <a:off x="240793" y="939114"/>
+            <a:ext cx="4063704" cy="4076369"/>
+          </a:xfrm>
           <a:prstGeom prst="rect">
             <a:avLst/>
           </a:prstGeom>
@@ -11342,168 +11790,6 @@
               <a:cs typeface="Times New Roman"/>
               <a:sym typeface="Times New Roman"/>
             </a:endParaRPr>
-          </a:p>
-          <a:p>
-            <a:pPr marL="457200" lvl="0" indent="-298450" algn="l" rtl="0">
-              <a:spcBef>
-                <a:spcPts val="0"/>
-              </a:spcBef>
-              <a:spcAft>
-                <a:spcPts val="0"/>
-              </a:spcAft>
-              <a:buClr>
-                <a:srgbClr val="FFFFFF"/>
-              </a:buClr>
-              <a:buSzPts val="1100"/>
-              <a:buFont typeface="Times New Roman"/>
-              <a:buChar char="●"/>
-            </a:pPr>
-            <a:r>
-              <a:rPr lang="en" sz="1100" dirty="0">
-                <a:latin typeface="Times New Roman"/>
-                <a:ea typeface="Times New Roman"/>
-                <a:cs typeface="Times New Roman"/>
-                <a:sym typeface="Times New Roman"/>
-              </a:rPr>
-              <a:t>Github</a:t>
-            </a:r>
-            <a:endParaRPr sz="1100" dirty="0">
-              <a:latin typeface="Times New Roman"/>
-              <a:ea typeface="Times New Roman"/>
-              <a:cs typeface="Times New Roman"/>
-              <a:sym typeface="Times New Roman"/>
-            </a:endParaRPr>
-          </a:p>
-          <a:p>
-            <a:pPr marL="457200" lvl="0" indent="-298450" algn="l" rtl="0">
-              <a:spcBef>
-                <a:spcPts val="0"/>
-              </a:spcBef>
-              <a:spcAft>
-                <a:spcPts val="0"/>
-              </a:spcAft>
-              <a:buClr>
-                <a:srgbClr val="FFFFFF"/>
-              </a:buClr>
-              <a:buSzPts val="1100"/>
-              <a:buFont typeface="Times New Roman"/>
-              <a:buChar char="●"/>
-            </a:pPr>
-            <a:r>
-              <a:rPr lang="en-US" sz="1100" dirty="0">
-                <a:latin typeface="Times New Roman"/>
-                <a:ea typeface="Times New Roman"/>
-                <a:cs typeface="Times New Roman"/>
-                <a:sym typeface="Times New Roman"/>
-              </a:rPr>
-              <a:t>Unity</a:t>
-            </a:r>
-          </a:p>
-          <a:p>
-            <a:pPr marL="457200" lvl="0" indent="-298450" algn="l" rtl="0">
-              <a:spcBef>
-                <a:spcPts val="0"/>
-              </a:spcBef>
-              <a:spcAft>
-                <a:spcPts val="0"/>
-              </a:spcAft>
-              <a:buClr>
-                <a:srgbClr val="FFFFFF"/>
-              </a:buClr>
-              <a:buSzPts val="1100"/>
-              <a:buFont typeface="Times New Roman"/>
-              <a:buChar char="●"/>
-            </a:pPr>
-            <a:r>
-              <a:rPr lang="en-US" sz="1100" dirty="0">
-                <a:latin typeface="Times New Roman"/>
-                <a:ea typeface="Times New Roman"/>
-                <a:cs typeface="Times New Roman"/>
-                <a:sym typeface="Times New Roman"/>
-              </a:rPr>
-              <a:t>Visual Studio</a:t>
-            </a:r>
-          </a:p>
-          <a:p>
-            <a:pPr marL="457200" lvl="0" indent="-298450" algn="l" rtl="0">
-              <a:spcBef>
-                <a:spcPts val="0"/>
-              </a:spcBef>
-              <a:spcAft>
-                <a:spcPts val="0"/>
-              </a:spcAft>
-              <a:buClr>
-                <a:srgbClr val="FFFFFF"/>
-              </a:buClr>
-              <a:buSzPts val="1100"/>
-              <a:buFont typeface="Times New Roman"/>
-              <a:buChar char="●"/>
-            </a:pPr>
-            <a:r>
-              <a:rPr lang="en-US" sz="1100" dirty="0" err="1">
-                <a:latin typeface="Times New Roman"/>
-                <a:ea typeface="Times New Roman"/>
-                <a:cs typeface="Times New Roman"/>
-                <a:sym typeface="Times New Roman"/>
-              </a:rPr>
-              <a:t>Xcode</a:t>
-            </a:r>
-            <a:endParaRPr lang="en-US" sz="1100" dirty="0">
-              <a:latin typeface="Times New Roman"/>
-              <a:ea typeface="Times New Roman"/>
-              <a:cs typeface="Times New Roman"/>
-              <a:sym typeface="Times New Roman"/>
-            </a:endParaRPr>
-          </a:p>
-          <a:p>
-            <a:pPr marL="457200" lvl="0" indent="-298450" algn="l" rtl="0">
-              <a:spcBef>
-                <a:spcPts val="0"/>
-              </a:spcBef>
-              <a:spcAft>
-                <a:spcPts val="0"/>
-              </a:spcAft>
-              <a:buClr>
-                <a:srgbClr val="FFFFFF"/>
-              </a:buClr>
-              <a:buSzPts val="1100"/>
-              <a:buFont typeface="Times New Roman"/>
-              <a:buChar char="●"/>
-            </a:pPr>
-            <a:r>
-              <a:rPr lang="en-US" sz="1100" dirty="0">
-                <a:latin typeface="Times New Roman"/>
-                <a:ea typeface="Times New Roman"/>
-                <a:cs typeface="Times New Roman"/>
-                <a:sym typeface="Times New Roman"/>
-              </a:rPr>
-              <a:t>Swift UI</a:t>
-            </a:r>
-          </a:p>
-          <a:p>
-            <a:pPr marL="457200" lvl="0" indent="-298450" algn="l" rtl="0">
-              <a:spcBef>
-                <a:spcPts val="0"/>
-              </a:spcBef>
-              <a:spcAft>
-                <a:spcPts val="0"/>
-              </a:spcAft>
-              <a:buClr>
-                <a:srgbClr val="FFFFFF"/>
-              </a:buClr>
-              <a:buSzPts val="1100"/>
-              <a:buFont typeface="Times New Roman"/>
-              <a:buChar char="●"/>
-            </a:pPr>
-            <a:r>
-              <a:rPr lang="en-US" sz="1100" dirty="0">
-                <a:latin typeface="Times New Roman"/>
-                <a:ea typeface="Times New Roman"/>
-                <a:cs typeface="Times New Roman"/>
-                <a:sym typeface="Times New Roman"/>
-              </a:rPr>
-              <a:t>Rocket Data</a:t>
-            </a:r>
           </a:p>
           <a:p>
             <a:pPr indent="-298450">
@@ -11515,15 +11801,59 @@
               <a:buChar char="●"/>
             </a:pPr>
             <a:r>
-              <a:rPr lang="en-US" sz="1100" dirty="0">
+              <a:rPr lang="en" sz="1400" dirty="0">
                 <a:latin typeface="Times New Roman"/>
                 <a:ea typeface="Times New Roman"/>
                 <a:cs typeface="Times New Roman"/>
                 <a:sym typeface="Times New Roman"/>
               </a:rPr>
-              <a:t>Core Data (Apple local iOS storage framework)</a:t>
-            </a:r>
-            <a:endParaRPr sz="1100" dirty="0">
+              <a:t>IDE/Editors:</a:t>
+            </a:r>
+          </a:p>
+          <a:p>
+            <a:pPr lvl="1" indent="-298450">
+              <a:spcBef>
+                <a:spcPts val="0"/>
+              </a:spcBef>
+              <a:buClr>
+                <a:srgbClr val="FFFFFF"/>
+              </a:buClr>
+              <a:buSzPts val="1100"/>
+              <a:buFont typeface="Times New Roman"/>
+              <a:buChar char="●"/>
+            </a:pPr>
+            <a:r>
+              <a:rPr lang="en-US" sz="850" dirty="0">
+                <a:latin typeface="Times New Roman"/>
+                <a:ea typeface="Times New Roman"/>
+                <a:cs typeface="Times New Roman"/>
+                <a:sym typeface="Times New Roman"/>
+              </a:rPr>
+              <a:t>Visual Studio</a:t>
+            </a:r>
+          </a:p>
+          <a:p>
+            <a:pPr lvl="1" indent="-298450">
+              <a:spcBef>
+                <a:spcPts val="0"/>
+              </a:spcBef>
+              <a:buClr>
+                <a:srgbClr val="FFFFFF"/>
+              </a:buClr>
+              <a:buSzPts val="1100"/>
+              <a:buFont typeface="Times New Roman"/>
+              <a:buChar char="●"/>
+            </a:pPr>
+            <a:r>
+              <a:rPr lang="en-US" sz="850" dirty="0" err="1">
+                <a:latin typeface="Times New Roman"/>
+                <a:ea typeface="Times New Roman"/>
+                <a:cs typeface="Times New Roman"/>
+                <a:sym typeface="Times New Roman"/>
+              </a:rPr>
+              <a:t>Xcode</a:t>
+            </a:r>
+            <a:endParaRPr lang="en-US" sz="850" dirty="0">
               <a:latin typeface="Times New Roman"/>
               <a:ea typeface="Times New Roman"/>
               <a:cs typeface="Times New Roman"/>
@@ -11531,7 +11861,103 @@
             </a:endParaRPr>
           </a:p>
           <a:p>
-            <a:pPr marL="457200" lvl="0" indent="-298450" algn="l" rtl="0">
+            <a:pPr marL="615950" lvl="1" indent="0">
+              <a:spcBef>
+                <a:spcPts val="0"/>
+              </a:spcBef>
+              <a:buClr>
+                <a:srgbClr val="FFFFFF"/>
+              </a:buClr>
+              <a:buSzPts val="1100"/>
+              <a:buNone/>
+            </a:pPr>
+            <a:endParaRPr lang="en-US" sz="850" dirty="0">
+              <a:latin typeface="Times New Roman"/>
+              <a:ea typeface="Times New Roman"/>
+              <a:cs typeface="Times New Roman"/>
+              <a:sym typeface="Times New Roman"/>
+            </a:endParaRPr>
+          </a:p>
+          <a:p>
+            <a:pPr indent="-298450">
+              <a:buClr>
+                <a:srgbClr val="FFFFFF"/>
+              </a:buClr>
+              <a:buSzPts val="1100"/>
+              <a:buFont typeface="Times New Roman"/>
+              <a:buChar char="●"/>
+            </a:pPr>
+            <a:r>
+              <a:rPr lang="en-US" sz="1400" dirty="0">
+                <a:latin typeface="Times New Roman"/>
+                <a:ea typeface="Times New Roman"/>
+                <a:cs typeface="Times New Roman"/>
+                <a:sym typeface="Times New Roman"/>
+              </a:rPr>
+              <a:t>Game Engine:</a:t>
+            </a:r>
+          </a:p>
+          <a:p>
+            <a:pPr lvl="1" indent="-298450">
+              <a:spcBef>
+                <a:spcPts val="0"/>
+              </a:spcBef>
+              <a:buClr>
+                <a:srgbClr val="FFFFFF"/>
+              </a:buClr>
+              <a:buSzPts val="1100"/>
+              <a:buFont typeface="Times New Roman"/>
+              <a:buChar char="●"/>
+              <a:defRPr/>
+            </a:pPr>
+            <a:r>
+              <a:rPr kumimoji="0" lang="en-US" sz="950" b="0" i="0" u="none" strike="noStrike" kern="1200" cap="none" spc="0" normalizeH="0" baseline="0" noProof="0" dirty="0">
+                <a:ln>
+                  <a:noFill/>
+                </a:ln>
+                <a:solidFill>
+                  <a:prstClr val="white"/>
+                </a:solidFill>
+                <a:effectLst>
+                  <a:outerShdw blurRad="50800" dist="38100" dir="2700000" algn="tl" rotWithShape="0">
+                    <a:srgbClr val="000000">
+                      <a:alpha val="48000"/>
+                    </a:srgbClr>
+                  </a:outerShdw>
+                </a:effectLst>
+                <a:uLnTx/>
+                <a:uFillTx/>
+                <a:latin typeface="Times New Roman"/>
+                <a:ea typeface="Times New Roman"/>
+                <a:cs typeface="Times New Roman"/>
+                <a:sym typeface="Times New Roman"/>
+              </a:rPr>
+              <a:t>Unity</a:t>
+            </a:r>
+          </a:p>
+          <a:p>
+            <a:pPr marL="615950" lvl="1" indent="0">
+              <a:spcBef>
+                <a:spcPts val="0"/>
+              </a:spcBef>
+              <a:buClr>
+                <a:srgbClr val="FFFFFF"/>
+              </a:buClr>
+              <a:buSzPts val="1100"/>
+              <a:buNone/>
+            </a:pPr>
+            <a:endParaRPr lang="en-US" sz="850" dirty="0">
+              <a:latin typeface="Times New Roman"/>
+              <a:ea typeface="Times New Roman"/>
+              <a:cs typeface="Times New Roman"/>
+              <a:sym typeface="Times New Roman"/>
+            </a:endParaRPr>
+          </a:p>
+          <a:p>
+            <a:pPr marL="457200" marR="0" lvl="0" indent="-298450" algn="l" defTabSz="685800" rtl="0" eaLnBrk="1" fontAlgn="auto" latinLnBrk="0" hangingPunct="1">
+              <a:lnSpc>
+                <a:spcPct val="120000"/>
+              </a:lnSpc>
               <a:spcBef>
                 <a:spcPts val="0"/>
               </a:spcBef>
@@ -11544,17 +11970,34 @@
               <a:buSzPts val="1100"/>
               <a:buFont typeface="Times New Roman"/>
               <a:buChar char="●"/>
+              <a:tabLst/>
+              <a:defRPr/>
             </a:pPr>
             <a:r>
-              <a:rPr lang="en" sz="1100" dirty="0">
+              <a:rPr kumimoji="0" lang="en" sz="1400" b="0" i="0" u="none" strike="noStrike" kern="1200" cap="none" spc="0" normalizeH="0" baseline="0" noProof="0" dirty="0">
+                <a:ln>
+                  <a:noFill/>
+                </a:ln>
+                <a:solidFill>
+                  <a:prstClr val="white"/>
+                </a:solidFill>
+                <a:effectLst>
+                  <a:outerShdw blurRad="50800" dist="38100" dir="2700000" algn="tl" rotWithShape="0">
+                    <a:srgbClr val="000000">
+                      <a:alpha val="48000"/>
+                    </a:srgbClr>
+                  </a:outerShdw>
+                </a:effectLst>
+                <a:uLnTx/>
+                <a:uFillTx/>
                 <a:latin typeface="Times New Roman"/>
                 <a:ea typeface="Times New Roman"/>
                 <a:cs typeface="Times New Roman"/>
                 <a:sym typeface="Times New Roman"/>
               </a:rPr>
-              <a:t>Xcode’s Emulator</a:t>
-            </a:r>
-            <a:endParaRPr sz="1100" dirty="0">
+              <a:t>Version Control:</a:t>
+            </a:r>
+            <a:endParaRPr lang="en" sz="950" dirty="0">
               <a:latin typeface="Times New Roman"/>
               <a:ea typeface="Times New Roman"/>
               <a:cs typeface="Times New Roman"/>
@@ -11562,13 +12005,10 @@
             </a:endParaRPr>
           </a:p>
           <a:p>
-            <a:pPr marL="457200" lvl="0" indent="-298450" algn="l" rtl="0">
-              <a:spcBef>
-                <a:spcPts val="0"/>
-              </a:spcBef>
-              <a:spcAft>
-                <a:spcPts val="0"/>
-              </a:spcAft>
+            <a:pPr lvl="1" indent="-298450">
+              <a:spcBef>
+                <a:spcPts val="0"/>
+              </a:spcBef>
               <a:buClr>
                 <a:srgbClr val="FFFFFF"/>
               </a:buClr>
@@ -11577,23 +12017,35 @@
               <a:buChar char="●"/>
             </a:pPr>
             <a:r>
-              <a:rPr lang="en" sz="1100" dirty="0">
+              <a:rPr lang="en" sz="950" dirty="0">
                 <a:latin typeface="Times New Roman"/>
                 <a:ea typeface="Times New Roman"/>
                 <a:cs typeface="Times New Roman"/>
                 <a:sym typeface="Times New Roman"/>
               </a:rPr>
-              <a:t>iOS device </a:t>
-            </a:r>
-          </a:p>
-          <a:p>
-            <a:pPr marL="457200" lvl="0" indent="-298450" algn="l" rtl="0">
-              <a:spcBef>
-                <a:spcPts val="0"/>
-              </a:spcBef>
-              <a:spcAft>
-                <a:spcPts val="0"/>
-              </a:spcAft>
+              <a:t>Git/Github</a:t>
+            </a:r>
+          </a:p>
+          <a:p>
+            <a:pPr marL="615950" lvl="1" indent="0">
+              <a:spcBef>
+                <a:spcPts val="0"/>
+              </a:spcBef>
+              <a:buClr>
+                <a:srgbClr val="FFFFFF"/>
+              </a:buClr>
+              <a:buSzPts val="1100"/>
+              <a:buNone/>
+            </a:pPr>
+            <a:endParaRPr lang="en" sz="950" dirty="0">
+              <a:latin typeface="Times New Roman"/>
+              <a:ea typeface="Times New Roman"/>
+              <a:cs typeface="Times New Roman"/>
+              <a:sym typeface="Times New Roman"/>
+            </a:endParaRPr>
+          </a:p>
+          <a:p>
+            <a:pPr indent="-298450">
               <a:buClr>
                 <a:srgbClr val="FFFFFF"/>
               </a:buClr>
@@ -11608,17 +12060,20 @@
                 <a:cs typeface="Times New Roman"/>
                 <a:sym typeface="Times New Roman"/>
               </a:rPr>
-              <a:t>Windows PC</a:t>
-            </a:r>
-          </a:p>
-          <a:p>
-            <a:pPr marL="457200" lvl="0" indent="-298450" algn="l" rtl="0">
-              <a:spcBef>
-                <a:spcPts val="0"/>
-              </a:spcBef>
-              <a:spcAft>
-                <a:spcPts val="0"/>
-              </a:spcAft>
+              <a:t>Language:</a:t>
+            </a:r>
+            <a:endParaRPr sz="1100" dirty="0">
+              <a:latin typeface="Times New Roman"/>
+              <a:ea typeface="Times New Roman"/>
+              <a:cs typeface="Times New Roman"/>
+              <a:sym typeface="Times New Roman"/>
+            </a:endParaRPr>
+          </a:p>
+          <a:p>
+            <a:pPr lvl="1" indent="-298450">
+              <a:spcBef>
+                <a:spcPts val="0"/>
+              </a:spcBef>
               <a:buClr>
                 <a:srgbClr val="FFFFFF"/>
               </a:buClr>
@@ -11627,23 +12082,20 @@
               <a:buChar char="●"/>
             </a:pPr>
             <a:r>
-              <a:rPr lang="en" sz="1100" dirty="0">
+              <a:rPr lang="en-US" sz="950" dirty="0">
                 <a:latin typeface="Times New Roman"/>
                 <a:ea typeface="Times New Roman"/>
                 <a:cs typeface="Times New Roman"/>
                 <a:sym typeface="Times New Roman"/>
               </a:rPr>
-              <a:t>Mac</a:t>
-            </a:r>
-          </a:p>
-          <a:p>
-            <a:pPr marL="457200" lvl="0" indent="-298450" algn="l" rtl="0">
-              <a:spcBef>
-                <a:spcPts val="0"/>
-              </a:spcBef>
-              <a:spcAft>
-                <a:spcPts val="0"/>
-              </a:spcAft>
+              <a:t>Swift UI</a:t>
+            </a:r>
+          </a:p>
+          <a:p>
+            <a:pPr lvl="1" indent="-298450">
+              <a:spcBef>
+                <a:spcPts val="0"/>
+              </a:spcBef>
               <a:buClr>
                 <a:srgbClr val="FFFFFF"/>
               </a:buClr>
@@ -11652,14 +12104,123 @@
               <a:buChar char="●"/>
             </a:pPr>
             <a:r>
-              <a:rPr lang="en" sz="1100" dirty="0">
+              <a:rPr lang="en-US" sz="950" dirty="0">
                 <a:latin typeface="Times New Roman"/>
                 <a:ea typeface="Times New Roman"/>
                 <a:cs typeface="Times New Roman"/>
                 <a:sym typeface="Times New Roman"/>
               </a:rPr>
-              <a:t>Proto.io</a:t>
-            </a:r>
+              <a:t>C#</a:t>
+            </a:r>
+          </a:p>
+          <a:p>
+            <a:pPr lvl="1" indent="-298450">
+              <a:spcBef>
+                <a:spcPts val="0"/>
+              </a:spcBef>
+              <a:buClr>
+                <a:srgbClr val="FFFFFF"/>
+              </a:buClr>
+              <a:buSzPts val="1100"/>
+              <a:buFont typeface="Times New Roman"/>
+              <a:buChar char="●"/>
+            </a:pPr>
+            <a:r>
+              <a:rPr lang="en-US" sz="950" dirty="0">
+                <a:latin typeface="Times New Roman"/>
+                <a:ea typeface="Times New Roman"/>
+                <a:cs typeface="Times New Roman"/>
+                <a:sym typeface="Times New Roman"/>
+              </a:rPr>
+              <a:t>Swift</a:t>
+            </a:r>
+          </a:p>
+          <a:p>
+            <a:pPr marL="615950" lvl="1" indent="0">
+              <a:spcBef>
+                <a:spcPts val="0"/>
+              </a:spcBef>
+              <a:buClr>
+                <a:srgbClr val="FFFFFF"/>
+              </a:buClr>
+              <a:buSzPts val="1100"/>
+              <a:buNone/>
+            </a:pPr>
+            <a:endParaRPr lang="en-US" sz="950" dirty="0">
+              <a:latin typeface="Times New Roman"/>
+              <a:ea typeface="Times New Roman"/>
+              <a:cs typeface="Times New Roman"/>
+              <a:sym typeface="Times New Roman"/>
+            </a:endParaRPr>
+          </a:p>
+          <a:p>
+            <a:pPr indent="-298450">
+              <a:buClr>
+                <a:srgbClr val="FFFFFF"/>
+              </a:buClr>
+              <a:buSzPts val="1100"/>
+              <a:buFont typeface="Times New Roman"/>
+              <a:buChar char="●"/>
+            </a:pPr>
+            <a:r>
+              <a:rPr lang="en-US" sz="1100" dirty="0">
+                <a:latin typeface="Times New Roman"/>
+                <a:ea typeface="Times New Roman"/>
+                <a:cs typeface="Times New Roman"/>
+                <a:sym typeface="Times New Roman"/>
+              </a:rPr>
+              <a:t>Framework:</a:t>
+            </a:r>
+          </a:p>
+          <a:p>
+            <a:pPr lvl="1" indent="-298450">
+              <a:spcBef>
+                <a:spcPts val="0"/>
+              </a:spcBef>
+              <a:buClr>
+                <a:srgbClr val="FFFFFF"/>
+              </a:buClr>
+              <a:buSzPts val="1100"/>
+              <a:buFont typeface="Times New Roman"/>
+              <a:buChar char="●"/>
+            </a:pPr>
+            <a:r>
+              <a:rPr lang="en-US" sz="950" dirty="0">
+                <a:latin typeface="Times New Roman"/>
+                <a:ea typeface="Times New Roman"/>
+                <a:cs typeface="Times New Roman"/>
+                <a:sym typeface="Times New Roman"/>
+              </a:rPr>
+              <a:t>Rocket Data</a:t>
+            </a:r>
+          </a:p>
+          <a:p>
+            <a:pPr lvl="1" indent="-298450">
+              <a:spcBef>
+                <a:spcPts val="0"/>
+              </a:spcBef>
+              <a:buClr>
+                <a:srgbClr val="FFFFFF"/>
+              </a:buClr>
+              <a:buSzPts val="1100"/>
+              <a:buFont typeface="Times New Roman"/>
+              <a:buChar char="●"/>
+            </a:pPr>
+            <a:r>
+              <a:rPr lang="en-US" sz="950" dirty="0">
+                <a:latin typeface="Times New Roman"/>
+                <a:ea typeface="Times New Roman"/>
+                <a:cs typeface="Times New Roman"/>
+                <a:sym typeface="Times New Roman"/>
+              </a:rPr>
+              <a:t>Core Data</a:t>
+            </a:r>
+            <a:endParaRPr lang="en" sz="1100" dirty="0">
+              <a:latin typeface="Times New Roman"/>
+              <a:ea typeface="Times New Roman"/>
+              <a:cs typeface="Times New Roman"/>
+              <a:sym typeface="Times New Roman"/>
+            </a:endParaRPr>
           </a:p>
           <a:p>
             <a:pPr marL="0" lvl="0" indent="0" algn="l" rtl="0">
@@ -11672,6 +12233,551 @@
               <a:buNone/>
             </a:pPr>
             <a:endParaRPr dirty="0"/>
+          </a:p>
+        </p:txBody>
+      </p:sp>
+      <p:sp>
+        <p:nvSpPr>
+          <p:cNvPr id="4" name="Google Shape;116;p22">
+            <a:extLst>
+              <a:ext uri="{FF2B5EF4-FFF2-40B4-BE49-F238E27FC236}">
+                <a16:creationId xmlns:a16="http://schemas.microsoft.com/office/drawing/2014/main" id="{B6F12C28-3856-4663-B39D-2910BCBE5D52}"/>
+              </a:ext>
+            </a:extLst>
+          </p:cNvPr>
+          <p:cNvSpPr txBox="1">
+            <a:spLocks/>
+          </p:cNvSpPr>
+          <p:nvPr/>
+        </p:nvSpPr>
+        <p:spPr>
+          <a:xfrm>
+            <a:off x="4839503" y="939115"/>
+            <a:ext cx="4063704" cy="2599613"/>
+          </a:xfrm>
+          <a:prstGeom prst="rect">
+            <a:avLst/>
+          </a:prstGeom>
+        </p:spPr>
+        <p:txBody>
+          <a:bodyPr spcFirstLastPara="1" vert="horz" wrap="square" lIns="91425" tIns="91425" rIns="91425" bIns="91425" rtlCol="0" anchor="t" anchorCtr="0">
+            <a:noAutofit/>
+          </a:bodyPr>
+          <a:lstStyle>
+            <a:lvl1pPr marL="457200" lvl="0" indent="-342900" algn="l" defTabSz="685800" rtl="0" eaLnBrk="1" latinLnBrk="0" hangingPunct="1">
+              <a:lnSpc>
+                <a:spcPct val="120000"/>
+              </a:lnSpc>
+              <a:spcBef>
+                <a:spcPts val="0"/>
+              </a:spcBef>
+              <a:spcAft>
+                <a:spcPts val="0"/>
+              </a:spcAft>
+              <a:buSzPts val="1800"/>
+              <a:buFont typeface="Arial" panose="020B0604020202020204" pitchFamily="34" charset="0"/>
+              <a:buChar char="●"/>
+              <a:defRPr sz="1500" kern="1200">
+                <a:solidFill>
+                  <a:schemeClr val="tx1"/>
+                </a:solidFill>
+                <a:effectLst>
+                  <a:outerShdw blurRad="50800" dist="38100" dir="2700000" algn="tl" rotWithShape="0">
+                    <a:srgbClr val="000000">
+                      <a:alpha val="48000"/>
+                    </a:srgbClr>
+                  </a:outerShdw>
+                </a:effectLst>
+                <a:latin typeface="+mn-lt"/>
+                <a:ea typeface="+mn-ea"/>
+                <a:cs typeface="+mn-cs"/>
+              </a:defRPr>
+            </a:lvl1pPr>
+            <a:lvl2pPr marL="914400" lvl="1" indent="-317500" algn="l" defTabSz="685800" rtl="0" eaLnBrk="1" latinLnBrk="0" hangingPunct="1">
+              <a:lnSpc>
+                <a:spcPct val="120000"/>
+              </a:lnSpc>
+              <a:spcBef>
+                <a:spcPts val="1600"/>
+              </a:spcBef>
+              <a:spcAft>
+                <a:spcPts val="0"/>
+              </a:spcAft>
+              <a:buSzPts val="1400"/>
+              <a:buFont typeface="Arial" panose="020B0604020202020204" pitchFamily="34" charset="0"/>
+              <a:buChar char="○"/>
+              <a:defRPr sz="1350" kern="1200">
+                <a:solidFill>
+                  <a:schemeClr val="tx1"/>
+                </a:solidFill>
+                <a:effectLst>
+                  <a:outerShdw blurRad="50800" dist="38100" dir="2700000" algn="tl" rotWithShape="0">
+                    <a:srgbClr val="000000">
+                      <a:alpha val="48000"/>
+                    </a:srgbClr>
+                  </a:outerShdw>
+                </a:effectLst>
+                <a:latin typeface="+mn-lt"/>
+                <a:ea typeface="+mn-ea"/>
+                <a:cs typeface="+mn-cs"/>
+              </a:defRPr>
+            </a:lvl2pPr>
+            <a:lvl3pPr marL="1371600" lvl="2" indent="-317500" algn="l" defTabSz="685800" rtl="0" eaLnBrk="1" latinLnBrk="0" hangingPunct="1">
+              <a:lnSpc>
+                <a:spcPct val="120000"/>
+              </a:lnSpc>
+              <a:spcBef>
+                <a:spcPts val="1600"/>
+              </a:spcBef>
+              <a:spcAft>
+                <a:spcPts val="0"/>
+              </a:spcAft>
+              <a:buSzPts val="1400"/>
+              <a:buFont typeface="Arial" panose="020B0604020202020204" pitchFamily="34" charset="0"/>
+              <a:buChar char="■"/>
+              <a:defRPr sz="1200" kern="1200">
+                <a:solidFill>
+                  <a:schemeClr val="tx1"/>
+                </a:solidFill>
+                <a:effectLst>
+                  <a:outerShdw blurRad="50800" dist="38100" dir="2700000" algn="tl" rotWithShape="0">
+                    <a:srgbClr val="000000">
+                      <a:alpha val="48000"/>
+                    </a:srgbClr>
+                  </a:outerShdw>
+                </a:effectLst>
+                <a:latin typeface="+mn-lt"/>
+                <a:ea typeface="+mn-ea"/>
+                <a:cs typeface="+mn-cs"/>
+              </a:defRPr>
+            </a:lvl3pPr>
+            <a:lvl4pPr marL="1828800" lvl="3" indent="-317500" algn="l" defTabSz="685800" rtl="0" eaLnBrk="1" latinLnBrk="0" hangingPunct="1">
+              <a:lnSpc>
+                <a:spcPct val="120000"/>
+              </a:lnSpc>
+              <a:spcBef>
+                <a:spcPts val="1600"/>
+              </a:spcBef>
+              <a:spcAft>
+                <a:spcPts val="0"/>
+              </a:spcAft>
+              <a:buSzPts val="1400"/>
+              <a:buFont typeface="Arial" panose="020B0604020202020204" pitchFamily="34" charset="0"/>
+              <a:buChar char="●"/>
+              <a:defRPr sz="1050" kern="1200">
+                <a:solidFill>
+                  <a:schemeClr val="tx1"/>
+                </a:solidFill>
+                <a:effectLst>
+                  <a:outerShdw blurRad="50800" dist="38100" dir="2700000" algn="tl" rotWithShape="0">
+                    <a:srgbClr val="000000">
+                      <a:alpha val="48000"/>
+                    </a:srgbClr>
+                  </a:outerShdw>
+                </a:effectLst>
+                <a:latin typeface="+mn-lt"/>
+                <a:ea typeface="+mn-ea"/>
+                <a:cs typeface="+mn-cs"/>
+              </a:defRPr>
+            </a:lvl4pPr>
+            <a:lvl5pPr marL="2286000" lvl="4" indent="-317500" algn="l" defTabSz="685800" rtl="0" eaLnBrk="1" latinLnBrk="0" hangingPunct="1">
+              <a:lnSpc>
+                <a:spcPct val="120000"/>
+              </a:lnSpc>
+              <a:spcBef>
+                <a:spcPts val="1600"/>
+              </a:spcBef>
+              <a:spcAft>
+                <a:spcPts val="0"/>
+              </a:spcAft>
+              <a:buSzPts val="1400"/>
+              <a:buFont typeface="Arial" panose="020B0604020202020204" pitchFamily="34" charset="0"/>
+              <a:buChar char="○"/>
+              <a:defRPr sz="900" kern="1200">
+                <a:solidFill>
+                  <a:schemeClr val="tx1"/>
+                </a:solidFill>
+                <a:effectLst>
+                  <a:outerShdw blurRad="50800" dist="38100" dir="2700000" algn="tl" rotWithShape="0">
+                    <a:srgbClr val="000000">
+                      <a:alpha val="48000"/>
+                    </a:srgbClr>
+                  </a:outerShdw>
+                </a:effectLst>
+                <a:latin typeface="+mn-lt"/>
+                <a:ea typeface="+mn-ea"/>
+                <a:cs typeface="+mn-cs"/>
+              </a:defRPr>
+            </a:lvl5pPr>
+            <a:lvl6pPr marL="2743200" lvl="5" indent="-317500" algn="l" defTabSz="685800" rtl="0" eaLnBrk="1" latinLnBrk="0" hangingPunct="1">
+              <a:lnSpc>
+                <a:spcPct val="120000"/>
+              </a:lnSpc>
+              <a:spcBef>
+                <a:spcPts val="1600"/>
+              </a:spcBef>
+              <a:spcAft>
+                <a:spcPts val="0"/>
+              </a:spcAft>
+              <a:buSzPts val="1400"/>
+              <a:buFont typeface="Arial" panose="020B0604020202020204" pitchFamily="34" charset="0"/>
+              <a:buChar char="■"/>
+              <a:defRPr sz="900" kern="1200">
+                <a:solidFill>
+                  <a:schemeClr val="tx1"/>
+                </a:solidFill>
+                <a:effectLst>
+                  <a:outerShdw blurRad="50800" dist="38100" dir="2700000" algn="tl" rotWithShape="0">
+                    <a:srgbClr val="000000">
+                      <a:alpha val="48000"/>
+                    </a:srgbClr>
+                  </a:outerShdw>
+                </a:effectLst>
+                <a:latin typeface="+mn-lt"/>
+                <a:ea typeface="+mn-ea"/>
+                <a:cs typeface="+mn-cs"/>
+              </a:defRPr>
+            </a:lvl6pPr>
+            <a:lvl7pPr marL="3200400" lvl="6" indent="-317500" algn="l" defTabSz="685800" rtl="0" eaLnBrk="1" latinLnBrk="0" hangingPunct="1">
+              <a:lnSpc>
+                <a:spcPct val="120000"/>
+              </a:lnSpc>
+              <a:spcBef>
+                <a:spcPts val="1600"/>
+              </a:spcBef>
+              <a:spcAft>
+                <a:spcPts val="0"/>
+              </a:spcAft>
+              <a:buSzPts val="1400"/>
+              <a:buFont typeface="Arial" panose="020B0604020202020204" pitchFamily="34" charset="0"/>
+              <a:buChar char="●"/>
+              <a:defRPr sz="900" kern="1200">
+                <a:solidFill>
+                  <a:schemeClr val="tx1"/>
+                </a:solidFill>
+                <a:effectLst>
+                  <a:outerShdw blurRad="50800" dist="38100" dir="2700000" algn="tl" rotWithShape="0">
+                    <a:srgbClr val="000000">
+                      <a:alpha val="48000"/>
+                    </a:srgbClr>
+                  </a:outerShdw>
+                </a:effectLst>
+                <a:latin typeface="+mn-lt"/>
+                <a:ea typeface="+mn-ea"/>
+                <a:cs typeface="+mn-cs"/>
+              </a:defRPr>
+            </a:lvl7pPr>
+            <a:lvl8pPr marL="3657600" lvl="7" indent="-317500" algn="l" defTabSz="685800" rtl="0" eaLnBrk="1" latinLnBrk="0" hangingPunct="1">
+              <a:lnSpc>
+                <a:spcPct val="120000"/>
+              </a:lnSpc>
+              <a:spcBef>
+                <a:spcPts val="1600"/>
+              </a:spcBef>
+              <a:spcAft>
+                <a:spcPts val="0"/>
+              </a:spcAft>
+              <a:buSzPts val="1400"/>
+              <a:buFont typeface="Arial" panose="020B0604020202020204" pitchFamily="34" charset="0"/>
+              <a:buChar char="○"/>
+              <a:defRPr sz="900" kern="1200">
+                <a:solidFill>
+                  <a:schemeClr val="tx1"/>
+                </a:solidFill>
+                <a:effectLst>
+                  <a:outerShdw blurRad="50800" dist="38100" dir="2700000" algn="tl" rotWithShape="0">
+                    <a:srgbClr val="000000">
+                      <a:alpha val="48000"/>
+                    </a:srgbClr>
+                  </a:outerShdw>
+                </a:effectLst>
+                <a:latin typeface="+mn-lt"/>
+                <a:ea typeface="+mn-ea"/>
+                <a:cs typeface="+mn-cs"/>
+              </a:defRPr>
+            </a:lvl8pPr>
+            <a:lvl9pPr marL="4114800" lvl="8" indent="-317500" algn="l" defTabSz="685800" rtl="0" eaLnBrk="1" latinLnBrk="0" hangingPunct="1">
+              <a:lnSpc>
+                <a:spcPct val="120000"/>
+              </a:lnSpc>
+              <a:spcBef>
+                <a:spcPts val="1600"/>
+              </a:spcBef>
+              <a:spcAft>
+                <a:spcPts val="1600"/>
+              </a:spcAft>
+              <a:buSzPts val="1400"/>
+              <a:buFont typeface="Arial" panose="020B0604020202020204" pitchFamily="34" charset="0"/>
+              <a:buChar char="■"/>
+              <a:defRPr sz="900" kern="1200">
+                <a:solidFill>
+                  <a:schemeClr val="tx1"/>
+                </a:solidFill>
+                <a:effectLst>
+                  <a:outerShdw blurRad="50800" dist="38100" dir="2700000" algn="tl" rotWithShape="0">
+                    <a:srgbClr val="000000">
+                      <a:alpha val="48000"/>
+                    </a:srgbClr>
+                  </a:outerShdw>
+                </a:effectLst>
+                <a:latin typeface="+mn-lt"/>
+                <a:ea typeface="+mn-ea"/>
+                <a:cs typeface="+mn-cs"/>
+              </a:defRPr>
+            </a:lvl9pPr>
+          </a:lstStyle>
+          <a:p>
+            <a:pPr marL="0" indent="0">
+              <a:buFont typeface="Arial" panose="020B0604020202020204" pitchFamily="34" charset="0"/>
+              <a:buNone/>
+            </a:pPr>
+            <a:endParaRPr lang="en-US" sz="1100" dirty="0">
+              <a:latin typeface="Times New Roman"/>
+              <a:ea typeface="Times New Roman"/>
+              <a:cs typeface="Times New Roman"/>
+              <a:sym typeface="Times New Roman"/>
+            </a:endParaRPr>
+          </a:p>
+          <a:p>
+            <a:pPr indent="-298450">
+              <a:buClr>
+                <a:srgbClr val="FFFFFF"/>
+              </a:buClr>
+              <a:buSzPts val="1100"/>
+              <a:buFont typeface="Times New Roman"/>
+              <a:buChar char="●"/>
+            </a:pPr>
+            <a:r>
+              <a:rPr lang="en-US" sz="1100" dirty="0">
+                <a:latin typeface="Times New Roman"/>
+                <a:ea typeface="Times New Roman"/>
+                <a:cs typeface="Times New Roman"/>
+                <a:sym typeface="Times New Roman"/>
+              </a:rPr>
+              <a:t>Hardware:</a:t>
+            </a:r>
+          </a:p>
+          <a:p>
+            <a:pPr lvl="1" indent="-298450">
+              <a:spcBef>
+                <a:spcPts val="0"/>
+              </a:spcBef>
+              <a:buClr>
+                <a:srgbClr val="FFFFFF"/>
+              </a:buClr>
+              <a:buSzPts val="1100"/>
+              <a:buFont typeface="Times New Roman"/>
+              <a:buChar char="●"/>
+            </a:pPr>
+            <a:r>
+              <a:rPr lang="en-US" sz="950" dirty="0">
+                <a:latin typeface="Times New Roman"/>
+                <a:ea typeface="Times New Roman"/>
+                <a:cs typeface="Times New Roman"/>
+                <a:sym typeface="Times New Roman"/>
+              </a:rPr>
+              <a:t>Windows PC</a:t>
+            </a:r>
+          </a:p>
+          <a:p>
+            <a:pPr lvl="1" indent="-298450">
+              <a:spcBef>
+                <a:spcPts val="0"/>
+              </a:spcBef>
+              <a:buClr>
+                <a:srgbClr val="FFFFFF"/>
+              </a:buClr>
+              <a:buSzPts val="1100"/>
+              <a:buFont typeface="Times New Roman"/>
+              <a:buChar char="●"/>
+            </a:pPr>
+            <a:r>
+              <a:rPr lang="en-US" sz="950" dirty="0">
+                <a:latin typeface="Times New Roman"/>
+                <a:ea typeface="Times New Roman"/>
+                <a:cs typeface="Times New Roman"/>
+                <a:sym typeface="Times New Roman"/>
+              </a:rPr>
+              <a:t>Mac</a:t>
+            </a:r>
+          </a:p>
+          <a:p>
+            <a:pPr lvl="1" indent="-298450">
+              <a:spcBef>
+                <a:spcPts val="0"/>
+              </a:spcBef>
+              <a:buClr>
+                <a:srgbClr val="FFFFFF"/>
+              </a:buClr>
+              <a:buSzPts val="1100"/>
+              <a:buFont typeface="Times New Roman"/>
+              <a:buChar char="●"/>
+            </a:pPr>
+            <a:r>
+              <a:rPr lang="en-US" sz="950" dirty="0">
+                <a:latin typeface="Times New Roman"/>
+                <a:ea typeface="Times New Roman"/>
+                <a:cs typeface="Times New Roman"/>
+                <a:sym typeface="Times New Roman"/>
+              </a:rPr>
+              <a:t>iOS Device</a:t>
+            </a:r>
+          </a:p>
+          <a:p>
+            <a:pPr marL="615950" lvl="1" indent="0">
+              <a:spcBef>
+                <a:spcPts val="0"/>
+              </a:spcBef>
+              <a:buClr>
+                <a:srgbClr val="FFFFFF"/>
+              </a:buClr>
+              <a:buSzPts val="1100"/>
+              <a:buNone/>
+            </a:pPr>
+            <a:endParaRPr lang="en-US" sz="950" dirty="0">
+              <a:latin typeface="Times New Roman"/>
+              <a:ea typeface="Times New Roman"/>
+              <a:cs typeface="Times New Roman"/>
+              <a:sym typeface="Times New Roman"/>
+            </a:endParaRPr>
+          </a:p>
+          <a:p>
+            <a:pPr indent="-298450">
+              <a:buClr>
+                <a:srgbClr val="FFFFFF"/>
+              </a:buClr>
+              <a:buSzPts val="1100"/>
+              <a:buFont typeface="Times New Roman"/>
+              <a:buChar char="●"/>
+            </a:pPr>
+            <a:r>
+              <a:rPr lang="en-US" sz="1100" dirty="0">
+                <a:latin typeface="Times New Roman"/>
+                <a:ea typeface="Times New Roman"/>
+                <a:cs typeface="Times New Roman"/>
+                <a:sym typeface="Times New Roman"/>
+              </a:rPr>
+              <a:t>Other Tools:</a:t>
+            </a:r>
+          </a:p>
+          <a:p>
+            <a:pPr lvl="1" indent="-298450">
+              <a:spcBef>
+                <a:spcPts val="0"/>
+              </a:spcBef>
+              <a:buClr>
+                <a:srgbClr val="FFFFFF"/>
+              </a:buClr>
+              <a:buSzPts val="1100"/>
+              <a:buFont typeface="Times New Roman"/>
+              <a:buChar char="●"/>
+            </a:pPr>
+            <a:r>
+              <a:rPr lang="en-US" sz="950" dirty="0">
+                <a:latin typeface="Times New Roman"/>
+                <a:ea typeface="Times New Roman"/>
+                <a:cs typeface="Times New Roman"/>
+                <a:sym typeface="Times New Roman"/>
+              </a:rPr>
+              <a:t>Proto.io </a:t>
+            </a:r>
+          </a:p>
+          <a:p>
+            <a:pPr lvl="1" indent="-298450">
+              <a:spcBef>
+                <a:spcPts val="0"/>
+              </a:spcBef>
+              <a:buClr>
+                <a:srgbClr val="FFFFFF"/>
+              </a:buClr>
+              <a:buSzPts val="1100"/>
+              <a:buFont typeface="Times New Roman"/>
+              <a:buChar char="●"/>
+            </a:pPr>
+            <a:r>
+              <a:rPr lang="en-US" sz="950" dirty="0" err="1">
+                <a:latin typeface="Times New Roman"/>
+                <a:ea typeface="Times New Roman"/>
+                <a:cs typeface="Times New Roman"/>
+                <a:sym typeface="Times New Roman"/>
+              </a:rPr>
+              <a:t>Xcode’s</a:t>
+            </a:r>
+            <a:r>
+              <a:rPr lang="en-US" sz="950" dirty="0">
+                <a:latin typeface="Times New Roman"/>
+                <a:ea typeface="Times New Roman"/>
+                <a:cs typeface="Times New Roman"/>
+                <a:sym typeface="Times New Roman"/>
+              </a:rPr>
+              <a:t> Emulator</a:t>
+            </a:r>
+          </a:p>
+          <a:p>
+            <a:pPr lvl="1" indent="-298450">
+              <a:spcBef>
+                <a:spcPts val="0"/>
+              </a:spcBef>
+              <a:buClr>
+                <a:srgbClr val="FFFFFF"/>
+              </a:buClr>
+              <a:buSzPts val="1100"/>
+              <a:buFont typeface="Times New Roman"/>
+              <a:buChar char="●"/>
+            </a:pPr>
+            <a:r>
+              <a:rPr lang="en-US" sz="950" dirty="0">
+                <a:latin typeface="Times New Roman"/>
+                <a:ea typeface="Times New Roman"/>
+                <a:cs typeface="Times New Roman"/>
+                <a:sym typeface="Times New Roman"/>
+              </a:rPr>
+              <a:t>Swift</a:t>
+            </a:r>
+          </a:p>
+          <a:p>
+            <a:pPr marL="615950" lvl="1" indent="0">
+              <a:lnSpc>
+                <a:spcPct val="100000"/>
+              </a:lnSpc>
+              <a:buClr>
+                <a:srgbClr val="FFFFFF"/>
+              </a:buClr>
+              <a:buSzPts val="1100"/>
+              <a:buNone/>
+            </a:pPr>
+            <a:endParaRPr lang="en-US" sz="950" dirty="0">
+              <a:latin typeface="Times New Roman"/>
+              <a:ea typeface="Times New Roman"/>
+              <a:cs typeface="Times New Roman"/>
+              <a:sym typeface="Times New Roman"/>
+            </a:endParaRPr>
+          </a:p>
+          <a:p>
+            <a:pPr indent="-298450">
+              <a:buClr>
+                <a:srgbClr val="FFFFFF"/>
+              </a:buClr>
+              <a:buSzPts val="1100"/>
+              <a:buFont typeface="Times New Roman"/>
+              <a:buChar char="●"/>
+            </a:pPr>
+            <a:endParaRPr lang="en-US" sz="1100" dirty="0">
+              <a:latin typeface="Times New Roman"/>
+              <a:ea typeface="Times New Roman"/>
+              <a:cs typeface="Times New Roman"/>
+              <a:sym typeface="Times New Roman"/>
+            </a:endParaRPr>
+          </a:p>
+          <a:p>
+            <a:pPr marL="0" indent="0">
+              <a:spcAft>
+                <a:spcPts val="1600"/>
+              </a:spcAft>
+              <a:buFont typeface="Arial" panose="020B0604020202020204" pitchFamily="34" charset="0"/>
+              <a:buNone/>
+            </a:pPr>
+            <a:endParaRPr lang="en-US" dirty="0"/>
           </a:p>
         </p:txBody>
       </p:sp>

</xml_diff>